<commit_message>
change web to app
change wed site to application software
</commit_message>
<xml_diff>
--- a/document/ppt.pptx
+++ b/document/ppt.pptx
@@ -1,27 +1,27 @@
 
 <file path=ppt/presentation.xml><?xml version="1.0" encoding="utf-8"?>
-<p:presentation xmlns:a="http://schemas.openxmlformats.org/drawingml/2006/main" xmlns:r="http://schemas.openxmlformats.org/officeDocument/2006/relationships" xmlns:p="http://schemas.openxmlformats.org/presentationml/2006/main" saveSubsetFonts="1">
+<p:presentation xmlns:a="http://schemas.openxmlformats.org/drawingml/2006/main" xmlns:r="http://schemas.openxmlformats.org/officeDocument/2006/relationships" xmlns:p="http://schemas.openxmlformats.org/presentationml/2006/main">
   <p:sldMasterIdLst>
     <p:sldMasterId id="2147483648" r:id="rId1"/>
-    <p:sldMasterId id="2147483669" r:id="rId2"/>
+    <p:sldMasterId id="2147483654" r:id="rId3"/>
   </p:sldMasterIdLst>
   <p:notesMasterIdLst>
-    <p:notesMasterId r:id="rId16"/>
+    <p:notesMasterId r:id="rId5"/>
   </p:notesMasterIdLst>
   <p:sldIdLst>
-    <p:sldId id="256" r:id="rId3"/>
-    <p:sldId id="266" r:id="rId4"/>
-    <p:sldId id="278" r:id="rId5"/>
-    <p:sldId id="302" r:id="rId6"/>
-    <p:sldId id="307" r:id="rId7"/>
-    <p:sldId id="328" r:id="rId8"/>
-    <p:sldId id="330" r:id="rId9"/>
-    <p:sldId id="331" r:id="rId10"/>
-    <p:sldId id="334" r:id="rId11"/>
-    <p:sldId id="335" r:id="rId12"/>
-    <p:sldId id="308" r:id="rId13"/>
-    <p:sldId id="329" r:id="rId14"/>
-    <p:sldId id="326" r:id="rId15"/>
+    <p:sldId id="256" r:id="rId4"/>
+    <p:sldId id="266" r:id="rId6"/>
+    <p:sldId id="278" r:id="rId7"/>
+    <p:sldId id="302" r:id="rId8"/>
+    <p:sldId id="307" r:id="rId9"/>
+    <p:sldId id="328" r:id="rId10"/>
+    <p:sldId id="330" r:id="rId11"/>
+    <p:sldId id="331" r:id="rId12"/>
+    <p:sldId id="334" r:id="rId13"/>
+    <p:sldId id="335" r:id="rId14"/>
+    <p:sldId id="308" r:id="rId15"/>
+    <p:sldId id="329" r:id="rId16"/>
+    <p:sldId id="326" r:id="rId17"/>
   </p:sldIdLst>
   <p:sldSz cx="12192000" cy="6858000"/>
   <p:notesSz cx="6858000" cy="9144000"/>
@@ -120,22 +120,6 @@
       </a:defRPr>
     </a:lvl9pPr>
   </p:defaultTextStyle>
-  <p:extLst>
-    <p:ext uri="{EFAFB233-063F-42B5-8137-9DF3F51BA10A}">
-      <p15:sldGuideLst xmlns:p15="http://schemas.microsoft.com/office/powerpoint/2012/main">
-        <p15:guide id="1" orient="horz" pos="2160" userDrawn="1">
-          <p15:clr>
-            <a:srgbClr val="A4A3A4"/>
-          </p15:clr>
-        </p15:guide>
-        <p15:guide id="2" pos="3840" userDrawn="1">
-          <p15:clr>
-            <a:srgbClr val="A4A3A4"/>
-          </p15:clr>
-        </p15:guide>
-      </p15:sldGuideLst>
-    </p:ext>
-  </p:extLst>
 </p:presentation>
 </file>
 
@@ -225,8 +209,6 @@
           <a:p>
             <a:fld id="{3D2472AF-A0E2-497A-9C64-CEEA312F355D}" type="datetimeFigureOut">
               <a:rPr lang="zh-CN" altLang="en-US" smtClean="0"/>
-              <a:pPr/>
-              <a:t>2022/4/9</a:t>
             </a:fld>
             <a:endParaRPr lang="zh-CN" altLang="en-US" dirty="0"/>
           </a:p>
@@ -293,6 +275,7 @@
               <a:rPr lang="zh-CN" altLang="en-US" dirty="0"/>
               <a:t>单击此处编辑母版文本样式</a:t>
             </a:r>
+            <a:endParaRPr lang="zh-CN" altLang="en-US" dirty="0"/>
           </a:p>
           <a:p>
             <a:pPr lvl="1"/>
@@ -300,6 +283,7 @@
               <a:rPr lang="zh-CN" altLang="en-US" dirty="0"/>
               <a:t>第二级</a:t>
             </a:r>
+            <a:endParaRPr lang="zh-CN" altLang="en-US" dirty="0"/>
           </a:p>
           <a:p>
             <a:pPr lvl="2"/>
@@ -307,6 +291,7 @@
               <a:rPr lang="zh-CN" altLang="en-US" dirty="0"/>
               <a:t>第三级</a:t>
             </a:r>
+            <a:endParaRPr lang="zh-CN" altLang="en-US" dirty="0"/>
           </a:p>
           <a:p>
             <a:pPr lvl="3"/>
@@ -314,6 +299,7 @@
               <a:rPr lang="zh-CN" altLang="en-US" dirty="0"/>
               <a:t>第四级</a:t>
             </a:r>
+            <a:endParaRPr lang="zh-CN" altLang="en-US" dirty="0"/>
           </a:p>
           <a:p>
             <a:pPr lvl="4"/>
@@ -321,6 +307,7 @@
               <a:rPr lang="zh-CN" altLang="en-US" dirty="0"/>
               <a:t>第五级</a:t>
             </a:r>
+            <a:endParaRPr lang="zh-CN" altLang="en-US" dirty="0"/>
           </a:p>
         </p:txBody>
       </p:sp>
@@ -388,19 +375,12 @@
           <a:p>
             <a:fld id="{0DAA9E1F-4E78-4B42-AA19-9F57A79F734E}" type="slidenum">
               <a:rPr lang="zh-CN" altLang="en-US" smtClean="0"/>
-              <a:pPr/>
-              <a:t>‹#›</a:t>
             </a:fld>
             <a:endParaRPr lang="zh-CN" altLang="en-US" dirty="0"/>
           </a:p>
         </p:txBody>
       </p:sp>
     </p:spTree>
-    <p:extLst>
-      <p:ext uri="{BB962C8B-B14F-4D97-AF65-F5344CB8AC3E}">
-        <p14:creationId xmlns:p14="http://schemas.microsoft.com/office/powerpoint/2010/main" val="1167158222"/>
-      </p:ext>
-    </p:extLst>
   </p:cSld>
   <p:clrMap bg1="lt1" tx1="dk1" bg2="lt2" tx2="dk2" accent1="accent1" accent2="accent2" accent3="accent3" accent4="accent4" accent5="accent5" accent6="accent6" hlink="hlink" folHlink="folHlink"/>
   <p:notesStyle>
@@ -563,18 +543,12 @@
           <a:p>
             <a:fld id="{0DAA9E1F-4E78-4B42-AA19-9F57A79F734E}" type="slidenum">
               <a:rPr lang="zh-CN" altLang="en-US" smtClean="0"/>
-              <a:t>1</a:t>
             </a:fld>
             <a:endParaRPr lang="zh-CN" altLang="en-US"/>
           </a:p>
         </p:txBody>
       </p:sp>
     </p:spTree>
-    <p:extLst>
-      <p:ext uri="{BB962C8B-B14F-4D97-AF65-F5344CB8AC3E}">
-        <p14:creationId xmlns:p14="http://schemas.microsoft.com/office/powerpoint/2010/main" val="1171390093"/>
-      </p:ext>
-    </p:extLst>
   </p:cSld>
   <p:clrMapOvr>
     <a:masterClrMapping/>
@@ -627,8 +601,6 @@
               <a:srgbClr val="000000"/>
             </a:solidFill>
             <a:miter lim="800000"/>
-            <a:headEnd/>
-            <a:tailEnd/>
           </a:ln>
           <a:extLst>
             <a:ext uri="{909E8E84-426E-40DD-AFC4-6F175D3DCCD1}">
@@ -854,12 +826,6 @@
               <a:rPr lang="zh-CN" altLang="en-US">
                 <a:ea typeface="微软雅黑" panose="020B0503020204020204" pitchFamily="34" charset="-122"/>
               </a:rPr>
-              <a:pPr algn="r" eaLnBrk="1" latinLnBrk="1" hangingPunct="1">
-                <a:spcBef>
-                  <a:spcPct val="0"/>
-                </a:spcBef>
-              </a:pPr>
-              <a:t>11</a:t>
             </a:fld>
             <a:endParaRPr lang="zh-CN" altLang="en-US" dirty="0">
               <a:ea typeface="微软雅黑" panose="020B0503020204020204" pitchFamily="34" charset="-122"/>
@@ -868,11 +834,6 @@
         </p:txBody>
       </p:sp>
     </p:spTree>
-    <p:extLst>
-      <p:ext uri="{BB962C8B-B14F-4D97-AF65-F5344CB8AC3E}">
-        <p14:creationId xmlns:p14="http://schemas.microsoft.com/office/powerpoint/2010/main" val="2817725260"/>
-      </p:ext>
-    </p:extLst>
   </p:cSld>
   <p:clrMapOvr>
     <a:overrideClrMapping bg1="lt1" tx1="dk1" bg2="lt2" tx2="dk2" accent1="accent1" accent2="accent2" accent3="accent3" accent4="accent4" accent5="accent5" accent6="accent6" hlink="hlink" folHlink="folHlink"/>
@@ -925,8 +886,6 @@
               <a:srgbClr val="000000"/>
             </a:solidFill>
             <a:miter lim="800000"/>
-            <a:headEnd/>
-            <a:tailEnd/>
           </a:ln>
           <a:extLst>
             <a:ext uri="{909E8E84-426E-40DD-AFC4-6F175D3DCCD1}">
@@ -1152,12 +1111,6 @@
               <a:rPr lang="zh-CN" altLang="en-US">
                 <a:ea typeface="微软雅黑" panose="020B0503020204020204" pitchFamily="34" charset="-122"/>
               </a:rPr>
-              <a:pPr algn="r" eaLnBrk="1" latinLnBrk="1" hangingPunct="1">
-                <a:spcBef>
-                  <a:spcPct val="0"/>
-                </a:spcBef>
-              </a:pPr>
-              <a:t>12</a:t>
             </a:fld>
             <a:endParaRPr lang="zh-CN" altLang="en-US" dirty="0">
               <a:ea typeface="微软雅黑" panose="020B0503020204020204" pitchFamily="34" charset="-122"/>
@@ -1166,11 +1119,6 @@
         </p:txBody>
       </p:sp>
     </p:spTree>
-    <p:extLst>
-      <p:ext uri="{BB962C8B-B14F-4D97-AF65-F5344CB8AC3E}">
-        <p14:creationId xmlns:p14="http://schemas.microsoft.com/office/powerpoint/2010/main" val="3051420232"/>
-      </p:ext>
-    </p:extLst>
   </p:cSld>
   <p:clrMapOvr>
     <a:overrideClrMapping bg1="lt1" tx1="dk1" bg2="lt2" tx2="dk2" accent1="accent1" accent2="accent2" accent3="accent3" accent4="accent4" accent5="accent5" accent6="accent6" hlink="hlink" folHlink="folHlink"/>
@@ -1243,18 +1191,12 @@
           <a:p>
             <a:fld id="{0DAA9E1F-4E78-4B42-AA19-9F57A79F734E}" type="slidenum">
               <a:rPr lang="zh-CN" altLang="en-US" smtClean="0"/>
-              <a:t>13</a:t>
             </a:fld>
             <a:endParaRPr lang="zh-CN" altLang="en-US"/>
           </a:p>
         </p:txBody>
       </p:sp>
     </p:spTree>
-    <p:extLst>
-      <p:ext uri="{BB962C8B-B14F-4D97-AF65-F5344CB8AC3E}">
-        <p14:creationId xmlns:p14="http://schemas.microsoft.com/office/powerpoint/2010/main" val="980420624"/>
-      </p:ext>
-    </p:extLst>
   </p:cSld>
   <p:clrMapOvr>
     <a:masterClrMapping/>
@@ -1327,18 +1269,12 @@
           <a:p>
             <a:fld id="{10A842D5-3964-4D1E-A2D9-636432CD0AB9}" type="slidenum">
               <a:rPr lang="zh-CN" altLang="en-US" smtClean="0"/>
-              <a:t>2</a:t>
             </a:fld>
             <a:endParaRPr lang="zh-CN" altLang="en-US"/>
           </a:p>
         </p:txBody>
       </p:sp>
     </p:spTree>
-    <p:extLst>
-      <p:ext uri="{BB962C8B-B14F-4D97-AF65-F5344CB8AC3E}">
-        <p14:creationId xmlns:p14="http://schemas.microsoft.com/office/powerpoint/2010/main" val="970380484"/>
-      </p:ext>
-    </p:extLst>
   </p:cSld>
   <p:clrMapOvr>
     <a:masterClrMapping/>
@@ -1411,18 +1347,12 @@
           <a:p>
             <a:fld id="{10A842D5-3964-4D1E-A2D9-636432CD0AB9}" type="slidenum">
               <a:rPr lang="zh-CN" altLang="en-US" smtClean="0"/>
-              <a:t>3</a:t>
             </a:fld>
             <a:endParaRPr lang="zh-CN" altLang="en-US"/>
           </a:p>
         </p:txBody>
       </p:sp>
     </p:spTree>
-    <p:extLst>
-      <p:ext uri="{BB962C8B-B14F-4D97-AF65-F5344CB8AC3E}">
-        <p14:creationId xmlns:p14="http://schemas.microsoft.com/office/powerpoint/2010/main" val="2798983801"/>
-      </p:ext>
-    </p:extLst>
   </p:cSld>
   <p:clrMapOvr>
     <a:masterClrMapping/>
@@ -1500,8 +1430,6 @@
                 </a:solidFill>
                 <a:latin typeface="等线"/>
               </a:rPr>
-              <a:pPr/>
-              <a:t>4</a:t>
             </a:fld>
             <a:endParaRPr lang="zh-CN" altLang="en-US">
               <a:solidFill>
@@ -1513,11 +1441,6 @@
         </p:txBody>
       </p:sp>
     </p:spTree>
-    <p:extLst>
-      <p:ext uri="{BB962C8B-B14F-4D97-AF65-F5344CB8AC3E}">
-        <p14:creationId xmlns:p14="http://schemas.microsoft.com/office/powerpoint/2010/main" val="3553349823"/>
-      </p:ext>
-    </p:extLst>
   </p:cSld>
   <p:clrMapOvr>
     <a:masterClrMapping/>
@@ -1590,18 +1513,12 @@
           <a:p>
             <a:fld id="{A92EB20A-403F-44E9-9F40-29DD8395CE08}" type="slidenum">
               <a:rPr lang="zh-CN" altLang="en-US" smtClean="0"/>
-              <a:t>5</a:t>
             </a:fld>
             <a:endParaRPr lang="zh-CN" altLang="en-US"/>
           </a:p>
         </p:txBody>
       </p:sp>
     </p:spTree>
-    <p:extLst>
-      <p:ext uri="{BB962C8B-B14F-4D97-AF65-F5344CB8AC3E}">
-        <p14:creationId xmlns:p14="http://schemas.microsoft.com/office/powerpoint/2010/main" val="3428697342"/>
-      </p:ext>
-    </p:extLst>
   </p:cSld>
   <p:clrMapOvr>
     <a:masterClrMapping/>
@@ -1654,8 +1571,6 @@
               <a:srgbClr val="000000"/>
             </a:solidFill>
             <a:miter lim="800000"/>
-            <a:headEnd/>
-            <a:tailEnd/>
           </a:ln>
           <a:extLst>
             <a:ext uri="{909E8E84-426E-40DD-AFC4-6F175D3DCCD1}">
@@ -1881,12 +1796,6 @@
               <a:rPr lang="zh-CN" altLang="en-US">
                 <a:ea typeface="微软雅黑" panose="020B0503020204020204" pitchFamily="34" charset="-122"/>
               </a:rPr>
-              <a:pPr algn="r" eaLnBrk="1" latinLnBrk="1" hangingPunct="1">
-                <a:spcBef>
-                  <a:spcPct val="0"/>
-                </a:spcBef>
-              </a:pPr>
-              <a:t>7</a:t>
             </a:fld>
             <a:endParaRPr lang="zh-CN" altLang="en-US" dirty="0">
               <a:ea typeface="微软雅黑" panose="020B0503020204020204" pitchFamily="34" charset="-122"/>
@@ -1895,11 +1804,6 @@
         </p:txBody>
       </p:sp>
     </p:spTree>
-    <p:extLst>
-      <p:ext uri="{BB962C8B-B14F-4D97-AF65-F5344CB8AC3E}">
-        <p14:creationId xmlns:p14="http://schemas.microsoft.com/office/powerpoint/2010/main" val="457789000"/>
-      </p:ext>
-    </p:extLst>
   </p:cSld>
   <p:clrMapOvr>
     <a:overrideClrMapping bg1="lt1" tx1="dk1" bg2="lt2" tx2="dk2" accent1="accent1" accent2="accent2" accent3="accent3" accent4="accent4" accent5="accent5" accent6="accent6" hlink="hlink" folHlink="folHlink"/>
@@ -1952,8 +1856,6 @@
               <a:srgbClr val="000000"/>
             </a:solidFill>
             <a:miter lim="800000"/>
-            <a:headEnd/>
-            <a:tailEnd/>
           </a:ln>
           <a:extLst>
             <a:ext uri="{909E8E84-426E-40DD-AFC4-6F175D3DCCD1}">
@@ -2179,12 +2081,6 @@
               <a:rPr lang="zh-CN" altLang="en-US">
                 <a:ea typeface="微软雅黑" panose="020B0503020204020204" pitchFamily="34" charset="-122"/>
               </a:rPr>
-              <a:pPr algn="r" eaLnBrk="1" latinLnBrk="1" hangingPunct="1">
-                <a:spcBef>
-                  <a:spcPct val="0"/>
-                </a:spcBef>
-              </a:pPr>
-              <a:t>8</a:t>
             </a:fld>
             <a:endParaRPr lang="zh-CN" altLang="en-US" dirty="0">
               <a:ea typeface="微软雅黑" panose="020B0503020204020204" pitchFamily="34" charset="-122"/>
@@ -2193,11 +2089,6 @@
         </p:txBody>
       </p:sp>
     </p:spTree>
-    <p:extLst>
-      <p:ext uri="{BB962C8B-B14F-4D97-AF65-F5344CB8AC3E}">
-        <p14:creationId xmlns:p14="http://schemas.microsoft.com/office/powerpoint/2010/main" val="2036763570"/>
-      </p:ext>
-    </p:extLst>
   </p:cSld>
   <p:clrMapOvr>
     <a:overrideClrMapping bg1="lt1" tx1="dk1" bg2="lt2" tx2="dk2" accent1="accent1" accent2="accent2" accent3="accent3" accent4="accent4" accent5="accent5" accent6="accent6" hlink="hlink" folHlink="folHlink"/>
@@ -2250,8 +2141,6 @@
               <a:srgbClr val="000000"/>
             </a:solidFill>
             <a:miter lim="800000"/>
-            <a:headEnd/>
-            <a:tailEnd/>
           </a:ln>
           <a:extLst>
             <a:ext uri="{909E8E84-426E-40DD-AFC4-6F175D3DCCD1}">
@@ -2477,12 +2366,6 @@
               <a:rPr lang="zh-CN" altLang="en-US">
                 <a:ea typeface="微软雅黑" panose="020B0503020204020204" pitchFamily="34" charset="-122"/>
               </a:rPr>
-              <a:pPr algn="r" eaLnBrk="1" latinLnBrk="1" hangingPunct="1">
-                <a:spcBef>
-                  <a:spcPct val="0"/>
-                </a:spcBef>
-              </a:pPr>
-              <a:t>9</a:t>
             </a:fld>
             <a:endParaRPr lang="zh-CN" altLang="en-US" dirty="0">
               <a:ea typeface="微软雅黑" panose="020B0503020204020204" pitchFamily="34" charset="-122"/>
@@ -2491,11 +2374,6 @@
         </p:txBody>
       </p:sp>
     </p:spTree>
-    <p:extLst>
-      <p:ext uri="{BB962C8B-B14F-4D97-AF65-F5344CB8AC3E}">
-        <p14:creationId xmlns:p14="http://schemas.microsoft.com/office/powerpoint/2010/main" val="678141843"/>
-      </p:ext>
-    </p:extLst>
   </p:cSld>
   <p:clrMapOvr>
     <a:overrideClrMapping bg1="lt1" tx1="dk1" bg2="lt2" tx2="dk2" accent1="accent1" accent2="accent2" accent3="accent3" accent4="accent4" accent5="accent5" accent6="accent6" hlink="hlink" folHlink="folHlink"/>
@@ -2548,8 +2426,6 @@
               <a:srgbClr val="000000"/>
             </a:solidFill>
             <a:miter lim="800000"/>
-            <a:headEnd/>
-            <a:tailEnd/>
           </a:ln>
           <a:extLst>
             <a:ext uri="{909E8E84-426E-40DD-AFC4-6F175D3DCCD1}">
@@ -2775,12 +2651,6 @@
               <a:rPr lang="zh-CN" altLang="en-US">
                 <a:ea typeface="微软雅黑" panose="020B0503020204020204" pitchFamily="34" charset="-122"/>
               </a:rPr>
-              <a:pPr algn="r" eaLnBrk="1" latinLnBrk="1" hangingPunct="1">
-                <a:spcBef>
-                  <a:spcPct val="0"/>
-                </a:spcBef>
-              </a:pPr>
-              <a:t>10</a:t>
             </a:fld>
             <a:endParaRPr lang="zh-CN" altLang="en-US" dirty="0">
               <a:ea typeface="微软雅黑" panose="020B0503020204020204" pitchFamily="34" charset="-122"/>
@@ -2789,11 +2659,6 @@
         </p:txBody>
       </p:sp>
     </p:spTree>
-    <p:extLst>
-      <p:ext uri="{BB962C8B-B14F-4D97-AF65-F5344CB8AC3E}">
-        <p14:creationId xmlns:p14="http://schemas.microsoft.com/office/powerpoint/2010/main" val="542148448"/>
-      </p:ext>
-    </p:extLst>
   </p:cSld>
   <p:clrMapOvr>
     <a:overrideClrMapping bg1="lt1" tx1="dk1" bg2="lt2" tx2="dk2" accent1="accent1" accent2="accent2" accent3="accent3" accent4="accent4" accent5="accent5" accent6="accent6" hlink="hlink" folHlink="folHlink"/>
@@ -2819,11 +2684,6 @@
         </a:xfrm>
       </p:grpSpPr>
     </p:spTree>
-    <p:extLst>
-      <p:ext uri="{BB962C8B-B14F-4D97-AF65-F5344CB8AC3E}">
-        <p14:creationId xmlns:p14="http://schemas.microsoft.com/office/powerpoint/2010/main" val="2943357729"/>
-      </p:ext>
-    </p:extLst>
   </p:cSld>
   <p:clrMapOvr>
     <a:masterClrMapping/>
@@ -2938,6 +2798,7 @@
               <a:rPr lang="en-GB"/>
               <a:t>Click to edit Master text styles</a:t>
             </a:r>
+            <a:endParaRPr lang="en-GB"/>
           </a:p>
         </p:txBody>
       </p:sp>
@@ -2966,6 +2827,7 @@
               <a:rPr lang="en-GB"/>
               <a:t>Click to edit Master text styles</a:t>
             </a:r>
+            <a:endParaRPr lang="en-GB"/>
           </a:p>
           <a:p>
             <a:pPr lvl="1"/>
@@ -2973,6 +2835,7 @@
               <a:rPr lang="en-GB"/>
               <a:t>Second level</a:t>
             </a:r>
+            <a:endParaRPr lang="en-GB"/>
           </a:p>
           <a:p>
             <a:pPr lvl="2"/>
@@ -2980,6 +2843,7 @@
               <a:rPr lang="en-GB"/>
               <a:t>Third level</a:t>
             </a:r>
+            <a:endParaRPr lang="en-GB"/>
           </a:p>
           <a:p>
             <a:pPr lvl="3"/>
@@ -2987,6 +2851,7 @@
               <a:rPr lang="en-GB"/>
               <a:t>Fourth level</a:t>
             </a:r>
+            <a:endParaRPr lang="en-GB"/>
           </a:p>
           <a:p>
             <a:pPr lvl="4"/>
@@ -3060,6 +2925,7 @@
               <a:rPr lang="en-GB"/>
               <a:t>Click to edit Master text styles</a:t>
             </a:r>
+            <a:endParaRPr lang="en-GB"/>
           </a:p>
         </p:txBody>
       </p:sp>
@@ -3088,6 +2954,7 @@
               <a:rPr lang="en-GB"/>
               <a:t>Click to edit Master text styles</a:t>
             </a:r>
+            <a:endParaRPr lang="en-GB"/>
           </a:p>
           <a:p>
             <a:pPr lvl="1"/>
@@ -3095,6 +2962,7 @@
               <a:rPr lang="en-GB"/>
               <a:t>Second level</a:t>
             </a:r>
+            <a:endParaRPr lang="en-GB"/>
           </a:p>
           <a:p>
             <a:pPr lvl="2"/>
@@ -3102,6 +2970,7 @@
               <a:rPr lang="en-GB"/>
               <a:t>Third level</a:t>
             </a:r>
+            <a:endParaRPr lang="en-GB"/>
           </a:p>
           <a:p>
             <a:pPr lvl="3"/>
@@ -3109,6 +2978,7 @@
               <a:rPr lang="en-GB"/>
               <a:t>Fourth level</a:t>
             </a:r>
+            <a:endParaRPr lang="en-GB"/>
           </a:p>
           <a:p>
             <a:pPr lvl="4"/>
@@ -3137,7 +3007,6 @@
           <a:p>
             <a:fld id="{846CE7D5-CF57-46EF-B807-FDD0502418D4}" type="datetimeFigureOut">
               <a:rPr lang="en-GB" smtClean="0"/>
-              <a:t>09/04/2022</a:t>
             </a:fld>
             <a:endParaRPr lang="en-GB"/>
           </a:p>
@@ -3179,18 +3048,12 @@
           <a:p>
             <a:fld id="{330EA680-D336-4FF7-8B7A-9848BB0A1C32}" type="slidenum">
               <a:rPr lang="en-GB" smtClean="0"/>
-              <a:t>‹#›</a:t>
             </a:fld>
             <a:endParaRPr lang="en-GB"/>
           </a:p>
         </p:txBody>
       </p:sp>
     </p:spTree>
-    <p:extLst>
-      <p:ext uri="{BB962C8B-B14F-4D97-AF65-F5344CB8AC3E}">
-        <p14:creationId xmlns:p14="http://schemas.microsoft.com/office/powerpoint/2010/main" val="1290922124"/>
-      </p:ext>
-    </p:extLst>
   </p:cSld>
   <p:clrMapOvr>
     <a:masterClrMapping/>
@@ -3255,7 +3118,6 @@
           <a:p>
             <a:fld id="{846CE7D5-CF57-46EF-B807-FDD0502418D4}" type="datetimeFigureOut">
               <a:rPr lang="en-GB" smtClean="0"/>
-              <a:t>09/04/2022</a:t>
             </a:fld>
             <a:endParaRPr lang="en-GB"/>
           </a:p>
@@ -3297,18 +3159,12 @@
           <a:p>
             <a:fld id="{330EA680-D336-4FF7-8B7A-9848BB0A1C32}" type="slidenum">
               <a:rPr lang="en-GB" smtClean="0"/>
-              <a:t>‹#›</a:t>
             </a:fld>
             <a:endParaRPr lang="en-GB"/>
           </a:p>
         </p:txBody>
       </p:sp>
     </p:spTree>
-    <p:extLst>
-      <p:ext uri="{BB962C8B-B14F-4D97-AF65-F5344CB8AC3E}">
-        <p14:creationId xmlns:p14="http://schemas.microsoft.com/office/powerpoint/2010/main" val="1908598902"/>
-      </p:ext>
-    </p:extLst>
   </p:cSld>
   <p:clrMapOvr>
     <a:masterClrMapping/>
@@ -3350,7 +3206,6 @@
           <a:p>
             <a:fld id="{846CE7D5-CF57-46EF-B807-FDD0502418D4}" type="datetimeFigureOut">
               <a:rPr lang="en-GB" smtClean="0"/>
-              <a:t>09/04/2022</a:t>
             </a:fld>
             <a:endParaRPr lang="en-GB"/>
           </a:p>
@@ -3392,18 +3247,12 @@
           <a:p>
             <a:fld id="{330EA680-D336-4FF7-8B7A-9848BB0A1C32}" type="slidenum">
               <a:rPr lang="en-GB" smtClean="0"/>
-              <a:t>‹#›</a:t>
             </a:fld>
             <a:endParaRPr lang="en-GB"/>
           </a:p>
         </p:txBody>
       </p:sp>
     </p:spTree>
-    <p:extLst>
-      <p:ext uri="{BB962C8B-B14F-4D97-AF65-F5344CB8AC3E}">
-        <p14:creationId xmlns:p14="http://schemas.microsoft.com/office/powerpoint/2010/main" val="159664289"/>
-      </p:ext>
-    </p:extLst>
   </p:cSld>
   <p:clrMapOvr>
     <a:masterClrMapping/>
@@ -3513,6 +3362,7 @@
               <a:rPr lang="en-GB"/>
               <a:t>Click to edit Master text styles</a:t>
             </a:r>
+            <a:endParaRPr lang="en-GB"/>
           </a:p>
           <a:p>
             <a:pPr lvl="1"/>
@@ -3520,6 +3370,7 @@
               <a:rPr lang="en-GB"/>
               <a:t>Second level</a:t>
             </a:r>
+            <a:endParaRPr lang="en-GB"/>
           </a:p>
           <a:p>
             <a:pPr lvl="2"/>
@@ -3527,6 +3378,7 @@
               <a:rPr lang="en-GB"/>
               <a:t>Third level</a:t>
             </a:r>
+            <a:endParaRPr lang="en-GB"/>
           </a:p>
           <a:p>
             <a:pPr lvl="3"/>
@@ -3534,6 +3386,7 @@
               <a:rPr lang="en-GB"/>
               <a:t>Fourth level</a:t>
             </a:r>
+            <a:endParaRPr lang="en-GB"/>
           </a:p>
           <a:p>
             <a:pPr lvl="4"/>
@@ -3607,6 +3460,7 @@
               <a:rPr lang="en-GB"/>
               <a:t>Click to edit Master text styles</a:t>
             </a:r>
+            <a:endParaRPr lang="en-GB"/>
           </a:p>
         </p:txBody>
       </p:sp>
@@ -3627,7 +3481,6 @@
           <a:p>
             <a:fld id="{846CE7D5-CF57-46EF-B807-FDD0502418D4}" type="datetimeFigureOut">
               <a:rPr lang="en-GB" smtClean="0"/>
-              <a:t>09/04/2022</a:t>
             </a:fld>
             <a:endParaRPr lang="en-GB"/>
           </a:p>
@@ -3669,18 +3522,12 @@
           <a:p>
             <a:fld id="{330EA680-D336-4FF7-8B7A-9848BB0A1C32}" type="slidenum">
               <a:rPr lang="en-GB" smtClean="0"/>
-              <a:t>‹#›</a:t>
             </a:fld>
             <a:endParaRPr lang="en-GB"/>
           </a:p>
         </p:txBody>
       </p:sp>
     </p:spTree>
-    <p:extLst>
-      <p:ext uri="{BB962C8B-B14F-4D97-AF65-F5344CB8AC3E}">
-        <p14:creationId xmlns:p14="http://schemas.microsoft.com/office/powerpoint/2010/main" val="2591865860"/>
-      </p:ext>
-    </p:extLst>
   </p:cSld>
   <p:clrMapOvr>
     <a:masterClrMapping/>
@@ -3864,6 +3711,7 @@
               <a:rPr lang="en-GB"/>
               <a:t>Click to edit Master text styles</a:t>
             </a:r>
+            <a:endParaRPr lang="en-GB"/>
           </a:p>
         </p:txBody>
       </p:sp>
@@ -3884,7 +3732,6 @@
           <a:p>
             <a:fld id="{846CE7D5-CF57-46EF-B807-FDD0502418D4}" type="datetimeFigureOut">
               <a:rPr lang="en-GB" smtClean="0"/>
-              <a:t>09/04/2022</a:t>
             </a:fld>
             <a:endParaRPr lang="en-GB"/>
           </a:p>
@@ -3926,18 +3773,12 @@
           <a:p>
             <a:fld id="{330EA680-D336-4FF7-8B7A-9848BB0A1C32}" type="slidenum">
               <a:rPr lang="en-GB" smtClean="0"/>
-              <a:t>‹#›</a:t>
             </a:fld>
             <a:endParaRPr lang="en-GB"/>
           </a:p>
         </p:txBody>
       </p:sp>
     </p:spTree>
-    <p:extLst>
-      <p:ext uri="{BB962C8B-B14F-4D97-AF65-F5344CB8AC3E}">
-        <p14:creationId xmlns:p14="http://schemas.microsoft.com/office/powerpoint/2010/main" val="2764882175"/>
-      </p:ext>
-    </p:extLst>
   </p:cSld>
   <p:clrMapOvr>
     <a:masterClrMapping/>
@@ -4005,6 +3846,7 @@
               <a:rPr lang="en-GB"/>
               <a:t>Click to edit Master text styles</a:t>
             </a:r>
+            <a:endParaRPr lang="en-GB"/>
           </a:p>
           <a:p>
             <a:pPr lvl="1"/>
@@ -4012,6 +3854,7 @@
               <a:rPr lang="en-GB"/>
               <a:t>Second level</a:t>
             </a:r>
+            <a:endParaRPr lang="en-GB"/>
           </a:p>
           <a:p>
             <a:pPr lvl="2"/>
@@ -4019,6 +3862,7 @@
               <a:rPr lang="en-GB"/>
               <a:t>Third level</a:t>
             </a:r>
+            <a:endParaRPr lang="en-GB"/>
           </a:p>
           <a:p>
             <a:pPr lvl="3"/>
@@ -4026,6 +3870,7 @@
               <a:rPr lang="en-GB"/>
               <a:t>Fourth level</a:t>
             </a:r>
+            <a:endParaRPr lang="en-GB"/>
           </a:p>
           <a:p>
             <a:pPr lvl="4"/>
@@ -4054,7 +3899,6 @@
           <a:p>
             <a:fld id="{846CE7D5-CF57-46EF-B807-FDD0502418D4}" type="datetimeFigureOut">
               <a:rPr lang="en-GB" smtClean="0"/>
-              <a:t>09/04/2022</a:t>
             </a:fld>
             <a:endParaRPr lang="en-GB"/>
           </a:p>
@@ -4096,18 +3940,12 @@
           <a:p>
             <a:fld id="{330EA680-D336-4FF7-8B7A-9848BB0A1C32}" type="slidenum">
               <a:rPr lang="en-GB" smtClean="0"/>
-              <a:t>‹#›</a:t>
             </a:fld>
             <a:endParaRPr lang="en-GB"/>
           </a:p>
         </p:txBody>
       </p:sp>
     </p:spTree>
-    <p:extLst>
-      <p:ext uri="{BB962C8B-B14F-4D97-AF65-F5344CB8AC3E}">
-        <p14:creationId xmlns:p14="http://schemas.microsoft.com/office/powerpoint/2010/main" val="1962989782"/>
-      </p:ext>
-    </p:extLst>
   </p:cSld>
   <p:clrMapOvr>
     <a:masterClrMapping/>
@@ -4185,6 +4023,7 @@
               <a:rPr lang="en-GB"/>
               <a:t>Click to edit Master text styles</a:t>
             </a:r>
+            <a:endParaRPr lang="en-GB"/>
           </a:p>
           <a:p>
             <a:pPr lvl="1"/>
@@ -4192,6 +4031,7 @@
               <a:rPr lang="en-GB"/>
               <a:t>Second level</a:t>
             </a:r>
+            <a:endParaRPr lang="en-GB"/>
           </a:p>
           <a:p>
             <a:pPr lvl="2"/>
@@ -4199,6 +4039,7 @@
               <a:rPr lang="en-GB"/>
               <a:t>Third level</a:t>
             </a:r>
+            <a:endParaRPr lang="en-GB"/>
           </a:p>
           <a:p>
             <a:pPr lvl="3"/>
@@ -4206,6 +4047,7 @@
               <a:rPr lang="en-GB"/>
               <a:t>Fourth level</a:t>
             </a:r>
+            <a:endParaRPr lang="en-GB"/>
           </a:p>
           <a:p>
             <a:pPr lvl="4"/>
@@ -4234,7 +4076,6 @@
           <a:p>
             <a:fld id="{846CE7D5-CF57-46EF-B807-FDD0502418D4}" type="datetimeFigureOut">
               <a:rPr lang="en-GB" smtClean="0"/>
-              <a:t>09/04/2022</a:t>
             </a:fld>
             <a:endParaRPr lang="en-GB"/>
           </a:p>
@@ -4276,18 +4117,12 @@
           <a:p>
             <a:fld id="{330EA680-D336-4FF7-8B7A-9848BB0A1C32}" type="slidenum">
               <a:rPr lang="en-GB" smtClean="0"/>
-              <a:t>‹#›</a:t>
             </a:fld>
             <a:endParaRPr lang="en-GB"/>
           </a:p>
         </p:txBody>
       </p:sp>
     </p:spTree>
-    <p:extLst>
-      <p:ext uri="{BB962C8B-B14F-4D97-AF65-F5344CB8AC3E}">
-        <p14:creationId xmlns:p14="http://schemas.microsoft.com/office/powerpoint/2010/main" val="870353388"/>
-      </p:ext>
-    </p:extLst>
   </p:cSld>
   <p:clrMapOvr>
     <a:masterClrMapping/>
@@ -4313,11 +4148,6 @@
         </a:xfrm>
       </p:grpSpPr>
     </p:spTree>
-    <p:extLst>
-      <p:ext uri="{BB962C8B-B14F-4D97-AF65-F5344CB8AC3E}">
-        <p14:creationId xmlns:p14="http://schemas.microsoft.com/office/powerpoint/2010/main" val="3503378847"/>
-      </p:ext>
-    </p:extLst>
   </p:cSld>
   <p:clrMapOvr>
     <a:masterClrMapping/>
@@ -4346,11 +4176,6 @@
         </a:xfrm>
       </p:grpSpPr>
     </p:spTree>
-    <p:extLst>
-      <p:ext uri="{BB962C8B-B14F-4D97-AF65-F5344CB8AC3E}">
-        <p14:creationId xmlns:p14="http://schemas.microsoft.com/office/powerpoint/2010/main" val="165287701"/>
-      </p:ext>
-    </p:extLst>
   </p:cSld>
   <p:clrMapOvr>
     <a:masterClrMapping/>
@@ -4377,13 +4202,7 @@
       </p:grpSpPr>
       <p:sp>
         <p:nvSpPr>
-          <p:cNvPr id="2" name="日期占位符 1">
-            <a:extLst>
-              <a:ext uri="{FF2B5EF4-FFF2-40B4-BE49-F238E27FC236}">
-                <a16:creationId xmlns:a16="http://schemas.microsoft.com/office/drawing/2014/main" id="{A9F05F9E-E3BF-4D55-9B21-0CA8CF92D8FB}"/>
-              </a:ext>
-            </a:extLst>
-          </p:cNvPr>
+          <p:cNvPr id="2" name="日期占位符 1"/>
           <p:cNvSpPr>
             <a:spLocks noGrp="1"/>
           </p:cNvSpPr>
@@ -4418,8 +4237,6 @@
                   </a:prstClr>
                 </a:solidFill>
               </a:rPr>
-              <a:pPr/>
-              <a:t>2022/4/9</a:t>
             </a:fld>
             <a:endParaRPr lang="zh-CN" altLang="en-US" dirty="0">
               <a:solidFill>
@@ -4433,13 +4250,7 @@
       </p:sp>
       <p:sp>
         <p:nvSpPr>
-          <p:cNvPr id="3" name="页脚占位符 2">
-            <a:extLst>
-              <a:ext uri="{FF2B5EF4-FFF2-40B4-BE49-F238E27FC236}">
-                <a16:creationId xmlns:a16="http://schemas.microsoft.com/office/drawing/2014/main" id="{765DDF11-6287-4228-B667-23360537339F}"/>
-              </a:ext>
-            </a:extLst>
-          </p:cNvPr>
+          <p:cNvPr id="3" name="页脚占位符 2"/>
           <p:cNvSpPr>
             <a:spLocks noGrp="1"/>
           </p:cNvSpPr>
@@ -4478,13 +4289,7 @@
       </p:sp>
       <p:sp>
         <p:nvSpPr>
-          <p:cNvPr id="4" name="灯片编号占位符 3">
-            <a:extLst>
-              <a:ext uri="{FF2B5EF4-FFF2-40B4-BE49-F238E27FC236}">
-                <a16:creationId xmlns:a16="http://schemas.microsoft.com/office/drawing/2014/main" id="{F495C292-412B-4065-AC0A-580E49FABDC8}"/>
-              </a:ext>
-            </a:extLst>
-          </p:cNvPr>
+          <p:cNvPr id="4" name="灯片编号占位符 3"/>
           <p:cNvSpPr>
             <a:spLocks noGrp="1"/>
           </p:cNvSpPr>
@@ -4519,8 +4324,6 @@
                   </a:prstClr>
                 </a:solidFill>
               </a:rPr>
-              <a:pPr/>
-              <a:t>‹#›</a:t>
             </a:fld>
             <a:endParaRPr lang="zh-CN" altLang="en-US" dirty="0">
               <a:solidFill>
@@ -4533,11 +4336,6 @@
         </p:txBody>
       </p:sp>
     </p:spTree>
-    <p:extLst>
-      <p:ext uri="{BB962C8B-B14F-4D97-AF65-F5344CB8AC3E}">
-        <p14:creationId xmlns:p14="http://schemas.microsoft.com/office/powerpoint/2010/main" val="3556793317"/>
-      </p:ext>
-    </p:extLst>
   </p:cSld>
   <p:clrMapOvr>
     <a:masterClrMapping/>
@@ -4563,11 +4361,6 @@
         </a:xfrm>
       </p:grpSpPr>
     </p:spTree>
-    <p:extLst>
-      <p:ext uri="{BB962C8B-B14F-4D97-AF65-F5344CB8AC3E}">
-        <p14:creationId xmlns:p14="http://schemas.microsoft.com/office/powerpoint/2010/main" val="3620933974"/>
-      </p:ext>
-    </p:extLst>
   </p:cSld>
   <p:clrMapOvr>
     <a:masterClrMapping/>
@@ -4596,11 +4389,6 @@
         </a:xfrm>
       </p:grpSpPr>
     </p:spTree>
-    <p:extLst>
-      <p:ext uri="{BB962C8B-B14F-4D97-AF65-F5344CB8AC3E}">
-        <p14:creationId xmlns:p14="http://schemas.microsoft.com/office/powerpoint/2010/main" val="1084143640"/>
-      </p:ext>
-    </p:extLst>
   </p:cSld>
   <p:clrMapOvr>
     <a:masterClrMapping/>
@@ -4739,7 +4527,6 @@
           <a:p>
             <a:fld id="{846CE7D5-CF57-46EF-B807-FDD0502418D4}" type="datetimeFigureOut">
               <a:rPr lang="en-GB" smtClean="0"/>
-              <a:t>09/04/2022</a:t>
             </a:fld>
             <a:endParaRPr lang="en-GB"/>
           </a:p>
@@ -4781,18 +4568,12 @@
           <a:p>
             <a:fld id="{330EA680-D336-4FF7-8B7A-9848BB0A1C32}" type="slidenum">
               <a:rPr lang="en-GB" smtClean="0"/>
-              <a:t>‹#›</a:t>
             </a:fld>
             <a:endParaRPr lang="en-GB"/>
           </a:p>
         </p:txBody>
       </p:sp>
     </p:spTree>
-    <p:extLst>
-      <p:ext uri="{BB962C8B-B14F-4D97-AF65-F5344CB8AC3E}">
-        <p14:creationId xmlns:p14="http://schemas.microsoft.com/office/powerpoint/2010/main" val="2729019222"/>
-      </p:ext>
-    </p:extLst>
   </p:cSld>
   <p:clrMapOvr>
     <a:masterClrMapping/>
@@ -4860,6 +4641,7 @@
               <a:rPr lang="en-GB"/>
               <a:t>Click to edit Master text styles</a:t>
             </a:r>
+            <a:endParaRPr lang="en-GB"/>
           </a:p>
           <a:p>
             <a:pPr lvl="1"/>
@@ -4867,6 +4649,7 @@
               <a:rPr lang="en-GB"/>
               <a:t>Second level</a:t>
             </a:r>
+            <a:endParaRPr lang="en-GB"/>
           </a:p>
           <a:p>
             <a:pPr lvl="2"/>
@@ -4874,6 +4657,7 @@
               <a:rPr lang="en-GB"/>
               <a:t>Third level</a:t>
             </a:r>
+            <a:endParaRPr lang="en-GB"/>
           </a:p>
           <a:p>
             <a:pPr lvl="3"/>
@@ -4881,6 +4665,7 @@
               <a:rPr lang="en-GB"/>
               <a:t>Fourth level</a:t>
             </a:r>
+            <a:endParaRPr lang="en-GB"/>
           </a:p>
           <a:p>
             <a:pPr lvl="4"/>
@@ -4909,7 +4694,6 @@
           <a:p>
             <a:fld id="{846CE7D5-CF57-46EF-B807-FDD0502418D4}" type="datetimeFigureOut">
               <a:rPr lang="en-GB" smtClean="0"/>
-              <a:t>09/04/2022</a:t>
             </a:fld>
             <a:endParaRPr lang="en-GB"/>
           </a:p>
@@ -4951,18 +4735,12 @@
           <a:p>
             <a:fld id="{330EA680-D336-4FF7-8B7A-9848BB0A1C32}" type="slidenum">
               <a:rPr lang="en-GB" smtClean="0"/>
-              <a:t>‹#›</a:t>
             </a:fld>
             <a:endParaRPr lang="en-GB"/>
           </a:p>
         </p:txBody>
       </p:sp>
     </p:spTree>
-    <p:extLst>
-      <p:ext uri="{BB962C8B-B14F-4D97-AF65-F5344CB8AC3E}">
-        <p14:creationId xmlns:p14="http://schemas.microsoft.com/office/powerpoint/2010/main" val="714877439"/>
-      </p:ext>
-    </p:extLst>
   </p:cSld>
   <p:clrMapOvr>
     <a:masterClrMapping/>
@@ -5135,6 +4913,7 @@
               <a:rPr lang="en-GB"/>
               <a:t>Click to edit Master text styles</a:t>
             </a:r>
+            <a:endParaRPr lang="en-GB"/>
           </a:p>
         </p:txBody>
       </p:sp>
@@ -5155,7 +4934,6 @@
           <a:p>
             <a:fld id="{846CE7D5-CF57-46EF-B807-FDD0502418D4}" type="datetimeFigureOut">
               <a:rPr lang="en-GB" smtClean="0"/>
-              <a:t>09/04/2022</a:t>
             </a:fld>
             <a:endParaRPr lang="en-GB"/>
           </a:p>
@@ -5197,18 +4975,12 @@
           <a:p>
             <a:fld id="{330EA680-D336-4FF7-8B7A-9848BB0A1C32}" type="slidenum">
               <a:rPr lang="en-GB" smtClean="0"/>
-              <a:t>‹#›</a:t>
             </a:fld>
             <a:endParaRPr lang="en-GB"/>
           </a:p>
         </p:txBody>
       </p:sp>
     </p:spTree>
-    <p:extLst>
-      <p:ext uri="{BB962C8B-B14F-4D97-AF65-F5344CB8AC3E}">
-        <p14:creationId xmlns:p14="http://schemas.microsoft.com/office/powerpoint/2010/main" val="1473387757"/>
-      </p:ext>
-    </p:extLst>
   </p:cSld>
   <p:clrMapOvr>
     <a:masterClrMapping/>
@@ -5281,6 +5053,7 @@
               <a:rPr lang="en-GB"/>
               <a:t>Click to edit Master text styles</a:t>
             </a:r>
+            <a:endParaRPr lang="en-GB"/>
           </a:p>
           <a:p>
             <a:pPr lvl="1"/>
@@ -5288,6 +5061,7 @@
               <a:rPr lang="en-GB"/>
               <a:t>Second level</a:t>
             </a:r>
+            <a:endParaRPr lang="en-GB"/>
           </a:p>
           <a:p>
             <a:pPr lvl="2"/>
@@ -5295,6 +5069,7 @@
               <a:rPr lang="en-GB"/>
               <a:t>Third level</a:t>
             </a:r>
+            <a:endParaRPr lang="en-GB"/>
           </a:p>
           <a:p>
             <a:pPr lvl="3"/>
@@ -5302,6 +5077,7 @@
               <a:rPr lang="en-GB"/>
               <a:t>Fourth level</a:t>
             </a:r>
+            <a:endParaRPr lang="en-GB"/>
           </a:p>
           <a:p>
             <a:pPr lvl="4"/>
@@ -5338,6 +5114,7 @@
               <a:rPr lang="en-GB"/>
               <a:t>Click to edit Master text styles</a:t>
             </a:r>
+            <a:endParaRPr lang="en-GB"/>
           </a:p>
           <a:p>
             <a:pPr lvl="1"/>
@@ -5345,6 +5122,7 @@
               <a:rPr lang="en-GB"/>
               <a:t>Second level</a:t>
             </a:r>
+            <a:endParaRPr lang="en-GB"/>
           </a:p>
           <a:p>
             <a:pPr lvl="2"/>
@@ -5352,6 +5130,7 @@
               <a:rPr lang="en-GB"/>
               <a:t>Third level</a:t>
             </a:r>
+            <a:endParaRPr lang="en-GB"/>
           </a:p>
           <a:p>
             <a:pPr lvl="3"/>
@@ -5359,6 +5138,7 @@
               <a:rPr lang="en-GB"/>
               <a:t>Fourth level</a:t>
             </a:r>
+            <a:endParaRPr lang="en-GB"/>
           </a:p>
           <a:p>
             <a:pPr lvl="4"/>
@@ -5387,7 +5167,6 @@
           <a:p>
             <a:fld id="{846CE7D5-CF57-46EF-B807-FDD0502418D4}" type="datetimeFigureOut">
               <a:rPr lang="en-GB" smtClean="0"/>
-              <a:t>09/04/2022</a:t>
             </a:fld>
             <a:endParaRPr lang="en-GB"/>
           </a:p>
@@ -5429,18 +5208,12 @@
           <a:p>
             <a:fld id="{330EA680-D336-4FF7-8B7A-9848BB0A1C32}" type="slidenum">
               <a:rPr lang="en-GB" smtClean="0"/>
-              <a:t>‹#›</a:t>
             </a:fld>
             <a:endParaRPr lang="en-GB"/>
           </a:p>
         </p:txBody>
       </p:sp>
     </p:spTree>
-    <p:extLst>
-      <p:ext uri="{BB962C8B-B14F-4D97-AF65-F5344CB8AC3E}">
-        <p14:creationId xmlns:p14="http://schemas.microsoft.com/office/powerpoint/2010/main" val="2981908764"/>
-      </p:ext>
-    </p:extLst>
   </p:cSld>
   <p:clrMapOvr>
     <a:masterClrMapping/>
@@ -5479,7 +5252,7 @@
           <p:nvPr userDrawn="1"/>
         </p:nvPicPr>
         <p:blipFill>
-          <a:blip r:embed="rId7">
+          <a:blip r:embed="rId6">
             <a:extLst>
               <a:ext uri="{28A0092B-C50C-407E-A947-70E740481C1C}">
                 <a14:useLocalDpi xmlns:a14="http://schemas.microsoft.com/office/drawing/2010/main" val="0"/>
@@ -5501,19 +5274,14 @@
         </p:spPr>
       </p:pic>
     </p:spTree>
-    <p:extLst>
-      <p:ext uri="{BB962C8B-B14F-4D97-AF65-F5344CB8AC3E}">
-        <p14:creationId xmlns:p14="http://schemas.microsoft.com/office/powerpoint/2010/main" val="1809116354"/>
-      </p:ext>
-    </p:extLst>
   </p:cSld>
   <p:clrMap bg1="lt1" tx1="dk1" bg2="lt2" tx2="dk2" accent1="accent1" accent2="accent2" accent3="accent3" accent4="accent4" accent5="accent5" accent6="accent6" hlink="hlink" folHlink="folHlink"/>
   <p:sldLayoutIdLst>
     <p:sldLayoutId id="2147483649" r:id="rId1"/>
     <p:sldLayoutId id="2147483650" r:id="rId2"/>
     <p:sldLayoutId id="2147483651" r:id="rId3"/>
-    <p:sldLayoutId id="2147483654" r:id="rId4"/>
-    <p:sldLayoutId id="2147483656" r:id="rId5"/>
+    <p:sldLayoutId id="2147483652" r:id="rId4"/>
+    <p:sldLayoutId id="2147483653" r:id="rId5"/>
   </p:sldLayoutIdLst>
   <p:txStyles>
     <p:titleStyle>
@@ -5883,6 +5651,7 @@
               <a:rPr lang="en-GB"/>
               <a:t>Click to edit Master text styles</a:t>
             </a:r>
+            <a:endParaRPr lang="en-GB"/>
           </a:p>
           <a:p>
             <a:pPr lvl="1"/>
@@ -5890,6 +5659,7 @@
               <a:rPr lang="en-GB"/>
               <a:t>Second level</a:t>
             </a:r>
+            <a:endParaRPr lang="en-GB"/>
           </a:p>
           <a:p>
             <a:pPr lvl="2"/>
@@ -5897,6 +5667,7 @@
               <a:rPr lang="en-GB"/>
               <a:t>Third level</a:t>
             </a:r>
+            <a:endParaRPr lang="en-GB"/>
           </a:p>
           <a:p>
             <a:pPr lvl="3"/>
@@ -5904,6 +5675,7 @@
               <a:rPr lang="en-GB"/>
               <a:t>Fourth level</a:t>
             </a:r>
+            <a:endParaRPr lang="en-GB"/>
           </a:p>
           <a:p>
             <a:pPr lvl="4"/>
@@ -5950,7 +5722,6 @@
           <a:p>
             <a:fld id="{846CE7D5-CF57-46EF-B807-FDD0502418D4}" type="datetimeFigureOut">
               <a:rPr lang="en-GB" smtClean="0"/>
-              <a:t>09/04/2022</a:t>
             </a:fld>
             <a:endParaRPr lang="en-GB"/>
           </a:p>
@@ -6028,33 +5799,27 @@
           <a:p>
             <a:fld id="{330EA680-D336-4FF7-8B7A-9848BB0A1C32}" type="slidenum">
               <a:rPr lang="en-GB" smtClean="0"/>
-              <a:t>‹#›</a:t>
             </a:fld>
             <a:endParaRPr lang="en-GB"/>
           </a:p>
         </p:txBody>
       </p:sp>
     </p:spTree>
-    <p:extLst>
-      <p:ext uri="{BB962C8B-B14F-4D97-AF65-F5344CB8AC3E}">
-        <p14:creationId xmlns:p14="http://schemas.microsoft.com/office/powerpoint/2010/main" val="2498149656"/>
-      </p:ext>
-    </p:extLst>
   </p:cSld>
   <p:clrMap bg1="lt1" tx1="dk1" bg2="lt2" tx2="dk2" accent1="accent1" accent2="accent2" accent3="accent3" accent4="accent4" accent5="accent5" accent6="accent6" hlink="hlink" folHlink="folHlink"/>
   <p:sldLayoutIdLst>
-    <p:sldLayoutId id="2147483670" r:id="rId1"/>
-    <p:sldLayoutId id="2147483671" r:id="rId2"/>
-    <p:sldLayoutId id="2147483672" r:id="rId3"/>
-    <p:sldLayoutId id="2147483673" r:id="rId4"/>
-    <p:sldLayoutId id="2147483674" r:id="rId5"/>
-    <p:sldLayoutId id="2147483675" r:id="rId6"/>
-    <p:sldLayoutId id="2147483676" r:id="rId7"/>
-    <p:sldLayoutId id="2147483677" r:id="rId8"/>
-    <p:sldLayoutId id="2147483678" r:id="rId9"/>
-    <p:sldLayoutId id="2147483679" r:id="rId10"/>
-    <p:sldLayoutId id="2147483680" r:id="rId11"/>
-    <p:sldLayoutId id="2147483681" r:id="rId12"/>
+    <p:sldLayoutId id="2147483655" r:id="rId1"/>
+    <p:sldLayoutId id="2147483656" r:id="rId2"/>
+    <p:sldLayoutId id="2147483657" r:id="rId3"/>
+    <p:sldLayoutId id="2147483658" r:id="rId4"/>
+    <p:sldLayoutId id="2147483659" r:id="rId5"/>
+    <p:sldLayoutId id="2147483660" r:id="rId6"/>
+    <p:sldLayoutId id="2147483661" r:id="rId7"/>
+    <p:sldLayoutId id="2147483662" r:id="rId8"/>
+    <p:sldLayoutId id="2147483663" r:id="rId9"/>
+    <p:sldLayoutId id="2147483664" r:id="rId10"/>
+    <p:sldLayoutId id="2147483665" r:id="rId11"/>
+    <p:sldLayoutId id="2147483666" r:id="rId12"/>
   </p:sldLayoutIdLst>
   <p:txStyles>
     <p:titleStyle>
@@ -6365,7 +6130,7 @@
           <p:nvPr/>
         </p:nvPicPr>
         <p:blipFill>
-          <a:blip r:embed="rId3">
+          <a:blip r:embed="rId1">
             <a:extLst>
               <a:ext uri="{28A0092B-C50C-407E-A947-70E740481C1C}">
                 <a14:useLocalDpi xmlns:a14="http://schemas.microsoft.com/office/drawing/2010/main" val="0"/>
@@ -6443,7 +6208,7 @@
           <p:nvPr/>
         </p:nvPicPr>
         <p:blipFill>
-          <a:blip r:embed="rId4"/>
+          <a:blip r:embed="rId2"/>
           <a:srcRect/>
           <a:stretch>
             <a:fillRect/>
@@ -6610,9 +6375,11 @@
           <p:nvPr/>
         </p:nvPicPr>
         <p:blipFill rotWithShape="1">
-          <a:blip r:embed="rId5"/>
+          <a:blip r:embed="rId3"/>
           <a:srcRect l="39783" r="43694"/>
-          <a:stretch/>
+          <a:stretch>
+            <a:fillRect/>
+          </a:stretch>
         </p:blipFill>
         <p:spPr>
           <a:xfrm>
@@ -6765,6 +6532,21 @@
               </a:rPr>
               <a:t>  Bandana</a:t>
             </a:r>
+            <a:endParaRPr lang="en-US" altLang="zh-CN" sz="2800" dirty="0">
+              <a:solidFill>
+                <a:srgbClr val="CBBC91"/>
+              </a:solidFill>
+              <a:effectLst>
+                <a:outerShdw blurRad="25400" dist="25400" dir="2700000" algn="tl">
+                  <a:srgbClr val="000000">
+                    <a:alpha val="25000"/>
+                  </a:srgbClr>
+                </a:outerShdw>
+              </a:effectLst>
+              <a:latin typeface="Aparajita" panose="020B0604020202020204" pitchFamily="34" charset="0"/>
+              <a:ea typeface="思源黑体" panose="020B0500000000000000" pitchFamily="34" charset="-122"/>
+              <a:cs typeface="Aparajita" panose="020B0604020202020204" pitchFamily="34" charset="0"/>
+            </a:endParaRPr>
           </a:p>
           <a:p>
             <a:pPr>
@@ -6933,11 +6715,7 @@
             </a:ln>
           </p:spPr>
           <p:txBody>
-            <a:bodyPr vert="horz" wrap="square" lIns="91440" tIns="45720" rIns="91440" bIns="45720" numCol="1" rtlCol="0" anchor="t" anchorCtr="0" compatLnSpc="1">
-              <a:prstTxWarp prst="textNoShape">
-                <a:avLst/>
-              </a:prstTxWarp>
-            </a:bodyPr>
+            <a:bodyPr vert="horz" wrap="square" lIns="91440" tIns="45720" rIns="91440" bIns="45720" numCol="1" rtlCol="0" anchor="t" anchorCtr="0" compatLnSpc="1"/>
             <a:lstStyle/>
             <a:p>
               <a:pPr algn="ctr"/>
@@ -6987,22 +6765,17 @@
         </p:cxnSp>
       </p:grpSp>
     </p:spTree>
-    <p:extLst>
-      <p:ext uri="{BB962C8B-B14F-4D97-AF65-F5344CB8AC3E}">
-        <p14:creationId xmlns:p14="http://schemas.microsoft.com/office/powerpoint/2010/main" val="2458879347"/>
-      </p:ext>
-    </p:extLst>
   </p:cSld>
   <p:clrMapOvr>
     <a:masterClrMapping/>
   </p:clrMapOvr>
-  <mc:AlternateContent xmlns:mc="http://schemas.openxmlformats.org/markup-compatibility/2006" xmlns:p14="http://schemas.microsoft.com/office/powerpoint/2010/main">
-    <mc:Choice Requires="p14">
+  <mc:AlternateContent xmlns:mc="http://schemas.openxmlformats.org/markup-compatibility/2006">
+    <mc:Choice xmlns:p14="http://schemas.microsoft.com/office/powerpoint/2010/main" Requires="p14">
       <p:transition spd="slow" p14:dur="4000" advClick="0" advTm="0">
         <p14:vortex dir="r"/>
       </p:transition>
     </mc:Choice>
-    <mc:Fallback xmlns="">
+    <mc:Fallback>
       <p:transition spd="slow" advClick="0" advTm="0">
         <p:fade/>
       </p:transition>
@@ -7385,13 +7158,7 @@
         </p:grpSpPr>
         <p:sp>
           <p:nvSpPr>
-            <p:cNvPr id="42" name="TextBox 7">
-              <a:extLst>
-                <a:ext uri="{FF2B5EF4-FFF2-40B4-BE49-F238E27FC236}">
-                  <a16:creationId xmlns:a16="http://schemas.microsoft.com/office/drawing/2014/main" id="{BAF49D56-8FCD-4804-8411-594F1BC85F38}"/>
-                </a:ext>
-              </a:extLst>
-            </p:cNvPr>
+            <p:cNvPr id="42" name="TextBox 7"/>
             <p:cNvSpPr txBox="1"/>
             <p:nvPr/>
           </p:nvSpPr>
@@ -7411,7 +7178,7 @@
             </a:bodyPr>
             <a:lstStyle/>
             <a:p>
-              <a:pPr defTabSz="1219020"/>
+              <a:pPr defTabSz="1219200"/>
               <a:r>
                 <a:rPr lang="en-AU" altLang="zh-CN" sz="4500" dirty="0">
                   <a:solidFill>
@@ -7507,16 +7274,8 @@
       </p:grpSp>
       <p:sp>
         <p:nvSpPr>
-          <p:cNvPr id="32" name="Subtitle 2">
-            <a:extLst>
-              <a:ext uri="{FF2B5EF4-FFF2-40B4-BE49-F238E27FC236}">
-                <a16:creationId xmlns:a16="http://schemas.microsoft.com/office/drawing/2014/main" id="{163C4A5D-CCA1-4EE5-B5F6-065EB0564DBE}"/>
-              </a:ext>
-            </a:extLst>
-          </p:cNvPr>
-          <p:cNvSpPr txBox="1">
-            <a:spLocks/>
-          </p:cNvSpPr>
+          <p:cNvPr id="32" name="Subtitle 2"/>
+          <p:cNvSpPr txBox="1"/>
           <p:nvPr/>
         </p:nvSpPr>
         <p:spPr>
@@ -7709,6 +7468,15 @@
               </a:rPr>
               <a:t>To eliminate the difficulties faced by Roster Manager in handling casual staff during big project. </a:t>
             </a:r>
+            <a:endParaRPr lang="en-AU" altLang="zh-CN" sz="5800" dirty="0">
+              <a:solidFill>
+                <a:schemeClr val="accent4">
+                  <a:lumMod val="40000"/>
+                  <a:lumOff val="60000"/>
+                </a:schemeClr>
+              </a:solidFill>
+              <a:ea typeface="宋体" panose="02010600030101010101" pitchFamily="2" charset="-122"/>
+            </a:endParaRPr>
           </a:p>
           <a:p>
             <a:r>
@@ -7735,26 +7503,30 @@
               </a:rPr>
               <a:t>environment friendly.</a:t>
             </a:r>
+            <a:endParaRPr lang="en-AU" altLang="zh-CN" sz="5900" dirty="0">
+              <a:solidFill>
+                <a:schemeClr val="accent4">
+                  <a:lumMod val="40000"/>
+                  <a:lumOff val="60000"/>
+                </a:schemeClr>
+              </a:solidFill>
+              <a:ea typeface="宋体" panose="02010600030101010101" pitchFamily="2" charset="-122"/>
+            </a:endParaRPr>
           </a:p>
         </p:txBody>
       </p:sp>
     </p:spTree>
-    <p:extLst>
-      <p:ext uri="{BB962C8B-B14F-4D97-AF65-F5344CB8AC3E}">
-        <p14:creationId xmlns:p14="http://schemas.microsoft.com/office/powerpoint/2010/main" val="762201976"/>
-      </p:ext>
-    </p:extLst>
   </p:cSld>
   <p:clrMapOvr>
     <a:masterClrMapping/>
   </p:clrMapOvr>
-  <mc:AlternateContent xmlns:mc="http://schemas.openxmlformats.org/markup-compatibility/2006" xmlns:p14="http://schemas.microsoft.com/office/powerpoint/2010/main">
-    <mc:Choice Requires="p14">
+  <mc:AlternateContent xmlns:mc="http://schemas.openxmlformats.org/markup-compatibility/2006">
+    <mc:Choice xmlns:p14="http://schemas.microsoft.com/office/powerpoint/2010/main" Requires="p14">
       <p:transition spd="med" p14:dur="700" advClick="0" advTm="0">
         <p:fade/>
       </p:transition>
     </mc:Choice>
-    <mc:Fallback xmlns="">
+    <mc:Fallback>
       <p:transition spd="med" advClick="0" advTm="0">
         <p:fade/>
       </p:transition>
@@ -7796,13 +7568,7 @@
         </p:grpSpPr>
         <p:sp>
           <p:nvSpPr>
-            <p:cNvPr id="42" name="TextBox 7">
-              <a:extLst>
-                <a:ext uri="{FF2B5EF4-FFF2-40B4-BE49-F238E27FC236}">
-                  <a16:creationId xmlns:a16="http://schemas.microsoft.com/office/drawing/2014/main" id="{BAF49D56-8FCD-4804-8411-594F1BC85F38}"/>
-                </a:ext>
-              </a:extLst>
-            </p:cNvPr>
+            <p:cNvPr id="42" name="TextBox 7"/>
             <p:cNvSpPr txBox="1"/>
             <p:nvPr/>
           </p:nvSpPr>
@@ -7822,7 +7588,7 @@
             </a:bodyPr>
             <a:lstStyle/>
             <a:p>
-              <a:pPr defTabSz="1219020"/>
+              <a:pPr defTabSz="1219200"/>
               <a:r>
                 <a:rPr lang="en-US" altLang="zh-CN" sz="2800" dirty="0">
                   <a:solidFill>
@@ -7914,16 +7680,8 @@
       </p:grpSp>
       <p:sp>
         <p:nvSpPr>
-          <p:cNvPr id="32" name="Subtitle 2">
-            <a:extLst>
-              <a:ext uri="{FF2B5EF4-FFF2-40B4-BE49-F238E27FC236}">
-                <a16:creationId xmlns:a16="http://schemas.microsoft.com/office/drawing/2014/main" id="{163C4A5D-CCA1-4EE5-B5F6-065EB0564DBE}"/>
-              </a:ext>
-            </a:extLst>
-          </p:cNvPr>
-          <p:cNvSpPr txBox="1">
-            <a:spLocks/>
-          </p:cNvSpPr>
+          <p:cNvPr id="32" name="Subtitle 2"/>
+          <p:cNvSpPr txBox="1"/>
           <p:nvPr/>
         </p:nvSpPr>
         <p:spPr>
@@ -8117,6 +7875,15 @@
               </a:rPr>
               <a:t>Databases recorded with their availability and flexibility</a:t>
             </a:r>
+            <a:endParaRPr lang="en-US" altLang="zh-CN" sz="14400" dirty="0">
+              <a:solidFill>
+                <a:schemeClr val="accent4">
+                  <a:lumMod val="40000"/>
+                  <a:lumOff val="60000"/>
+                </a:schemeClr>
+              </a:solidFill>
+              <a:ea typeface="宋体" panose="02010600030101010101" pitchFamily="2" charset="-122"/>
+            </a:endParaRPr>
           </a:p>
           <a:p>
             <a:pPr marL="342900" indent="-342900" algn="just">
@@ -8135,6 +7902,15 @@
               </a:rPr>
               <a:t>It delivers accurate time and detailed report and gives real time communication</a:t>
             </a:r>
+            <a:endParaRPr lang="en-US" altLang="zh-CN" sz="14400" dirty="0">
+              <a:solidFill>
+                <a:schemeClr val="accent4">
+                  <a:lumMod val="40000"/>
+                  <a:lumOff val="60000"/>
+                </a:schemeClr>
+              </a:solidFill>
+              <a:ea typeface="宋体" panose="02010600030101010101" pitchFamily="2" charset="-122"/>
+            </a:endParaRPr>
           </a:p>
           <a:p>
             <a:pPr marL="342900" indent="-342900" algn="just">
@@ -8153,6 +7929,15 @@
               </a:rPr>
               <a:t>Staff management strategy is more effective and can be easily integrated into other system</a:t>
             </a:r>
+            <a:endParaRPr lang="en-US" altLang="zh-CN" sz="14400" dirty="0">
+              <a:solidFill>
+                <a:schemeClr val="accent4">
+                  <a:lumMod val="40000"/>
+                  <a:lumOff val="60000"/>
+                </a:schemeClr>
+              </a:solidFill>
+              <a:ea typeface="宋体" panose="02010600030101010101" pitchFamily="2" charset="-122"/>
+            </a:endParaRPr>
           </a:p>
           <a:p>
             <a:pPr marL="342900" indent="-342900" algn="just">
@@ -8200,20 +7985,14 @@
       </p:sp>
       <p:pic>
         <p:nvPicPr>
-          <p:cNvPr id="37" name="Picture 8" descr="Shift Roster Excel Template: How to Set it Up">
-            <a:extLst>
-              <a:ext uri="{FF2B5EF4-FFF2-40B4-BE49-F238E27FC236}">
-                <a16:creationId xmlns:a16="http://schemas.microsoft.com/office/drawing/2014/main" id="{3C23EE54-1849-4B9F-888A-8891B80F1347}"/>
-              </a:ext>
-            </a:extLst>
-          </p:cNvPr>
+          <p:cNvPr id="37" name="Picture 8" descr="Shift Roster Excel Template: How to Set it Up"/>
           <p:cNvPicPr>
             <a:picLocks noChangeAspect="1" noChangeArrowheads="1"/>
           </p:cNvPicPr>
           <p:nvPr/>
         </p:nvPicPr>
         <p:blipFill>
-          <a:blip r:embed="rId3">
+          <a:blip r:embed="rId1">
             <a:extLst>
               <a:ext uri="{28A0092B-C50C-407E-A947-70E740481C1C}">
                 <a14:useLocalDpi xmlns:a14="http://schemas.microsoft.com/office/drawing/2010/main" val="0"/>
@@ -8246,22 +8025,17 @@
         </p:spPr>
       </p:pic>
     </p:spTree>
-    <p:extLst>
-      <p:ext uri="{BB962C8B-B14F-4D97-AF65-F5344CB8AC3E}">
-        <p14:creationId xmlns:p14="http://schemas.microsoft.com/office/powerpoint/2010/main" val="4237338674"/>
-      </p:ext>
-    </p:extLst>
   </p:cSld>
   <p:clrMapOvr>
     <a:masterClrMapping/>
   </p:clrMapOvr>
-  <mc:AlternateContent xmlns:mc="http://schemas.openxmlformats.org/markup-compatibility/2006" xmlns:p14="http://schemas.microsoft.com/office/powerpoint/2010/main">
-    <mc:Choice Requires="p14">
+  <mc:AlternateContent xmlns:mc="http://schemas.openxmlformats.org/markup-compatibility/2006">
+    <mc:Choice xmlns:p14="http://schemas.microsoft.com/office/powerpoint/2010/main" Requires="p14">
       <p:transition spd="med" p14:dur="700" advClick="0" advTm="0">
         <p:fade/>
       </p:transition>
     </mc:Choice>
-    <mc:Fallback xmlns="">
+    <mc:Fallback>
       <p:transition spd="med" advClick="0" advTm="0">
         <p:fade/>
       </p:transition>
@@ -8303,13 +8077,7 @@
         </p:grpSpPr>
         <p:sp>
           <p:nvSpPr>
-            <p:cNvPr id="42" name="TextBox 7">
-              <a:extLst>
-                <a:ext uri="{FF2B5EF4-FFF2-40B4-BE49-F238E27FC236}">
-                  <a16:creationId xmlns:a16="http://schemas.microsoft.com/office/drawing/2014/main" id="{BAF49D56-8FCD-4804-8411-594F1BC85F38}"/>
-                </a:ext>
-              </a:extLst>
-            </p:cNvPr>
+            <p:cNvPr id="42" name="TextBox 7"/>
             <p:cNvSpPr txBox="1"/>
             <p:nvPr/>
           </p:nvSpPr>
@@ -8329,7 +8097,7 @@
             </a:bodyPr>
             <a:lstStyle/>
             <a:p>
-              <a:pPr defTabSz="1219020"/>
+              <a:pPr defTabSz="1219200"/>
               <a:r>
                 <a:rPr lang="en-US" altLang="zh-CN" sz="2800" dirty="0">
                   <a:solidFill>
@@ -8421,16 +8189,8 @@
       </p:grpSp>
       <p:sp>
         <p:nvSpPr>
-          <p:cNvPr id="32" name="Subtitle 2">
-            <a:extLst>
-              <a:ext uri="{FF2B5EF4-FFF2-40B4-BE49-F238E27FC236}">
-                <a16:creationId xmlns:a16="http://schemas.microsoft.com/office/drawing/2014/main" id="{163C4A5D-CCA1-4EE5-B5F6-065EB0564DBE}"/>
-              </a:ext>
-            </a:extLst>
-          </p:cNvPr>
-          <p:cNvSpPr txBox="1">
-            <a:spLocks/>
-          </p:cNvSpPr>
+          <p:cNvPr id="32" name="Subtitle 2"/>
+          <p:cNvSpPr txBox="1"/>
           <p:nvPr/>
         </p:nvSpPr>
         <p:spPr>
@@ -8624,6 +8384,15 @@
               </a:rPr>
               <a:t>Task and training are uploaded on the website to observe previous work</a:t>
             </a:r>
+            <a:endParaRPr lang="en-US" sz="14400" dirty="0">
+              <a:solidFill>
+                <a:schemeClr val="accent4">
+                  <a:lumMod val="40000"/>
+                  <a:lumOff val="60000"/>
+                </a:schemeClr>
+              </a:solidFill>
+              <a:ea typeface="宋体" panose="02010600030101010101" pitchFamily="2" charset="-122"/>
+            </a:endParaRPr>
           </a:p>
           <a:p>
             <a:pPr marL="342900" indent="-342900" algn="just"/>
@@ -8639,6 +8408,15 @@
               </a:rPr>
               <a:t>Provide all information like note, place, attachment, time</a:t>
             </a:r>
+            <a:endParaRPr lang="en-US" sz="14400" dirty="0">
+              <a:solidFill>
+                <a:schemeClr val="accent4">
+                  <a:lumMod val="40000"/>
+                  <a:lumOff val="60000"/>
+                </a:schemeClr>
+              </a:solidFill>
+              <a:ea typeface="宋体" panose="02010600030101010101" pitchFamily="2" charset="-122"/>
+            </a:endParaRPr>
           </a:p>
           <a:p>
             <a:pPr marL="342900" indent="-342900" algn="just"/>
@@ -8654,6 +8432,15 @@
               </a:rPr>
               <a:t>Staff can access their roaster via phone and will get update of everything</a:t>
             </a:r>
+            <a:endParaRPr lang="en-US" sz="14400" dirty="0">
+              <a:solidFill>
+                <a:schemeClr val="accent4">
+                  <a:lumMod val="40000"/>
+                  <a:lumOff val="60000"/>
+                </a:schemeClr>
+              </a:solidFill>
+              <a:ea typeface="宋体" panose="02010600030101010101" pitchFamily="2" charset="-122"/>
+            </a:endParaRPr>
           </a:p>
           <a:p>
             <a:pPr marL="342900" indent="-342900" algn="just"/>
@@ -8669,6 +8456,15 @@
               </a:rPr>
               <a:t>Provide staff with related insight that can be used to make decision</a:t>
             </a:r>
+            <a:endParaRPr lang="en-US" sz="14400" dirty="0">
+              <a:solidFill>
+                <a:schemeClr val="accent4">
+                  <a:lumMod val="40000"/>
+                  <a:lumOff val="60000"/>
+                </a:schemeClr>
+              </a:solidFill>
+              <a:ea typeface="宋体" panose="02010600030101010101" pitchFamily="2" charset="-122"/>
+            </a:endParaRPr>
           </a:p>
           <a:p>
             <a:endParaRPr lang="en-AU" dirty="0"/>
@@ -8677,20 +8473,14 @@
       </p:sp>
       <p:pic>
         <p:nvPicPr>
-          <p:cNvPr id="33" name="Picture 2" descr="How to Make a Monthly Work Schedule Template | Wrike">
-            <a:extLst>
-              <a:ext uri="{FF2B5EF4-FFF2-40B4-BE49-F238E27FC236}">
-                <a16:creationId xmlns:a16="http://schemas.microsoft.com/office/drawing/2014/main" id="{751DF18C-B666-4FAE-8AB0-A231D9D556CC}"/>
-              </a:ext>
-            </a:extLst>
-          </p:cNvPr>
+          <p:cNvPr id="33" name="Picture 2" descr="How to Make a Monthly Work Schedule Template | Wrike"/>
           <p:cNvPicPr>
             <a:picLocks noChangeAspect="1" noChangeArrowheads="1"/>
           </p:cNvPicPr>
           <p:nvPr/>
         </p:nvPicPr>
         <p:blipFill>
-          <a:blip r:embed="rId3" cstate="print">
+          <a:blip r:embed="rId1" cstate="print">
             <a:extLst>
               <a:ext uri="{28A0092B-C50C-407E-A947-70E740481C1C}">
                 <a14:useLocalDpi xmlns:a14="http://schemas.microsoft.com/office/drawing/2010/main" val="0"/>
@@ -8723,22 +8513,17 @@
         </p:spPr>
       </p:pic>
     </p:spTree>
-    <p:extLst>
-      <p:ext uri="{BB962C8B-B14F-4D97-AF65-F5344CB8AC3E}">
-        <p14:creationId xmlns:p14="http://schemas.microsoft.com/office/powerpoint/2010/main" val="4125674789"/>
-      </p:ext>
-    </p:extLst>
   </p:cSld>
   <p:clrMapOvr>
     <a:masterClrMapping/>
   </p:clrMapOvr>
-  <mc:AlternateContent xmlns:mc="http://schemas.openxmlformats.org/markup-compatibility/2006" xmlns:p14="http://schemas.microsoft.com/office/powerpoint/2010/main">
-    <mc:Choice Requires="p14">
+  <mc:AlternateContent xmlns:mc="http://schemas.openxmlformats.org/markup-compatibility/2006">
+    <mc:Choice xmlns:p14="http://schemas.microsoft.com/office/powerpoint/2010/main" Requires="p14">
       <p:transition spd="med" p14:dur="700" advClick="0" advTm="0">
         <p:fade/>
       </p:transition>
     </mc:Choice>
-    <mc:Fallback xmlns="">
+    <mc:Fallback>
       <p:transition spd="med" advClick="0" advTm="0">
         <p:fade/>
       </p:transition>
@@ -8773,7 +8558,7 @@
           <p:nvPr/>
         </p:nvPicPr>
         <p:blipFill>
-          <a:blip r:embed="rId3">
+          <a:blip r:embed="rId1">
             <a:extLst>
               <a:ext uri="{28A0092B-C50C-407E-A947-70E740481C1C}">
                 <a14:useLocalDpi xmlns:a14="http://schemas.microsoft.com/office/drawing/2010/main" val="0"/>
@@ -8851,7 +8636,7 @@
           <p:nvPr/>
         </p:nvPicPr>
         <p:blipFill>
-          <a:blip r:embed="rId4"/>
+          <a:blip r:embed="rId2"/>
           <a:srcRect/>
           <a:stretch>
             <a:fillRect/>
@@ -9018,9 +8803,11 @@
           <p:nvPr/>
         </p:nvPicPr>
         <p:blipFill rotWithShape="1">
-          <a:blip r:embed="rId5"/>
+          <a:blip r:embed="rId3"/>
           <a:srcRect l="39783" r="43694"/>
-          <a:stretch/>
+          <a:stretch>
+            <a:fillRect/>
+          </a:stretch>
         </p:blipFill>
         <p:spPr>
           <a:xfrm>
@@ -9162,11 +8949,7 @@
             </a:ln>
           </p:spPr>
           <p:txBody>
-            <a:bodyPr vert="horz" wrap="square" lIns="91440" tIns="45720" rIns="91440" bIns="45720" numCol="1" rtlCol="0" anchor="t" anchorCtr="0" compatLnSpc="1">
-              <a:prstTxWarp prst="textNoShape">
-                <a:avLst/>
-              </a:prstTxWarp>
-            </a:bodyPr>
+            <a:bodyPr vert="horz" wrap="square" lIns="91440" tIns="45720" rIns="91440" bIns="45720" numCol="1" rtlCol="0" anchor="t" anchorCtr="0" compatLnSpc="1"/>
             <a:lstStyle/>
             <a:p>
               <a:pPr algn="ctr"/>
@@ -9217,13 +9000,7 @@
       </p:grpSp>
       <p:sp>
         <p:nvSpPr>
-          <p:cNvPr id="2" name="文本框 1">
-            <a:extLst>
-              <a:ext uri="{FF2B5EF4-FFF2-40B4-BE49-F238E27FC236}">
-                <a16:creationId xmlns:a16="http://schemas.microsoft.com/office/drawing/2014/main" id="{0C6DBA26-3A6A-4FBE-A02F-48771D89FF24}"/>
-              </a:ext>
-            </a:extLst>
-          </p:cNvPr>
+          <p:cNvPr id="2" name="文本框 1"/>
           <p:cNvSpPr txBox="1"/>
           <p:nvPr/>
         </p:nvSpPr>
@@ -9266,852 +9043,327 @@
         </p:txBody>
       </p:sp>
     </p:spTree>
-    <p:extLst>
-      <p:ext uri="{BB962C8B-B14F-4D97-AF65-F5344CB8AC3E}">
-        <p14:creationId xmlns:p14="http://schemas.microsoft.com/office/powerpoint/2010/main" val="11787213"/>
-      </p:ext>
-    </p:extLst>
   </p:cSld>
   <p:clrMapOvr>
     <a:masterClrMapping/>
   </p:clrMapOvr>
-  <mc:AlternateContent xmlns:mc="http://schemas.openxmlformats.org/markup-compatibility/2006" xmlns:p14="http://schemas.microsoft.com/office/powerpoint/2010/main">
-    <mc:Choice Requires="p14">
+  <mc:AlternateContent xmlns:mc="http://schemas.openxmlformats.org/markup-compatibility/2006">
+    <mc:Choice xmlns:p14="http://schemas.microsoft.com/office/powerpoint/2010/main" Requires="p14">
       <p:transition spd="slow" p14:dur="4000" advClick="0" advTm="0">
         <p14:vortex dir="r"/>
       </p:transition>
     </mc:Choice>
-    <mc:Fallback xmlns="">
+    <mc:Fallback>
       <p:transition spd="slow" advClick="0" advTm="0">
         <p:fade/>
       </p:transition>
     </mc:Fallback>
   </mc:AlternateContent>
-  <mc:AlternateContent xmlns:mc="http://schemas.openxmlformats.org/markup-compatibility/2006" xmlns:p14="http://schemas.microsoft.com/office/powerpoint/2010/main">
-    <mc:Choice Requires="p14">
-      <p:timing>
-        <p:tnLst>
-          <p:par>
-            <p:cTn id="1" dur="indefinite" restart="never" nodeType="tmRoot">
-              <p:childTnLst>
-                <p:seq concurrent="1" nextAc="seek">
-                  <p:cTn id="2" dur="indefinite" nodeType="mainSeq">
-                    <p:childTnLst>
-                      <p:par>
-                        <p:cTn id="3" fill="hold">
-                          <p:stCondLst>
-                            <p:cond delay="indefinite"/>
-                            <p:cond evt="onBegin" delay="0">
-                              <p:tn val="2"/>
-                            </p:cond>
-                          </p:stCondLst>
-                          <p:childTnLst>
-                            <p:par>
-                              <p:cTn id="4" fill="hold">
-                                <p:stCondLst>
-                                  <p:cond delay="0"/>
-                                </p:stCondLst>
-                                <p:childTnLst>
-                                  <p:par>
-                                    <p:cTn id="5" presetID="16" presetClass="entr" presetSubtype="42" fill="hold" nodeType="withEffect">
-                                      <p:stCondLst>
-                                        <p:cond delay="0"/>
-                                      </p:stCondLst>
-                                      <p:childTnLst>
-                                        <p:set>
-                                          <p:cBhvr>
-                                            <p:cTn id="6" dur="1" fill="hold">
-                                              <p:stCondLst>
-                                                <p:cond delay="0"/>
-                                              </p:stCondLst>
-                                            </p:cTn>
-                                            <p:tgtEl>
-                                              <p:spTgt spid="15"/>
-                                            </p:tgtEl>
-                                            <p:attrNameLst>
-                                              <p:attrName>style.visibility</p:attrName>
-                                            </p:attrNameLst>
-                                          </p:cBhvr>
-                                          <p:to>
-                                            <p:strVal val="visible"/>
-                                          </p:to>
-                                        </p:set>
-                                        <p:animEffect transition="in" filter="barn(outHorizontal)">
-                                          <p:cBhvr>
-                                            <p:cTn id="7" dur="500"/>
-                                            <p:tgtEl>
-                                              <p:spTgt spid="15"/>
-                                            </p:tgtEl>
-                                          </p:cBhvr>
-                                        </p:animEffect>
-                                      </p:childTnLst>
-                                    </p:cTn>
-                                  </p:par>
-                                  <p:par>
-                                    <p:cTn id="8" presetID="53" presetClass="entr" presetSubtype="16" fill="hold" grpId="0" nodeType="withEffect">
-                                      <p:stCondLst>
-                                        <p:cond delay="0"/>
-                                      </p:stCondLst>
-                                      <p:childTnLst>
-                                        <p:set>
-                                          <p:cBhvr>
-                                            <p:cTn id="9" dur="1" fill="hold">
-                                              <p:stCondLst>
-                                                <p:cond delay="0"/>
-                                              </p:stCondLst>
-                                            </p:cTn>
-                                            <p:tgtEl>
-                                              <p:spTgt spid="16"/>
-                                            </p:tgtEl>
-                                            <p:attrNameLst>
-                                              <p:attrName>style.visibility</p:attrName>
-                                            </p:attrNameLst>
-                                          </p:cBhvr>
-                                          <p:to>
-                                            <p:strVal val="visible"/>
-                                          </p:to>
-                                        </p:set>
-                                        <p:anim calcmode="lin" valueType="num">
-                                          <p:cBhvr>
-                                            <p:cTn id="10" dur="500" fill="hold"/>
-                                            <p:tgtEl>
-                                              <p:spTgt spid="16"/>
-                                            </p:tgtEl>
-                                            <p:attrNameLst>
-                                              <p:attrName>ppt_w</p:attrName>
-                                            </p:attrNameLst>
-                                          </p:cBhvr>
-                                          <p:tavLst>
-                                            <p:tav tm="0">
-                                              <p:val>
-                                                <p:fltVal val="0"/>
-                                              </p:val>
-                                            </p:tav>
-                                            <p:tav tm="100000">
-                                              <p:val>
-                                                <p:strVal val="#ppt_w"/>
-                                              </p:val>
-                                            </p:tav>
-                                          </p:tavLst>
-                                        </p:anim>
-                                        <p:anim calcmode="lin" valueType="num">
-                                          <p:cBhvr>
-                                            <p:cTn id="11" dur="500" fill="hold"/>
-                                            <p:tgtEl>
-                                              <p:spTgt spid="16"/>
-                                            </p:tgtEl>
-                                            <p:attrNameLst>
-                                              <p:attrName>ppt_h</p:attrName>
-                                            </p:attrNameLst>
-                                          </p:cBhvr>
-                                          <p:tavLst>
-                                            <p:tav tm="0">
-                                              <p:val>
-                                                <p:fltVal val="0"/>
-                                              </p:val>
-                                            </p:tav>
-                                            <p:tav tm="100000">
-                                              <p:val>
-                                                <p:strVal val="#ppt_h"/>
-                                              </p:val>
-                                            </p:tav>
-                                          </p:tavLst>
-                                        </p:anim>
-                                        <p:animEffect transition="in" filter="fade">
-                                          <p:cBhvr>
-                                            <p:cTn id="12" dur="500"/>
-                                            <p:tgtEl>
-                                              <p:spTgt spid="16"/>
-                                            </p:tgtEl>
-                                          </p:cBhvr>
-                                        </p:animEffect>
-                                      </p:childTnLst>
-                                    </p:cTn>
-                                  </p:par>
-                                </p:childTnLst>
-                              </p:cTn>
-                            </p:par>
-                            <p:par>
-                              <p:cTn id="13" fill="hold">
-                                <p:stCondLst>
-                                  <p:cond delay="500"/>
-                                </p:stCondLst>
-                                <p:childTnLst>
-                                  <p:par>
-                                    <p:cTn id="14" presetID="16" presetClass="entr" presetSubtype="37" fill="hold" nodeType="afterEffect">
-                                      <p:stCondLst>
-                                        <p:cond delay="0"/>
-                                      </p:stCondLst>
-                                      <p:childTnLst>
-                                        <p:set>
-                                          <p:cBhvr>
-                                            <p:cTn id="15" dur="1" fill="hold">
-                                              <p:stCondLst>
-                                                <p:cond delay="0"/>
-                                              </p:stCondLst>
-                                            </p:cTn>
-                                            <p:tgtEl>
-                                              <p:spTgt spid="24"/>
-                                            </p:tgtEl>
-                                            <p:attrNameLst>
-                                              <p:attrName>style.visibility</p:attrName>
-                                            </p:attrNameLst>
-                                          </p:cBhvr>
-                                          <p:to>
-                                            <p:strVal val="visible"/>
-                                          </p:to>
-                                        </p:set>
-                                        <p:animEffect transition="in" filter="barn(outVertical)">
-                                          <p:cBhvr>
-                                            <p:cTn id="16" dur="500"/>
-                                            <p:tgtEl>
-                                              <p:spTgt spid="24"/>
-                                            </p:tgtEl>
-                                          </p:cBhvr>
-                                        </p:animEffect>
-                                      </p:childTnLst>
-                                    </p:cTn>
-                                  </p:par>
-                                </p:childTnLst>
-                              </p:cTn>
-                            </p:par>
-                            <p:par>
-                              <p:cTn id="17" fill="hold">
-                                <p:stCondLst>
-                                  <p:cond delay="1000"/>
-                                </p:stCondLst>
-                                <p:childTnLst>
-                                  <p:par>
-                                    <p:cTn id="18" presetID="53" presetClass="entr" presetSubtype="16" fill="hold" grpId="0" nodeType="afterEffect">
-                                      <p:stCondLst>
-                                        <p:cond delay="0"/>
-                                      </p:stCondLst>
-                                      <p:childTnLst>
-                                        <p:set>
-                                          <p:cBhvr>
-                                            <p:cTn id="19" dur="1" fill="hold">
-                                              <p:stCondLst>
-                                                <p:cond delay="0"/>
-                                              </p:stCondLst>
-                                            </p:cTn>
-                                            <p:tgtEl>
-                                              <p:spTgt spid="19"/>
-                                            </p:tgtEl>
-                                            <p:attrNameLst>
-                                              <p:attrName>style.visibility</p:attrName>
-                                            </p:attrNameLst>
-                                          </p:cBhvr>
-                                          <p:to>
-                                            <p:strVal val="visible"/>
-                                          </p:to>
-                                        </p:set>
-                                        <p:anim calcmode="lin" valueType="num">
-                                          <p:cBhvr>
-                                            <p:cTn id="20" dur="500" fill="hold"/>
-                                            <p:tgtEl>
-                                              <p:spTgt spid="19"/>
-                                            </p:tgtEl>
-                                            <p:attrNameLst>
-                                              <p:attrName>ppt_w</p:attrName>
-                                            </p:attrNameLst>
-                                          </p:cBhvr>
-                                          <p:tavLst>
-                                            <p:tav tm="0">
-                                              <p:val>
-                                                <p:fltVal val="0"/>
-                                              </p:val>
-                                            </p:tav>
-                                            <p:tav tm="100000">
-                                              <p:val>
-                                                <p:strVal val="#ppt_w"/>
-                                              </p:val>
-                                            </p:tav>
-                                          </p:tavLst>
-                                        </p:anim>
-                                        <p:anim calcmode="lin" valueType="num">
-                                          <p:cBhvr>
-                                            <p:cTn id="21" dur="500" fill="hold"/>
-                                            <p:tgtEl>
-                                              <p:spTgt spid="19"/>
-                                            </p:tgtEl>
-                                            <p:attrNameLst>
-                                              <p:attrName>ppt_h</p:attrName>
-                                            </p:attrNameLst>
-                                          </p:cBhvr>
-                                          <p:tavLst>
-                                            <p:tav tm="0">
-                                              <p:val>
-                                                <p:fltVal val="0"/>
-                                              </p:val>
-                                            </p:tav>
-                                            <p:tav tm="100000">
-                                              <p:val>
-                                                <p:strVal val="#ppt_h"/>
-                                              </p:val>
-                                            </p:tav>
-                                          </p:tavLst>
-                                        </p:anim>
-                                        <p:animEffect transition="in" filter="fade">
-                                          <p:cBhvr>
-                                            <p:cTn id="22" dur="500"/>
-                                            <p:tgtEl>
-                                              <p:spTgt spid="19"/>
-                                            </p:tgtEl>
-                                          </p:cBhvr>
-                                        </p:animEffect>
-                                      </p:childTnLst>
-                                    </p:cTn>
-                                  </p:par>
-                                </p:childTnLst>
-                              </p:cTn>
-                            </p:par>
-                          </p:childTnLst>
-                        </p:cTn>
-                      </p:par>
-                    </p:childTnLst>
-                  </p:cTn>
-                  <p:prevCondLst>
-                    <p:cond evt="onPrev" delay="0">
-                      <p:tgtEl>
-                        <p:sldTgt/>
-                      </p:tgtEl>
-                    </p:cond>
-                  </p:prevCondLst>
-                  <p:nextCondLst>
-                    <p:cond evt="onNext" delay="0">
-                      <p:tgtEl>
-                        <p:sldTgt/>
-                      </p:tgtEl>
-                    </p:cond>
-                  </p:nextCondLst>
-                </p:seq>
-              </p:childTnLst>
-            </p:cTn>
-          </p:par>
-        </p:tnLst>
-        <p:bldLst>
-          <p:bldP spid="16" grpId="0"/>
-          <p:bldP spid="19" grpId="0"/>
-        </p:bldLst>
-      </p:timing>
-    </mc:Choice>
-    <mc:Fallback xmlns="">
-      <p:timing>
-        <p:tnLst>
-          <p:par>
-            <p:cTn id="1" dur="indefinite" restart="never" nodeType="tmRoot">
-              <p:childTnLst>
-                <p:seq concurrent="1" nextAc="seek">
-                  <p:cTn id="2" dur="indefinite" nodeType="mainSeq">
-                    <p:childTnLst>
-                      <p:par>
-                        <p:cTn id="3" fill="hold">
-                          <p:stCondLst>
-                            <p:cond delay="indefinite"/>
-                            <p:cond evt="onBegin" delay="0">
-                              <p:tn val="2"/>
-                            </p:cond>
-                          </p:stCondLst>
-                          <p:childTnLst>
-                            <p:par>
-                              <p:cTn id="4" fill="hold">
-                                <p:stCondLst>
-                                  <p:cond delay="0"/>
-                                </p:stCondLst>
-                                <p:childTnLst>
-                                  <p:par>
-                                    <p:cTn id="5" presetID="16" presetClass="entr" presetSubtype="42" fill="hold" nodeType="withEffect">
-                                      <p:stCondLst>
-                                        <p:cond delay="0"/>
-                                      </p:stCondLst>
-                                      <p:childTnLst>
-                                        <p:set>
-                                          <p:cBhvr>
-                                            <p:cTn id="6" dur="1" fill="hold">
-                                              <p:stCondLst>
-                                                <p:cond delay="0"/>
-                                              </p:stCondLst>
-                                            </p:cTn>
-                                            <p:tgtEl>
-                                              <p:spTgt spid="15"/>
-                                            </p:tgtEl>
-                                            <p:attrNameLst>
-                                              <p:attrName>style.visibility</p:attrName>
-                                            </p:attrNameLst>
-                                          </p:cBhvr>
-                                          <p:to>
-                                            <p:strVal val="visible"/>
-                                          </p:to>
-                                        </p:set>
-                                        <p:animEffect transition="in" filter="barn(outHorizontal)">
-                                          <p:cBhvr>
-                                            <p:cTn id="7" dur="500"/>
-                                            <p:tgtEl>
-                                              <p:spTgt spid="15"/>
-                                            </p:tgtEl>
-                                          </p:cBhvr>
-                                        </p:animEffect>
-                                      </p:childTnLst>
-                                    </p:cTn>
-                                  </p:par>
-                                  <p:par>
-                                    <p:cTn id="8" presetID="53" presetClass="entr" presetSubtype="16" fill="hold" grpId="0" nodeType="withEffect">
-                                      <p:stCondLst>
-                                        <p:cond delay="0"/>
-                                      </p:stCondLst>
-                                      <p:childTnLst>
-                                        <p:set>
-                                          <p:cBhvr>
-                                            <p:cTn id="9" dur="1" fill="hold">
-                                              <p:stCondLst>
-                                                <p:cond delay="0"/>
-                                              </p:stCondLst>
-                                            </p:cTn>
-                                            <p:tgtEl>
-                                              <p:spTgt spid="16"/>
-                                            </p:tgtEl>
-                                            <p:attrNameLst>
-                                              <p:attrName>style.visibility</p:attrName>
-                                            </p:attrNameLst>
-                                          </p:cBhvr>
-                                          <p:to>
-                                            <p:strVal val="visible"/>
-                                          </p:to>
-                                        </p:set>
-                                        <p:anim calcmode="lin" valueType="num">
-                                          <p:cBhvr>
-                                            <p:cTn id="10" dur="500" fill="hold"/>
-                                            <p:tgtEl>
-                                              <p:spTgt spid="16"/>
-                                            </p:tgtEl>
-                                            <p:attrNameLst>
-                                              <p:attrName>ppt_w</p:attrName>
-                                            </p:attrNameLst>
-                                          </p:cBhvr>
-                                          <p:tavLst>
-                                            <p:tav tm="0">
-                                              <p:val>
-                                                <p:fltVal val="0"/>
-                                              </p:val>
-                                            </p:tav>
-                                            <p:tav tm="100000">
-                                              <p:val>
-                                                <p:strVal val="#ppt_w"/>
-                                              </p:val>
-                                            </p:tav>
-                                          </p:tavLst>
-                                        </p:anim>
-                                        <p:anim calcmode="lin" valueType="num">
-                                          <p:cBhvr>
-                                            <p:cTn id="11" dur="500" fill="hold"/>
-                                            <p:tgtEl>
-                                              <p:spTgt spid="16"/>
-                                            </p:tgtEl>
-                                            <p:attrNameLst>
-                                              <p:attrName>ppt_h</p:attrName>
-                                            </p:attrNameLst>
-                                          </p:cBhvr>
-                                          <p:tavLst>
-                                            <p:tav tm="0">
-                                              <p:val>
-                                                <p:fltVal val="0"/>
-                                              </p:val>
-                                            </p:tav>
-                                            <p:tav tm="100000">
-                                              <p:val>
-                                                <p:strVal val="#ppt_h"/>
-                                              </p:val>
-                                            </p:tav>
-                                          </p:tavLst>
-                                        </p:anim>
-                                        <p:animEffect transition="in" filter="fade">
-                                          <p:cBhvr>
-                                            <p:cTn id="12" dur="500"/>
-                                            <p:tgtEl>
-                                              <p:spTgt spid="16"/>
-                                            </p:tgtEl>
-                                          </p:cBhvr>
-                                        </p:animEffect>
-                                      </p:childTnLst>
-                                    </p:cTn>
-                                  </p:par>
-                                </p:childTnLst>
-                              </p:cTn>
-                            </p:par>
-                            <p:par>
-                              <p:cTn id="13" fill="hold">
-                                <p:stCondLst>
-                                  <p:cond delay="500"/>
-                                </p:stCondLst>
-                                <p:childTnLst>
-                                  <p:par>
-                                    <p:cTn id="14" presetID="16" presetClass="entr" presetSubtype="37" fill="hold" nodeType="afterEffect">
-                                      <p:stCondLst>
-                                        <p:cond delay="0"/>
-                                      </p:stCondLst>
-                                      <p:childTnLst>
-                                        <p:set>
-                                          <p:cBhvr>
-                                            <p:cTn id="15" dur="1" fill="hold">
-                                              <p:stCondLst>
-                                                <p:cond delay="0"/>
-                                              </p:stCondLst>
-                                            </p:cTn>
-                                            <p:tgtEl>
-                                              <p:spTgt spid="24"/>
-                                            </p:tgtEl>
-                                            <p:attrNameLst>
-                                              <p:attrName>style.visibility</p:attrName>
-                                            </p:attrNameLst>
-                                          </p:cBhvr>
-                                          <p:to>
-                                            <p:strVal val="visible"/>
-                                          </p:to>
-                                        </p:set>
-                                        <p:animEffect transition="in" filter="barn(outVertical)">
-                                          <p:cBhvr>
-                                            <p:cTn id="16" dur="500"/>
-                                            <p:tgtEl>
-                                              <p:spTgt spid="24"/>
-                                            </p:tgtEl>
-                                          </p:cBhvr>
-                                        </p:animEffect>
-                                      </p:childTnLst>
-                                    </p:cTn>
-                                  </p:par>
-                                </p:childTnLst>
-                              </p:cTn>
-                            </p:par>
-                            <p:par>
-                              <p:cTn id="17" fill="hold">
-                                <p:stCondLst>
-                                  <p:cond delay="1000"/>
-                                </p:stCondLst>
-                                <p:childTnLst>
-                                  <p:par>
-                                    <p:cTn id="18" presetID="53" presetClass="entr" presetSubtype="16" fill="hold" grpId="0" nodeType="afterEffect">
-                                      <p:stCondLst>
-                                        <p:cond delay="0"/>
-                                      </p:stCondLst>
-                                      <p:childTnLst>
-                                        <p:set>
-                                          <p:cBhvr>
-                                            <p:cTn id="19" dur="1" fill="hold">
-                                              <p:stCondLst>
-                                                <p:cond delay="0"/>
-                                              </p:stCondLst>
-                                            </p:cTn>
-                                            <p:tgtEl>
-                                              <p:spTgt spid="19"/>
-                                            </p:tgtEl>
-                                            <p:attrNameLst>
-                                              <p:attrName>style.visibility</p:attrName>
-                                            </p:attrNameLst>
-                                          </p:cBhvr>
-                                          <p:to>
-                                            <p:strVal val="visible"/>
-                                          </p:to>
-                                        </p:set>
-                                        <p:anim calcmode="lin" valueType="num">
-                                          <p:cBhvr>
-                                            <p:cTn id="20" dur="500" fill="hold"/>
-                                            <p:tgtEl>
-                                              <p:spTgt spid="19"/>
-                                            </p:tgtEl>
-                                            <p:attrNameLst>
-                                              <p:attrName>ppt_w</p:attrName>
-                                            </p:attrNameLst>
-                                          </p:cBhvr>
-                                          <p:tavLst>
-                                            <p:tav tm="0">
-                                              <p:val>
-                                                <p:fltVal val="0"/>
-                                              </p:val>
-                                            </p:tav>
-                                            <p:tav tm="100000">
-                                              <p:val>
-                                                <p:strVal val="#ppt_w"/>
-                                              </p:val>
-                                            </p:tav>
-                                          </p:tavLst>
-                                        </p:anim>
-                                        <p:anim calcmode="lin" valueType="num">
-                                          <p:cBhvr>
-                                            <p:cTn id="21" dur="500" fill="hold"/>
-                                            <p:tgtEl>
-                                              <p:spTgt spid="19"/>
-                                            </p:tgtEl>
-                                            <p:attrNameLst>
-                                              <p:attrName>ppt_h</p:attrName>
-                                            </p:attrNameLst>
-                                          </p:cBhvr>
-                                          <p:tavLst>
-                                            <p:tav tm="0">
-                                              <p:val>
-                                                <p:fltVal val="0"/>
-                                              </p:val>
-                                            </p:tav>
-                                            <p:tav tm="100000">
-                                              <p:val>
-                                                <p:strVal val="#ppt_h"/>
-                                              </p:val>
-                                            </p:tav>
-                                          </p:tavLst>
-                                        </p:anim>
-                                        <p:animEffect transition="in" filter="fade">
-                                          <p:cBhvr>
-                                            <p:cTn id="22" dur="500"/>
-                                            <p:tgtEl>
-                                              <p:spTgt spid="19"/>
-                                            </p:tgtEl>
-                                          </p:cBhvr>
-                                        </p:animEffect>
-                                      </p:childTnLst>
-                                    </p:cTn>
-                                  </p:par>
-                                </p:childTnLst>
-                              </p:cTn>
-                            </p:par>
-                            <p:par>
-                              <p:cTn id="23" fill="hold">
-                                <p:stCondLst>
-                                  <p:cond delay="1500"/>
-                                </p:stCondLst>
-                                <p:childTnLst>
-                                  <p:par>
-                                    <p:cTn id="24" presetID="50" presetClass="entr" presetSubtype="0" decel="100000" fill="hold" grpId="0" nodeType="afterEffect">
-                                      <p:stCondLst>
-                                        <p:cond delay="0"/>
-                                      </p:stCondLst>
-                                      <p:childTnLst>
-                                        <p:set>
-                                          <p:cBhvr>
-                                            <p:cTn id="25" dur="1" fill="hold">
-                                              <p:stCondLst>
-                                                <p:cond delay="0"/>
-                                              </p:stCondLst>
-                                            </p:cTn>
-                                            <p:tgtEl>
-                                              <p:spTgt spid="18"/>
-                                            </p:tgtEl>
-                                            <p:attrNameLst>
-                                              <p:attrName>style.visibility</p:attrName>
-                                            </p:attrNameLst>
-                                          </p:cBhvr>
-                                          <p:to>
-                                            <p:strVal val="visible"/>
-                                          </p:to>
-                                        </p:set>
-                                        <p:anim calcmode="lin" valueType="num">
-                                          <p:cBhvr>
-                                            <p:cTn id="26" dur="1000" fill="hold"/>
-                                            <p:tgtEl>
-                                              <p:spTgt spid="18"/>
-                                            </p:tgtEl>
-                                            <p:attrNameLst>
-                                              <p:attrName>ppt_w</p:attrName>
-                                            </p:attrNameLst>
-                                          </p:cBhvr>
-                                          <p:tavLst>
-                                            <p:tav tm="0">
-                                              <p:val>
-                                                <p:strVal val="#ppt_w+.3"/>
-                                              </p:val>
-                                            </p:tav>
-                                            <p:tav tm="100000">
-                                              <p:val>
-                                                <p:strVal val="#ppt_w"/>
-                                              </p:val>
-                                            </p:tav>
-                                          </p:tavLst>
-                                        </p:anim>
-                                        <p:anim calcmode="lin" valueType="num">
-                                          <p:cBhvr>
-                                            <p:cTn id="27" dur="1000" fill="hold"/>
-                                            <p:tgtEl>
-                                              <p:spTgt spid="18"/>
-                                            </p:tgtEl>
-                                            <p:attrNameLst>
-                                              <p:attrName>ppt_h</p:attrName>
-                                            </p:attrNameLst>
-                                          </p:cBhvr>
-                                          <p:tavLst>
-                                            <p:tav tm="0">
-                                              <p:val>
-                                                <p:strVal val="#ppt_h"/>
-                                              </p:val>
-                                            </p:tav>
-                                            <p:tav tm="100000">
-                                              <p:val>
-                                                <p:strVal val="#ppt_h"/>
-                                              </p:val>
-                                            </p:tav>
-                                          </p:tavLst>
-                                        </p:anim>
-                                        <p:animEffect transition="in" filter="fade">
-                                          <p:cBhvr>
-                                            <p:cTn id="28" dur="1000"/>
-                                            <p:tgtEl>
-                                              <p:spTgt spid="18"/>
-                                            </p:tgtEl>
-                                          </p:cBhvr>
-                                        </p:animEffect>
-                                      </p:childTnLst>
-                                    </p:cTn>
-                                  </p:par>
-                                  <p:par>
-                                    <p:cTn id="29" presetID="22" presetClass="entr" presetSubtype="1" fill="hold" grpId="0" nodeType="withEffect">
-                                      <p:stCondLst>
-                                        <p:cond delay="500"/>
-                                      </p:stCondLst>
-                                      <p:childTnLst>
-                                        <p:set>
-                                          <p:cBhvr>
-                                            <p:cTn id="30" dur="1" fill="hold">
-                                              <p:stCondLst>
-                                                <p:cond delay="0"/>
-                                              </p:stCondLst>
-                                            </p:cTn>
-                                            <p:tgtEl>
-                                              <p:spTgt spid="20"/>
-                                            </p:tgtEl>
-                                            <p:attrNameLst>
-                                              <p:attrName>style.visibility</p:attrName>
-                                            </p:attrNameLst>
-                                          </p:cBhvr>
-                                          <p:to>
-                                            <p:strVal val="visible"/>
-                                          </p:to>
-                                        </p:set>
-                                        <p:animEffect transition="in" filter="wipe(up)">
-                                          <p:cBhvr>
-                                            <p:cTn id="31" dur="500"/>
-                                            <p:tgtEl>
-                                              <p:spTgt spid="20"/>
-                                            </p:tgtEl>
-                                          </p:cBhvr>
-                                        </p:animEffect>
-                                      </p:childTnLst>
-                                    </p:cTn>
-                                  </p:par>
-                                </p:childTnLst>
-                              </p:cTn>
-                            </p:par>
-                            <p:par>
-                              <p:cTn id="32" fill="hold">
-                                <p:stCondLst>
-                                  <p:cond delay="2500"/>
-                                </p:stCondLst>
-                                <p:childTnLst>
-                                  <p:par>
-                                    <p:cTn id="33" presetID="2" presetClass="entr" presetSubtype="4" fill="hold" nodeType="afterEffect">
-                                      <p:stCondLst>
-                                        <p:cond delay="0"/>
-                                      </p:stCondLst>
-                                      <p:childTnLst>
-                                        <p:set>
-                                          <p:cBhvr>
-                                            <p:cTn id="34" dur="1" fill="hold">
-                                              <p:stCondLst>
-                                                <p:cond delay="0"/>
-                                              </p:stCondLst>
-                                            </p:cTn>
-                                            <p:tgtEl>
-                                              <p:spTgt spid="21"/>
-                                            </p:tgtEl>
-                                            <p:attrNameLst>
-                                              <p:attrName>style.visibility</p:attrName>
-                                            </p:attrNameLst>
-                                          </p:cBhvr>
-                                          <p:to>
-                                            <p:strVal val="visible"/>
-                                          </p:to>
-                                        </p:set>
-                                        <p:anim calcmode="lin" valueType="num">
-                                          <p:cBhvr additive="base">
-                                            <p:cTn id="35" dur="750" fill="hold"/>
-                                            <p:tgtEl>
-                                              <p:spTgt spid="21"/>
-                                            </p:tgtEl>
-                                            <p:attrNameLst>
-                                              <p:attrName>ppt_x</p:attrName>
-                                            </p:attrNameLst>
-                                          </p:cBhvr>
-                                          <p:tavLst>
-                                            <p:tav tm="0">
-                                              <p:val>
-                                                <p:strVal val="#ppt_x"/>
-                                              </p:val>
-                                            </p:tav>
-                                            <p:tav tm="100000">
-                                              <p:val>
-                                                <p:strVal val="#ppt_x"/>
-                                              </p:val>
-                                            </p:tav>
-                                          </p:tavLst>
-                                        </p:anim>
-                                        <p:anim calcmode="lin" valueType="num">
-                                          <p:cBhvr additive="base">
-                                            <p:cTn id="36" dur="750" fill="hold"/>
-                                            <p:tgtEl>
-                                              <p:spTgt spid="21"/>
-                                            </p:tgtEl>
-                                            <p:attrNameLst>
-                                              <p:attrName>ppt_y</p:attrName>
-                                            </p:attrNameLst>
-                                          </p:cBhvr>
-                                          <p:tavLst>
-                                            <p:tav tm="0">
-                                              <p:val>
-                                                <p:strVal val="1+#ppt_h/2"/>
-                                              </p:val>
-                                            </p:tav>
-                                            <p:tav tm="100000">
-                                              <p:val>
-                                                <p:strVal val="#ppt_y"/>
-                                              </p:val>
-                                            </p:tav>
-                                          </p:tavLst>
-                                        </p:anim>
-                                      </p:childTnLst>
-                                    </p:cTn>
-                                  </p:par>
-                                </p:childTnLst>
-                              </p:cTn>
-                            </p:par>
-                          </p:childTnLst>
-                        </p:cTn>
-                      </p:par>
-                    </p:childTnLst>
-                  </p:cTn>
-                  <p:prevCondLst>
-                    <p:cond evt="onPrev" delay="0">
-                      <p:tgtEl>
-                        <p:sldTgt/>
-                      </p:tgtEl>
-                    </p:cond>
-                  </p:prevCondLst>
-                  <p:nextCondLst>
-                    <p:cond evt="onNext" delay="0">
-                      <p:tgtEl>
-                        <p:sldTgt/>
-                      </p:tgtEl>
-                    </p:cond>
-                  </p:nextCondLst>
-                </p:seq>
-              </p:childTnLst>
-            </p:cTn>
-          </p:par>
-        </p:tnLst>
-        <p:bldLst>
-          <p:bldP spid="16" grpId="0"/>
-          <p:bldP spid="18" grpId="0"/>
-          <p:bldP spid="19" grpId="0"/>
-          <p:bldP spid="20" grpId="0"/>
-        </p:bldLst>
-      </p:timing>
-    </mc:Fallback>
-  </mc:AlternateContent>
+  <p:timing>
+    <p:tnLst>
+      <p:par>
+        <p:cTn id="1" dur="indefinite" restart="never" nodeType="tmRoot">
+          <p:childTnLst>
+            <p:seq concurrent="1" nextAc="seek">
+              <p:cTn id="2" dur="indefinite" nodeType="mainSeq">
+                <p:childTnLst>
+                  <p:par>
+                    <p:cTn id="3" fill="hold">
+                      <p:stCondLst>
+                        <p:cond delay="indefinite"/>
+                        <p:cond evt="onBegin" delay="0">
+                          <p:tn val="2"/>
+                        </p:cond>
+                      </p:stCondLst>
+                      <p:childTnLst>
+                        <p:par>
+                          <p:cTn id="4" fill="hold">
+                            <p:stCondLst>
+                              <p:cond delay="0"/>
+                            </p:stCondLst>
+                            <p:childTnLst>
+                              <p:par>
+                                <p:cTn id="5" presetID="16" presetClass="entr" presetSubtype="42" fill="hold" nodeType="withEffect">
+                                  <p:stCondLst>
+                                    <p:cond delay="0"/>
+                                  </p:stCondLst>
+                                  <p:childTnLst>
+                                    <p:set>
+                                      <p:cBhvr>
+                                        <p:cTn id="6" dur="1" fill="hold">
+                                          <p:stCondLst>
+                                            <p:cond delay="0"/>
+                                          </p:stCondLst>
+                                        </p:cTn>
+                                        <p:tgtEl>
+                                          <p:spTgt spid="15"/>
+                                        </p:tgtEl>
+                                        <p:attrNameLst>
+                                          <p:attrName>style.visibility</p:attrName>
+                                        </p:attrNameLst>
+                                      </p:cBhvr>
+                                      <p:to>
+                                        <p:strVal val="visible"/>
+                                      </p:to>
+                                    </p:set>
+                                    <p:animEffect transition="in" filter="barn(outHorizontal)">
+                                      <p:cBhvr>
+                                        <p:cTn id="7" dur="500"/>
+                                        <p:tgtEl>
+                                          <p:spTgt spid="15"/>
+                                        </p:tgtEl>
+                                      </p:cBhvr>
+                                    </p:animEffect>
+                                  </p:childTnLst>
+                                </p:cTn>
+                              </p:par>
+                              <p:par>
+                                <p:cTn id="8" presetID="53" presetClass="entr" presetSubtype="16" fill="hold" grpId="0" nodeType="withEffect">
+                                  <p:stCondLst>
+                                    <p:cond delay="0"/>
+                                  </p:stCondLst>
+                                  <p:childTnLst>
+                                    <p:set>
+                                      <p:cBhvr>
+                                        <p:cTn id="9" dur="1" fill="hold">
+                                          <p:stCondLst>
+                                            <p:cond delay="0"/>
+                                          </p:stCondLst>
+                                        </p:cTn>
+                                        <p:tgtEl>
+                                          <p:spTgt spid="16"/>
+                                        </p:tgtEl>
+                                        <p:attrNameLst>
+                                          <p:attrName>style.visibility</p:attrName>
+                                        </p:attrNameLst>
+                                      </p:cBhvr>
+                                      <p:to>
+                                        <p:strVal val="visible"/>
+                                      </p:to>
+                                    </p:set>
+                                    <p:anim calcmode="lin" valueType="num">
+                                      <p:cBhvr>
+                                        <p:cTn id="10" dur="500" fill="hold"/>
+                                        <p:tgtEl>
+                                          <p:spTgt spid="16"/>
+                                        </p:tgtEl>
+                                        <p:attrNameLst>
+                                          <p:attrName>ppt_w</p:attrName>
+                                        </p:attrNameLst>
+                                      </p:cBhvr>
+                                      <p:tavLst>
+                                        <p:tav tm="0">
+                                          <p:val>
+                                            <p:fltVal val="0"/>
+                                          </p:val>
+                                        </p:tav>
+                                        <p:tav tm="100000">
+                                          <p:val>
+                                            <p:strVal val="#ppt_w"/>
+                                          </p:val>
+                                        </p:tav>
+                                      </p:tavLst>
+                                    </p:anim>
+                                    <p:anim calcmode="lin" valueType="num">
+                                      <p:cBhvr>
+                                        <p:cTn id="11" dur="500" fill="hold"/>
+                                        <p:tgtEl>
+                                          <p:spTgt spid="16"/>
+                                        </p:tgtEl>
+                                        <p:attrNameLst>
+                                          <p:attrName>ppt_h</p:attrName>
+                                        </p:attrNameLst>
+                                      </p:cBhvr>
+                                      <p:tavLst>
+                                        <p:tav tm="0">
+                                          <p:val>
+                                            <p:fltVal val="0"/>
+                                          </p:val>
+                                        </p:tav>
+                                        <p:tav tm="100000">
+                                          <p:val>
+                                            <p:strVal val="#ppt_h"/>
+                                          </p:val>
+                                        </p:tav>
+                                      </p:tavLst>
+                                    </p:anim>
+                                    <p:animEffect transition="in" filter="fade">
+                                      <p:cBhvr>
+                                        <p:cTn id="12" dur="500"/>
+                                        <p:tgtEl>
+                                          <p:spTgt spid="16"/>
+                                        </p:tgtEl>
+                                      </p:cBhvr>
+                                    </p:animEffect>
+                                  </p:childTnLst>
+                                </p:cTn>
+                              </p:par>
+                            </p:childTnLst>
+                          </p:cTn>
+                        </p:par>
+                        <p:par>
+                          <p:cTn id="13" fill="hold">
+                            <p:stCondLst>
+                              <p:cond delay="500"/>
+                            </p:stCondLst>
+                            <p:childTnLst>
+                              <p:par>
+                                <p:cTn id="14" presetID="16" presetClass="entr" presetSubtype="37" fill="hold" nodeType="afterEffect">
+                                  <p:stCondLst>
+                                    <p:cond delay="0"/>
+                                  </p:stCondLst>
+                                  <p:childTnLst>
+                                    <p:set>
+                                      <p:cBhvr>
+                                        <p:cTn id="15" dur="1" fill="hold">
+                                          <p:stCondLst>
+                                            <p:cond delay="0"/>
+                                          </p:stCondLst>
+                                        </p:cTn>
+                                        <p:tgtEl>
+                                          <p:spTgt spid="24"/>
+                                        </p:tgtEl>
+                                        <p:attrNameLst>
+                                          <p:attrName>style.visibility</p:attrName>
+                                        </p:attrNameLst>
+                                      </p:cBhvr>
+                                      <p:to>
+                                        <p:strVal val="visible"/>
+                                      </p:to>
+                                    </p:set>
+                                    <p:animEffect transition="in" filter="barn(outVertical)">
+                                      <p:cBhvr>
+                                        <p:cTn id="16" dur="500"/>
+                                        <p:tgtEl>
+                                          <p:spTgt spid="24"/>
+                                        </p:tgtEl>
+                                      </p:cBhvr>
+                                    </p:animEffect>
+                                  </p:childTnLst>
+                                </p:cTn>
+                              </p:par>
+                            </p:childTnLst>
+                          </p:cTn>
+                        </p:par>
+                        <p:par>
+                          <p:cTn id="17" fill="hold">
+                            <p:stCondLst>
+                              <p:cond delay="1000"/>
+                            </p:stCondLst>
+                            <p:childTnLst>
+                              <p:par>
+                                <p:cTn id="18" presetID="53" presetClass="entr" presetSubtype="16" fill="hold" grpId="0" nodeType="afterEffect">
+                                  <p:stCondLst>
+                                    <p:cond delay="0"/>
+                                  </p:stCondLst>
+                                  <p:childTnLst>
+                                    <p:set>
+                                      <p:cBhvr>
+                                        <p:cTn id="19" dur="1" fill="hold">
+                                          <p:stCondLst>
+                                            <p:cond delay="0"/>
+                                          </p:stCondLst>
+                                        </p:cTn>
+                                        <p:tgtEl>
+                                          <p:spTgt spid="19"/>
+                                        </p:tgtEl>
+                                        <p:attrNameLst>
+                                          <p:attrName>style.visibility</p:attrName>
+                                        </p:attrNameLst>
+                                      </p:cBhvr>
+                                      <p:to>
+                                        <p:strVal val="visible"/>
+                                      </p:to>
+                                    </p:set>
+                                    <p:anim calcmode="lin" valueType="num">
+                                      <p:cBhvr>
+                                        <p:cTn id="20" dur="500" fill="hold"/>
+                                        <p:tgtEl>
+                                          <p:spTgt spid="19"/>
+                                        </p:tgtEl>
+                                        <p:attrNameLst>
+                                          <p:attrName>ppt_w</p:attrName>
+                                        </p:attrNameLst>
+                                      </p:cBhvr>
+                                      <p:tavLst>
+                                        <p:tav tm="0">
+                                          <p:val>
+                                            <p:fltVal val="0"/>
+                                          </p:val>
+                                        </p:tav>
+                                        <p:tav tm="100000">
+                                          <p:val>
+                                            <p:strVal val="#ppt_w"/>
+                                          </p:val>
+                                        </p:tav>
+                                      </p:tavLst>
+                                    </p:anim>
+                                    <p:anim calcmode="lin" valueType="num">
+                                      <p:cBhvr>
+                                        <p:cTn id="21" dur="500" fill="hold"/>
+                                        <p:tgtEl>
+                                          <p:spTgt spid="19"/>
+                                        </p:tgtEl>
+                                        <p:attrNameLst>
+                                          <p:attrName>ppt_h</p:attrName>
+                                        </p:attrNameLst>
+                                      </p:cBhvr>
+                                      <p:tavLst>
+                                        <p:tav tm="0">
+                                          <p:val>
+                                            <p:fltVal val="0"/>
+                                          </p:val>
+                                        </p:tav>
+                                        <p:tav tm="100000">
+                                          <p:val>
+                                            <p:strVal val="#ppt_h"/>
+                                          </p:val>
+                                        </p:tav>
+                                      </p:tavLst>
+                                    </p:anim>
+                                    <p:animEffect transition="in" filter="fade">
+                                      <p:cBhvr>
+                                        <p:cTn id="22" dur="500"/>
+                                        <p:tgtEl>
+                                          <p:spTgt spid="19"/>
+                                        </p:tgtEl>
+                                      </p:cBhvr>
+                                    </p:animEffect>
+                                  </p:childTnLst>
+                                </p:cTn>
+                              </p:par>
+                            </p:childTnLst>
+                          </p:cTn>
+                        </p:par>
+                      </p:childTnLst>
+                    </p:cTn>
+                  </p:par>
+                </p:childTnLst>
+              </p:cTn>
+              <p:prevCondLst>
+                <p:cond evt="onPrev" delay="0">
+                  <p:tgtEl>
+                    <p:sldTgt/>
+                  </p:tgtEl>
+                </p:cond>
+              </p:prevCondLst>
+              <p:nextCondLst>
+                <p:cond evt="onNext" delay="0">
+                  <p:tgtEl>
+                    <p:sldTgt/>
+                  </p:tgtEl>
+                </p:cond>
+              </p:nextCondLst>
+            </p:seq>
+          </p:childTnLst>
+        </p:cTn>
+      </p:par>
+    </p:tnLst>
+    <p:bldLst>
+      <p:bldP spid="16" grpId="0"/>
+      <p:bldP spid="19" grpId="0"/>
+    </p:bldLst>
+  </p:timing>
 </p:sld>
 </file>
 
@@ -10168,6 +9420,13 @@
               </a:rPr>
               <a:t>Final requirements, design proposal, project management approach based on project is included,</a:t>
             </a:r>
+            <a:endParaRPr lang="en-US" altLang="zh-CN" sz="2000" b="1" dirty="0">
+              <a:solidFill>
+                <a:srgbClr val="CBBC91"/>
+              </a:solidFill>
+              <a:ea typeface="微软雅黑" panose="020B0503020204020204" pitchFamily="34" charset="-122"/>
+              <a:cs typeface="+mn-ea"/>
+            </a:endParaRPr>
           </a:p>
           <a:p>
             <a:pPr marL="342900" indent="-342900" algn="just">
@@ -10184,6 +9443,13 @@
               </a:rPr>
               <a:t>Roaster management system is web-based software that lets manage availability of workforce and allocate work to them,</a:t>
             </a:r>
+            <a:endParaRPr lang="en-US" altLang="zh-CN" sz="2000" b="1" dirty="0">
+              <a:solidFill>
+                <a:srgbClr val="CBBC91"/>
+              </a:solidFill>
+              <a:ea typeface="微软雅黑" panose="020B0503020204020204" pitchFamily="34" charset="-122"/>
+              <a:cs typeface="+mn-ea"/>
+            </a:endParaRPr>
           </a:p>
           <a:p>
             <a:pPr marL="342900" indent="-342900" algn="just">
@@ -10200,6 +9466,13 @@
               </a:rPr>
               <a:t>Helps to create rostering rules, manage roasters update and create availability reports,</a:t>
             </a:r>
+            <a:endParaRPr lang="en-US" altLang="zh-CN" sz="2000" b="1" dirty="0">
+              <a:solidFill>
+                <a:srgbClr val="CBBC91"/>
+              </a:solidFill>
+              <a:ea typeface="微软雅黑" panose="020B0503020204020204" pitchFamily="34" charset="-122"/>
+              <a:cs typeface="+mn-ea"/>
+            </a:endParaRPr>
           </a:p>
           <a:p>
             <a:pPr marL="342900" indent="-342900" algn="just">
@@ -10216,6 +9489,13 @@
               </a:rPr>
               <a:t>User friendly, simple and flexible website and allow both client and contractors to view and manage roasters</a:t>
             </a:r>
+            <a:endParaRPr lang="en-US" altLang="zh-CN" sz="2000" b="1" dirty="0">
+              <a:solidFill>
+                <a:srgbClr val="CBBC91"/>
+              </a:solidFill>
+              <a:ea typeface="微软雅黑" panose="020B0503020204020204" pitchFamily="34" charset="-122"/>
+              <a:cs typeface="+mn-ea"/>
+            </a:endParaRPr>
           </a:p>
           <a:p>
             <a:pPr marL="342900" indent="-342900" algn="just">
@@ -10232,6 +9512,13 @@
               </a:rPr>
               <a:t>Enables to create roasters , assign different staff to different shifts and edit the shifts of the staffs</a:t>
             </a:r>
+            <a:endParaRPr lang="en-US" altLang="zh-CN" sz="2000" b="1" dirty="0">
+              <a:solidFill>
+                <a:srgbClr val="CBBC91"/>
+              </a:solidFill>
+              <a:ea typeface="微软雅黑" panose="020B0503020204020204" pitchFamily="34" charset="-122"/>
+              <a:cs typeface="+mn-ea"/>
+            </a:endParaRPr>
           </a:p>
           <a:p>
             <a:pPr>
@@ -10264,7 +9551,7 @@
             <a:avLst/>
           </a:prstGeom>
           <a:blipFill dpi="0" rotWithShape="1">
-            <a:blip r:embed="rId3">
+            <a:blip r:embed="rId1">
               <a:extLst>
                 <a:ext uri="{28A0092B-C50C-407E-A947-70E740481C1C}">
                   <a14:useLocalDpi xmlns:a14="http://schemas.microsoft.com/office/drawing/2010/main" val="0"/>
@@ -10320,9 +9607,7 @@
       <p:sp>
         <p:nvSpPr>
           <p:cNvPr id="24" name="Title 1"/>
-          <p:cNvSpPr txBox="1">
-            <a:spLocks/>
-          </p:cNvSpPr>
+          <p:cNvSpPr txBox="1"/>
           <p:nvPr/>
         </p:nvSpPr>
         <p:spPr>
@@ -10408,11 +9693,7 @@
           </a:ln>
         </p:spPr>
         <p:txBody>
-          <a:bodyPr vert="horz" wrap="square" lIns="91440" tIns="45720" rIns="91440" bIns="45720" numCol="1" rtlCol="0" anchor="t" anchorCtr="0" compatLnSpc="1">
-            <a:prstTxWarp prst="textNoShape">
-              <a:avLst/>
-            </a:prstTxWarp>
-          </a:bodyPr>
+          <a:bodyPr vert="horz" wrap="square" lIns="91440" tIns="45720" rIns="91440" bIns="45720" numCol="1" rtlCol="0" anchor="t" anchorCtr="0" compatLnSpc="1"/>
           <a:lstStyle/>
           <a:p>
             <a:pPr algn="ctr"/>
@@ -10447,8 +9728,6 @@
               <a:srgbClr val="CBBC91"/>
             </a:solidFill>
             <a:miter lim="800000"/>
-            <a:headEnd/>
-            <a:tailEnd/>
           </a:ln>
           <a:effectLst>
             <a:outerShdw blurRad="254000" dist="63500" dir="2700000" algn="tl" rotWithShape="0">
@@ -10459,11 +9738,7 @@
           </a:effectLst>
         </p:spPr>
         <p:txBody>
-          <a:bodyPr vert="horz" wrap="square" lIns="91440" tIns="45720" rIns="91440" bIns="45720" numCol="1" rtlCol="0" anchor="t" anchorCtr="0" compatLnSpc="1">
-            <a:prstTxWarp prst="textNoShape">
-              <a:avLst/>
-            </a:prstTxWarp>
-          </a:bodyPr>
+          <a:bodyPr vert="horz" wrap="square" lIns="91440" tIns="45720" rIns="91440" bIns="45720" numCol="1" rtlCol="0" anchor="t" anchorCtr="0" compatLnSpc="1"/>
           <a:lstStyle/>
           <a:p>
             <a:pPr algn="ctr"/>
@@ -10491,13 +9766,7 @@
       </p:sp>
       <p:sp>
         <p:nvSpPr>
-          <p:cNvPr id="29" name="矩形 28">
-            <a:extLst>
-              <a:ext uri="{FF2B5EF4-FFF2-40B4-BE49-F238E27FC236}">
-                <a16:creationId xmlns:a16="http://schemas.microsoft.com/office/drawing/2014/main" id="{F6A31755-479E-4DB0-BA09-4B6AAC0970C9}"/>
-              </a:ext>
-            </a:extLst>
-          </p:cNvPr>
+          <p:cNvPr id="29" name="矩形 28"/>
           <p:cNvSpPr/>
           <p:nvPr/>
         </p:nvSpPr>
@@ -10563,22 +9832,17 @@
         </p:txBody>
       </p:sp>
     </p:spTree>
-    <p:extLst>
-      <p:ext uri="{BB962C8B-B14F-4D97-AF65-F5344CB8AC3E}">
-        <p14:creationId xmlns:p14="http://schemas.microsoft.com/office/powerpoint/2010/main" val="2378929710"/>
-      </p:ext>
-    </p:extLst>
   </p:cSld>
   <p:clrMapOvr>
     <a:masterClrMapping/>
   </p:clrMapOvr>
-  <mc:AlternateContent xmlns:mc="http://schemas.openxmlformats.org/markup-compatibility/2006" xmlns:p14="http://schemas.microsoft.com/office/powerpoint/2010/main">
-    <mc:Choice Requires="p14">
+  <mc:AlternateContent xmlns:mc="http://schemas.openxmlformats.org/markup-compatibility/2006">
+    <mc:Choice xmlns:p14="http://schemas.microsoft.com/office/powerpoint/2010/main" Requires="p14">
       <p:transition spd="med" p14:dur="700" advClick="0" advTm="0">
         <p:fade/>
       </p:transition>
     </mc:Choice>
-    <mc:Fallback xmlns="">
+    <mc:Fallback>
       <p:transition spd="med" advClick="0" advTm="0">
         <p:fade/>
       </p:transition>
@@ -10683,7 +9947,7 @@
                         <p:par>
                           <p:cTn id="11" fill="hold">
                             <p:stCondLst>
-                              <p:cond delay="1250"/>
+                              <p:cond delay="500"/>
                             </p:stCondLst>
                             <p:childTnLst>
                               <p:par>
@@ -11025,24 +10289,28 @@
               <a:rPr lang="en-US" altLang="zh-CN" sz="2800" noProof="1"/>
               <a:t>1. Target</a:t>
             </a:r>
+            <a:endParaRPr lang="en-US" altLang="zh-CN" sz="2800" noProof="1"/>
           </a:p>
           <a:p>
             <a:r>
               <a:rPr lang="en-US" altLang="zh-CN" sz="2800" noProof="1"/>
               <a:t>In order to better manage human resources and communicate work goals more conveniently.</a:t>
             </a:r>
+            <a:endParaRPr lang="en-US" altLang="zh-CN" sz="2800" noProof="1"/>
           </a:p>
           <a:p>
             <a:r>
               <a:rPr lang="en-US" altLang="zh-CN" sz="2800" noProof="1"/>
               <a:t>2. Platform</a:t>
             </a:r>
+            <a:endParaRPr lang="en-US" altLang="zh-CN" sz="2800" noProof="1"/>
           </a:p>
           <a:p>
             <a:r>
               <a:rPr lang="en-US" altLang="zh-CN" sz="2800" noProof="1"/>
-              <a:t>The system will be done in the form of a web page containing a database. Basic operations can be done through devices such as mobile phones or tablets.</a:t>
+              <a:t>The system will be done in the form of a application software containing a database. Basic operations can be done through  mobile phones or tablets.</a:t>
             </a:r>
+            <a:endParaRPr lang="en-US" altLang="zh-CN" sz="2800" noProof="1"/>
           </a:p>
         </p:txBody>
       </p:sp>
@@ -11076,13 +10344,7 @@
           </p:grpSpPr>
           <p:sp>
             <p:nvSpPr>
-              <p:cNvPr id="42" name="TextBox 6">
-                <a:extLst>
-                  <a:ext uri="{FF2B5EF4-FFF2-40B4-BE49-F238E27FC236}">
-                    <a16:creationId xmlns:a16="http://schemas.microsoft.com/office/drawing/2014/main" id="{8083E77C-E488-400A-8503-359C6655BD40}"/>
-                  </a:ext>
-                </a:extLst>
-              </p:cNvPr>
+              <p:cNvPr id="42" name="TextBox 6"/>
               <p:cNvSpPr txBox="1"/>
               <p:nvPr/>
             </p:nvSpPr>
@@ -11102,7 +10364,7 @@
               </a:bodyPr>
               <a:lstStyle/>
               <a:p>
-                <a:pPr defTabSz="1219020"/>
+                <a:pPr defTabSz="1219200"/>
                 <a:r>
                   <a:rPr lang="en-US" altLang="zh-CN" sz="2000" dirty="0">
                     <a:solidFill>
@@ -11128,13 +10390,7 @@
           </p:sp>
           <p:sp>
             <p:nvSpPr>
-              <p:cNvPr id="43" name="TextBox 7">
-                <a:extLst>
-                  <a:ext uri="{FF2B5EF4-FFF2-40B4-BE49-F238E27FC236}">
-                    <a16:creationId xmlns:a16="http://schemas.microsoft.com/office/drawing/2014/main" id="{BAF49D56-8FCD-4804-8411-594F1BC85F38}"/>
-                  </a:ext>
-                </a:extLst>
-              </p:cNvPr>
+              <p:cNvPr id="43" name="TextBox 7"/>
               <p:cNvSpPr txBox="1"/>
               <p:nvPr/>
             </p:nvSpPr>
@@ -11154,7 +10410,7 @@
               </a:bodyPr>
               <a:lstStyle/>
               <a:p>
-                <a:pPr defTabSz="1219020"/>
+                <a:pPr defTabSz="1219200"/>
                 <a:endParaRPr lang="zh-CN" altLang="en-US" sz="2800" dirty="0">
                   <a:solidFill>
                     <a:srgbClr val="CBBC91"/>
@@ -11237,22 +10493,17 @@
         </p:sp>
       </p:grpSp>
     </p:spTree>
-    <p:extLst>
-      <p:ext uri="{BB962C8B-B14F-4D97-AF65-F5344CB8AC3E}">
-        <p14:creationId xmlns:p14="http://schemas.microsoft.com/office/powerpoint/2010/main" val="2967393949"/>
-      </p:ext>
-    </p:extLst>
   </p:cSld>
   <p:clrMapOvr>
     <a:masterClrMapping/>
   </p:clrMapOvr>
-  <mc:AlternateContent xmlns:mc="http://schemas.openxmlformats.org/markup-compatibility/2006" xmlns:p14="http://schemas.microsoft.com/office/powerpoint/2010/main">
-    <mc:Choice Requires="p14">
+  <mc:AlternateContent xmlns:mc="http://schemas.openxmlformats.org/markup-compatibility/2006">
+    <mc:Choice xmlns:p14="http://schemas.microsoft.com/office/powerpoint/2010/main" Requires="p14">
       <p:transition spd="med" p14:dur="700" advClick="0" advTm="0">
         <p:fade/>
       </p:transition>
     </mc:Choice>
-    <mc:Fallback xmlns="">
+    <mc:Fallback>
       <p:transition spd="med" advClick="0" advTm="0">
         <p:fade/>
       </p:transition>
@@ -11603,13 +10854,7 @@
       </p:grpSpPr>
       <p:sp>
         <p:nvSpPr>
-          <p:cNvPr id="24" name="文本框 23">
-            <a:extLst>
-              <a:ext uri="{FF2B5EF4-FFF2-40B4-BE49-F238E27FC236}">
-                <a16:creationId xmlns:a16="http://schemas.microsoft.com/office/drawing/2014/main" id="{DDEF92AB-ECBF-4BC6-851A-C74C7CEB3151}"/>
-              </a:ext>
-            </a:extLst>
-          </p:cNvPr>
+          <p:cNvPr id="24" name="文本框 23"/>
           <p:cNvSpPr txBox="1"/>
           <p:nvPr/>
         </p:nvSpPr>
@@ -11641,116 +10886,6 @@
               </a:rPr>
               <a:t>work process</a:t>
             </a:r>
-          </a:p>
-          <a:p>
-            <a:pPr>
-              <a:buFontTx/>
-              <a:buAutoNum type="romanUcPeriod"/>
-            </a:pPr>
-            <a:r>
-              <a:rPr lang="en-US" altLang="zh-CN" sz="3600" dirty="0">
-                <a:solidFill>
-                  <a:schemeClr val="accent4">
-                    <a:lumMod val="40000"/>
-                    <a:lumOff val="60000"/>
-                  </a:schemeClr>
-                </a:solidFill>
-                <a:ea typeface="宋体" panose="02010600030101010101" pitchFamily="2" charset="-122"/>
-              </a:rPr>
-              <a:t>Staff registered an account</a:t>
-            </a:r>
-          </a:p>
-          <a:p>
-            <a:pPr>
-              <a:buFontTx/>
-              <a:buAutoNum type="romanUcPeriod"/>
-            </a:pPr>
-            <a:r>
-              <a:rPr lang="en-US" altLang="zh-CN" sz="3600" dirty="0">
-                <a:solidFill>
-                  <a:schemeClr val="accent4">
-                    <a:lumMod val="40000"/>
-                    <a:lumOff val="60000"/>
-                  </a:schemeClr>
-                </a:solidFill>
-                <a:ea typeface="宋体" panose="02010600030101010101" pitchFamily="2" charset="-122"/>
-              </a:rPr>
-              <a:t>Log in to your account and fill in the working hours for each day of the week</a:t>
-            </a:r>
-          </a:p>
-          <a:p>
-            <a:pPr>
-              <a:buFontTx/>
-              <a:buAutoNum type="romanUcPeriod"/>
-            </a:pPr>
-            <a:r>
-              <a:rPr lang="en-US" altLang="zh-CN" sz="3600" dirty="0">
-                <a:solidFill>
-                  <a:schemeClr val="accent4">
-                    <a:lumMod val="40000"/>
-                    <a:lumOff val="60000"/>
-                  </a:schemeClr>
-                </a:solidFill>
-                <a:ea typeface="宋体" panose="02010600030101010101" pitchFamily="2" charset="-122"/>
-              </a:rPr>
-              <a:t>Managers enter the dashboard page</a:t>
-            </a:r>
-          </a:p>
-          <a:p>
-            <a:pPr>
-              <a:buFontTx/>
-              <a:buAutoNum type="romanUcPeriod"/>
-            </a:pPr>
-            <a:r>
-              <a:rPr lang="en-US" altLang="zh-CN" sz="3600" dirty="0">
-                <a:solidFill>
-                  <a:schemeClr val="accent4">
-                    <a:lumMod val="40000"/>
-                    <a:lumOff val="60000"/>
-                  </a:schemeClr>
-                </a:solidFill>
-                <a:ea typeface="宋体" panose="02010600030101010101" pitchFamily="2" charset="-122"/>
-              </a:rPr>
-              <a:t>Managers create work items</a:t>
-            </a:r>
-          </a:p>
-          <a:p>
-            <a:pPr>
-              <a:buFontTx/>
-              <a:buAutoNum type="romanUcPeriod"/>
-            </a:pPr>
-            <a:r>
-              <a:rPr lang="en-US" altLang="zh-CN" sz="3600" dirty="0">
-                <a:solidFill>
-                  <a:schemeClr val="accent4">
-                    <a:lumMod val="40000"/>
-                    <a:lumOff val="60000"/>
-                  </a:schemeClr>
-                </a:solidFill>
-                <a:ea typeface="宋体" panose="02010600030101010101" pitchFamily="2" charset="-122"/>
-              </a:rPr>
-              <a:t>Select an employee's work item</a:t>
-            </a:r>
-          </a:p>
-          <a:p>
-            <a:pPr>
-              <a:buFontTx/>
-              <a:buAutoNum type="romanUcPeriod"/>
-            </a:pPr>
-            <a:r>
-              <a:rPr lang="en-US" altLang="zh-CN" sz="3600" dirty="0">
-                <a:solidFill>
-                  <a:schemeClr val="accent4">
-                    <a:lumMod val="40000"/>
-                    <a:lumOff val="60000"/>
-                  </a:schemeClr>
-                </a:solidFill>
-                <a:ea typeface="宋体" panose="02010600030101010101" pitchFamily="2" charset="-122"/>
-              </a:rPr>
-              <a:t>Calculate the weekly working hours of employees and calculate their wages.</a:t>
-            </a:r>
-          </a:p>
-          <a:p>
             <a:endParaRPr lang="en-US" altLang="zh-CN" sz="3600" dirty="0">
               <a:solidFill>
                 <a:schemeClr val="accent4">
@@ -11761,25 +10896,193 @@
               <a:ea typeface="宋体" panose="02010600030101010101" pitchFamily="2" charset="-122"/>
             </a:endParaRPr>
           </a:p>
+          <a:p>
+            <a:pPr>
+              <a:buFontTx/>
+              <a:buAutoNum type="romanUcPeriod"/>
+            </a:pPr>
+            <a:r>
+              <a:rPr lang="en-US" altLang="zh-CN" sz="3600" dirty="0">
+                <a:solidFill>
+                  <a:schemeClr val="accent4">
+                    <a:lumMod val="40000"/>
+                    <a:lumOff val="60000"/>
+                  </a:schemeClr>
+                </a:solidFill>
+                <a:ea typeface="宋体" panose="02010600030101010101" pitchFamily="2" charset="-122"/>
+              </a:rPr>
+              <a:t>Staff registered an account</a:t>
+            </a:r>
+            <a:endParaRPr lang="en-US" altLang="zh-CN" sz="3600" dirty="0">
+              <a:solidFill>
+                <a:schemeClr val="accent4">
+                  <a:lumMod val="40000"/>
+                  <a:lumOff val="60000"/>
+                </a:schemeClr>
+              </a:solidFill>
+              <a:ea typeface="宋体" panose="02010600030101010101" pitchFamily="2" charset="-122"/>
+            </a:endParaRPr>
+          </a:p>
+          <a:p>
+            <a:pPr>
+              <a:buFontTx/>
+              <a:buAutoNum type="romanUcPeriod"/>
+            </a:pPr>
+            <a:r>
+              <a:rPr lang="en-US" altLang="zh-CN" sz="3600" dirty="0">
+                <a:solidFill>
+                  <a:schemeClr val="accent4">
+                    <a:lumMod val="40000"/>
+                    <a:lumOff val="60000"/>
+                  </a:schemeClr>
+                </a:solidFill>
+                <a:ea typeface="宋体" panose="02010600030101010101" pitchFamily="2" charset="-122"/>
+              </a:rPr>
+              <a:t>Log in to your account and fill in the working hours for each day of the week</a:t>
+            </a:r>
+            <a:endParaRPr lang="en-US" altLang="zh-CN" sz="3600" dirty="0">
+              <a:solidFill>
+                <a:schemeClr val="accent4">
+                  <a:lumMod val="40000"/>
+                  <a:lumOff val="60000"/>
+                </a:schemeClr>
+              </a:solidFill>
+              <a:ea typeface="宋体" panose="02010600030101010101" pitchFamily="2" charset="-122"/>
+            </a:endParaRPr>
+          </a:p>
+          <a:p>
+            <a:pPr>
+              <a:buFontTx/>
+              <a:buAutoNum type="romanUcPeriod"/>
+            </a:pPr>
+            <a:r>
+              <a:rPr lang="en-US" altLang="zh-CN" sz="3600" dirty="0">
+                <a:solidFill>
+                  <a:schemeClr val="accent4">
+                    <a:lumMod val="40000"/>
+                    <a:lumOff val="60000"/>
+                  </a:schemeClr>
+                </a:solidFill>
+                <a:ea typeface="宋体" panose="02010600030101010101" pitchFamily="2" charset="-122"/>
+              </a:rPr>
+              <a:t>Managers enter the dashboard page</a:t>
+            </a:r>
+            <a:endParaRPr lang="en-US" altLang="zh-CN" sz="3600" dirty="0">
+              <a:solidFill>
+                <a:schemeClr val="accent4">
+                  <a:lumMod val="40000"/>
+                  <a:lumOff val="60000"/>
+                </a:schemeClr>
+              </a:solidFill>
+              <a:ea typeface="宋体" panose="02010600030101010101" pitchFamily="2" charset="-122"/>
+            </a:endParaRPr>
+          </a:p>
+          <a:p>
+            <a:pPr>
+              <a:buFontTx/>
+              <a:buAutoNum type="romanUcPeriod"/>
+            </a:pPr>
+            <a:r>
+              <a:rPr lang="en-US" altLang="zh-CN" sz="3600" dirty="0">
+                <a:solidFill>
+                  <a:schemeClr val="accent4">
+                    <a:lumMod val="40000"/>
+                    <a:lumOff val="60000"/>
+                  </a:schemeClr>
+                </a:solidFill>
+                <a:ea typeface="宋体" panose="02010600030101010101" pitchFamily="2" charset="-122"/>
+              </a:rPr>
+              <a:t>Managers create work items</a:t>
+            </a:r>
+            <a:endParaRPr lang="en-US" altLang="zh-CN" sz="3600" dirty="0">
+              <a:solidFill>
+                <a:schemeClr val="accent4">
+                  <a:lumMod val="40000"/>
+                  <a:lumOff val="60000"/>
+                </a:schemeClr>
+              </a:solidFill>
+              <a:ea typeface="宋体" panose="02010600030101010101" pitchFamily="2" charset="-122"/>
+            </a:endParaRPr>
+          </a:p>
+          <a:p>
+            <a:pPr>
+              <a:buFontTx/>
+              <a:buAutoNum type="romanUcPeriod"/>
+            </a:pPr>
+            <a:r>
+              <a:rPr lang="en-US" altLang="zh-CN" sz="3600" dirty="0">
+                <a:solidFill>
+                  <a:schemeClr val="accent4">
+                    <a:lumMod val="40000"/>
+                    <a:lumOff val="60000"/>
+                  </a:schemeClr>
+                </a:solidFill>
+                <a:ea typeface="宋体" panose="02010600030101010101" pitchFamily="2" charset="-122"/>
+              </a:rPr>
+              <a:t>Select an employee's work item</a:t>
+            </a:r>
+            <a:endParaRPr lang="en-US" altLang="zh-CN" sz="3600" dirty="0">
+              <a:solidFill>
+                <a:schemeClr val="accent4">
+                  <a:lumMod val="40000"/>
+                  <a:lumOff val="60000"/>
+                </a:schemeClr>
+              </a:solidFill>
+              <a:ea typeface="宋体" panose="02010600030101010101" pitchFamily="2" charset="-122"/>
+            </a:endParaRPr>
+          </a:p>
+          <a:p>
+            <a:pPr>
+              <a:buFontTx/>
+              <a:buAutoNum type="romanUcPeriod"/>
+            </a:pPr>
+            <a:r>
+              <a:rPr lang="en-US" altLang="zh-CN" sz="3600" dirty="0">
+                <a:solidFill>
+                  <a:schemeClr val="accent4">
+                    <a:lumMod val="40000"/>
+                    <a:lumOff val="60000"/>
+                  </a:schemeClr>
+                </a:solidFill>
+                <a:ea typeface="宋体" panose="02010600030101010101" pitchFamily="2" charset="-122"/>
+              </a:rPr>
+              <a:t>Calculate the weekly working hours of employees and calculate their wages.</a:t>
+            </a:r>
+            <a:endParaRPr lang="en-US" altLang="zh-CN" sz="3600" dirty="0">
+              <a:solidFill>
+                <a:schemeClr val="accent4">
+                  <a:lumMod val="40000"/>
+                  <a:lumOff val="60000"/>
+                </a:schemeClr>
+              </a:solidFill>
+              <a:ea typeface="宋体" panose="02010600030101010101" pitchFamily="2" charset="-122"/>
+            </a:endParaRPr>
+          </a:p>
+          <a:p>
+            <a:endParaRPr lang="en-US" altLang="zh-CN" sz="3600" dirty="0">
+              <a:solidFill>
+                <a:schemeClr val="accent4">
+                  <a:lumMod val="40000"/>
+                  <a:lumOff val="60000"/>
+                </a:schemeClr>
+              </a:solidFill>
+              <a:ea typeface="宋体" panose="02010600030101010101" pitchFamily="2" charset="-122"/>
+            </a:endParaRPr>
+          </a:p>
         </p:txBody>
       </p:sp>
     </p:spTree>
-    <p:extLst>
-      <p:ext uri="{BB962C8B-B14F-4D97-AF65-F5344CB8AC3E}">
-        <p14:creationId xmlns:p14="http://schemas.microsoft.com/office/powerpoint/2010/main" val="2164314215"/>
-      </p:ext>
-    </p:extLst>
   </p:cSld>
   <p:clrMapOvr>
     <a:masterClrMapping/>
   </p:clrMapOvr>
-  <mc:AlternateContent xmlns:mc="http://schemas.openxmlformats.org/markup-compatibility/2006" xmlns:p14="http://schemas.microsoft.com/office/powerpoint/2010/main">
-    <mc:Choice Requires="p14">
+  <mc:AlternateContent xmlns:mc="http://schemas.openxmlformats.org/markup-compatibility/2006">
+    <mc:Choice xmlns:p14="http://schemas.microsoft.com/office/powerpoint/2010/main" Requires="p14">
       <p:transition spd="med" p14:dur="700" advClick="0" advTm="2000">
         <p:fade/>
       </p:transition>
     </mc:Choice>
-    <mc:Fallback xmlns="">
+    <mc:Fallback>
       <p:transition spd="med" advClick="0" advTm="2000">
         <p:fade/>
       </p:transition>
@@ -11807,13 +11110,7 @@
       </p:grpSpPr>
       <p:sp>
         <p:nvSpPr>
-          <p:cNvPr id="45" name="TextBox 7">
-            <a:extLst>
-              <a:ext uri="{FF2B5EF4-FFF2-40B4-BE49-F238E27FC236}">
-                <a16:creationId xmlns:a16="http://schemas.microsoft.com/office/drawing/2014/main" id="{BAF49D56-8FCD-4804-8411-594F1BC85F38}"/>
-              </a:ext>
-            </a:extLst>
-          </p:cNvPr>
+          <p:cNvPr id="45" name="TextBox 7"/>
           <p:cNvSpPr txBox="1"/>
           <p:nvPr/>
         </p:nvSpPr>
@@ -11833,7 +11130,7 @@
           </a:bodyPr>
           <a:lstStyle/>
           <a:p>
-            <a:pPr defTabSz="1219020"/>
+            <a:pPr defTabSz="1219200"/>
             <a:r>
               <a:rPr lang="en-US" altLang="zh-CN" sz="2800" dirty="0">
                 <a:solidFill>
@@ -11857,20 +11154,14 @@
       </p:sp>
       <p:pic>
         <p:nvPicPr>
-          <p:cNvPr id="35" name="Picture 1">
-            <a:extLst>
-              <a:ext uri="{FF2B5EF4-FFF2-40B4-BE49-F238E27FC236}">
-                <a16:creationId xmlns:a16="http://schemas.microsoft.com/office/drawing/2014/main" id="{F20DC6D6-8C34-4114-B882-53B2F59AA81B}"/>
-              </a:ext>
-            </a:extLst>
-          </p:cNvPr>
+          <p:cNvPr id="35" name="Picture 1"/>
           <p:cNvPicPr>
             <a:picLocks noChangeAspect="1" noChangeArrowheads="1"/>
           </p:cNvPicPr>
           <p:nvPr/>
         </p:nvPicPr>
         <p:blipFill>
-          <a:blip r:embed="rId3">
+          <a:blip r:embed="rId1">
             <a:extLst>
               <a:ext uri="{28A0092B-C50C-407E-A947-70E740481C1C}">
                 <a14:useLocalDpi xmlns:a14="http://schemas.microsoft.com/office/drawing/2010/main" val="0"/>
@@ -11916,22 +11207,17 @@
         </p:spPr>
       </p:pic>
     </p:spTree>
-    <p:extLst>
-      <p:ext uri="{BB962C8B-B14F-4D97-AF65-F5344CB8AC3E}">
-        <p14:creationId xmlns:p14="http://schemas.microsoft.com/office/powerpoint/2010/main" val="1827079877"/>
-      </p:ext>
-    </p:extLst>
   </p:cSld>
   <p:clrMapOvr>
     <a:masterClrMapping/>
   </p:clrMapOvr>
-  <mc:AlternateContent xmlns:mc="http://schemas.openxmlformats.org/markup-compatibility/2006" xmlns:p14="http://schemas.microsoft.com/office/powerpoint/2010/main">
-    <mc:Choice Requires="p14">
+  <mc:AlternateContent xmlns:mc="http://schemas.openxmlformats.org/markup-compatibility/2006">
+    <mc:Choice xmlns:p14="http://schemas.microsoft.com/office/powerpoint/2010/main" Requires="p14">
       <p:transition spd="med" p14:dur="700" advClick="0" advTm="0">
         <p:fade/>
       </p:transition>
     </mc:Choice>
-    <mc:Fallback xmlns="">
+    <mc:Fallback>
       <p:transition spd="med" advClick="0" advTm="0">
         <p:fade/>
       </p:transition>
@@ -11969,26 +11255,11 @@
       </p:grpSpPr>
       <p:sp>
         <p:nvSpPr>
-          <p:cNvPr id="12" name="Rectangle 11">
-            <a:extLst>
-              <a:ext uri="{FF2B5EF4-FFF2-40B4-BE49-F238E27FC236}">
-                <a16:creationId xmlns:a16="http://schemas.microsoft.com/office/drawing/2014/main" id="{4038CB10-1F5C-4D54-9DF7-12586DE5B007}"/>
-              </a:ext>
-              <a:ext uri="{C183D7F6-B498-43B3-948B-1728B52AA6E4}">
-                <adec:decorative xmlns:adec="http://schemas.microsoft.com/office/drawing/2017/decorative" val="1"/>
-              </a:ext>
-            </a:extLst>
-          </p:cNvPr>
+          <p:cNvPr id="12" name="Rectangle 11"/>
           <p:cNvSpPr>
             <a:spLocks noGrp="1" noRot="1" noChangeAspect="1" noMove="1" noResize="1" noEditPoints="1" noAdjustHandles="1" noChangeArrowheads="1" noChangeShapeType="1" noTextEdit="1"/>
           </p:cNvSpPr>
-          <p:nvPr>
-            <p:extLst>
-              <p:ext uri="{386F3935-93C4-4BCD-93E2-E3B085C9AB24}">
-                <p16:designElem xmlns:p16="http://schemas.microsoft.com/office/powerpoint/2015/main" val="1"/>
-              </p:ext>
-            </p:extLst>
-          </p:nvPr>
+          <p:nvPr/>
         </p:nvSpPr>
         <p:spPr>
           <a:xfrm>
@@ -12039,7 +11310,6 @@
               <a:buSzTx/>
               <a:buFontTx/>
               <a:buNone/>
-              <a:tabLst/>
               <a:defRPr/>
             </a:pPr>
             <a:endParaRPr kumimoji="0" lang="en-US" sz="1800" b="0" i="0" u="none" strike="noStrike" kern="1200" cap="none" spc="0" normalizeH="0" baseline="0" noProof="0">
@@ -12093,31 +11363,24 @@
               </a:rPr>
               <a:t>Proposed Design</a:t>
             </a:r>
+            <a:endParaRPr lang="en-US" sz="4400" b="1" kern="1200" dirty="0">
+              <a:solidFill>
+                <a:srgbClr val="FFFFFF"/>
+              </a:solidFill>
+              <a:latin typeface="+mj-lt"/>
+              <a:ea typeface="+mj-ea"/>
+              <a:cs typeface="+mj-cs"/>
+            </a:endParaRPr>
           </a:p>
         </p:txBody>
       </p:sp>
       <p:sp>
         <p:nvSpPr>
-          <p:cNvPr id="14" name="Rectangle 13">
-            <a:extLst>
-              <a:ext uri="{FF2B5EF4-FFF2-40B4-BE49-F238E27FC236}">
-                <a16:creationId xmlns:a16="http://schemas.microsoft.com/office/drawing/2014/main" id="{73ED6512-6858-4552-B699-9A97FE9A4EA2}"/>
-              </a:ext>
-              <a:ext uri="{C183D7F6-B498-43B3-948B-1728B52AA6E4}">
-                <adec:decorative xmlns:adec="http://schemas.microsoft.com/office/drawing/2017/decorative" val="1"/>
-              </a:ext>
-            </a:extLst>
-          </p:cNvPr>
+          <p:cNvPr id="14" name="Rectangle 13"/>
           <p:cNvSpPr>
             <a:spLocks noGrp="1" noRot="1" noChangeAspect="1" noMove="1" noResize="1" noEditPoints="1" noAdjustHandles="1" noChangeArrowheads="1" noChangeShapeType="1" noTextEdit="1"/>
           </p:cNvSpPr>
-          <p:nvPr>
-            <p:extLst>
-              <p:ext uri="{386F3935-93C4-4BCD-93E2-E3B085C9AB24}">
-                <p16:designElem xmlns:p16="http://schemas.microsoft.com/office/powerpoint/2015/main" val="1"/>
-              </p:ext>
-            </p:extLst>
-          </p:nvPr>
+          <p:nvPr/>
         </p:nvSpPr>
         <p:spPr>
           <a:xfrm>
@@ -12168,7 +11431,6 @@
               <a:buSzTx/>
               <a:buFontTx/>
               <a:buNone/>
-              <a:tabLst/>
               <a:defRPr/>
             </a:pPr>
             <a:endParaRPr kumimoji="0" lang="en-US" sz="1800" b="0" i="0" u="none" strike="noStrike" kern="1200" cap="none" spc="0" normalizeH="0" baseline="0" noProof="0">
@@ -12222,6 +11484,11 @@
               </a:rPr>
               <a:t>1. System Perspective</a:t>
             </a:r>
+            <a:endParaRPr lang="en-US" sz="2200" b="1" dirty="0">
+              <a:solidFill>
+                <a:srgbClr val="FFFFFF"/>
+              </a:solidFill>
+            </a:endParaRPr>
           </a:p>
           <a:p>
             <a:pPr marL="342900" indent="-228600" algn="l">
@@ -12240,7 +11507,7 @@
               <a:solidFill>
                 <a:srgbClr val="FFFFFF"/>
               </a:solidFill>
-              <a:cs typeface="Calibri"/>
+              <a:cs typeface="Calibri" panose="020F0502020204030204"/>
             </a:endParaRPr>
           </a:p>
           <a:p>
@@ -12260,7 +11527,7 @@
               <a:solidFill>
                 <a:srgbClr val="FFFFFF"/>
               </a:solidFill>
-              <a:cs typeface="Calibri"/>
+              <a:cs typeface="Calibri" panose="020F0502020204030204"/>
             </a:endParaRPr>
           </a:p>
           <a:p>
@@ -12280,7 +11547,7 @@
               <a:solidFill>
                 <a:srgbClr val="FFFFFF"/>
               </a:solidFill>
-              <a:cs typeface="Calibri"/>
+              <a:cs typeface="Calibri" panose="020F0502020204030204"/>
             </a:endParaRPr>
           </a:p>
           <a:p>
@@ -12300,7 +11567,7 @@
               <a:solidFill>
                 <a:srgbClr val="FFFFFF"/>
               </a:solidFill>
-              <a:cs typeface="Calibri"/>
+              <a:cs typeface="Calibri" panose="020F0502020204030204"/>
             </a:endParaRPr>
           </a:p>
           <a:p>
@@ -12331,7 +11598,7 @@
               <a:solidFill>
                 <a:srgbClr val="FFFFFF"/>
               </a:solidFill>
-              <a:cs typeface="Calibri"/>
+              <a:cs typeface="Calibri" panose="020F0502020204030204"/>
             </a:endParaRPr>
           </a:p>
           <a:p>
@@ -12351,7 +11618,7 @@
               <a:solidFill>
                 <a:srgbClr val="FFFFFF"/>
               </a:solidFill>
-              <a:cs typeface="Calibri"/>
+              <a:cs typeface="Calibri" panose="020F0502020204030204"/>
             </a:endParaRPr>
           </a:p>
           <a:p>
@@ -12371,7 +11638,7 @@
               <a:solidFill>
                 <a:srgbClr val="FFFFFF"/>
               </a:solidFill>
-              <a:cs typeface="Calibri"/>
+              <a:cs typeface="Calibri" panose="020F0502020204030204"/>
             </a:endParaRPr>
           </a:p>
           <a:p>
@@ -12391,7 +11658,7 @@
               <a:solidFill>
                 <a:srgbClr val="FFFFFF"/>
               </a:solidFill>
-              <a:cs typeface="Calibri"/>
+              <a:cs typeface="Calibri" panose="020F0502020204030204"/>
             </a:endParaRPr>
           </a:p>
           <a:p>
@@ -12411,7 +11678,7 @@
               <a:solidFill>
                 <a:srgbClr val="FFFFFF"/>
               </a:solidFill>
-              <a:cs typeface="Calibri"/>
+              <a:cs typeface="Calibri" panose="020F0502020204030204"/>
             </a:endParaRPr>
           </a:p>
           <a:p>
@@ -12431,20 +11698,14 @@
               <a:solidFill>
                 <a:srgbClr val="FFFFFF"/>
               </a:solidFill>
-              <a:cs typeface="Calibri"/>
+              <a:cs typeface="Calibri" panose="020F0502020204030204"/>
             </a:endParaRPr>
           </a:p>
         </p:txBody>
       </p:sp>
       <p:sp>
         <p:nvSpPr>
-          <p:cNvPr id="6" name="TextBox 5">
-            <a:extLst>
-              <a:ext uri="{FF2B5EF4-FFF2-40B4-BE49-F238E27FC236}">
-                <a16:creationId xmlns:a16="http://schemas.microsoft.com/office/drawing/2014/main" id="{538C0CB6-492C-4CDF-81B1-84AF44091088}"/>
-              </a:ext>
-            </a:extLst>
-          </p:cNvPr>
+          <p:cNvPr id="6" name="TextBox 5"/>
           <p:cNvSpPr txBox="1"/>
           <p:nvPr/>
         </p:nvSpPr>
@@ -12460,9 +11721,6 @@
         </p:spPr>
         <p:txBody>
           <a:bodyPr rot="0" spcFirstLastPara="0" vertOverflow="overflow" horzOverflow="overflow" vert="horz" wrap="square" lIns="91440" tIns="45720" rIns="91440" bIns="45720" numCol="1" spcCol="0" rtlCol="0" fromWordArt="0" anchor="t" anchorCtr="0" forceAA="0" compatLnSpc="1">
-            <a:prstTxWarp prst="textNoShape">
-              <a:avLst/>
-            </a:prstTxWarp>
             <a:spAutoFit/>
           </a:bodyPr>
           <a:lstStyle/>
@@ -12481,7 +11739,6 @@
               <a:buSzTx/>
               <a:buFontTx/>
               <a:buNone/>
-              <a:tabLst/>
               <a:defRPr/>
             </a:pPr>
             <a:endParaRPr kumimoji="0" lang="en-GB" sz="1800" b="0" i="0" u="none" strike="noStrike" kern="1200" cap="none" spc="0" normalizeH="0" baseline="0" noProof="0" dirty="0">
@@ -12496,27 +11753,21 @@
               <a:uFillTx/>
               <a:latin typeface="Calibri" panose="020F0502020204030204"/>
               <a:ea typeface="+mn-ea"/>
-              <a:cs typeface="Calibri"/>
+              <a:cs typeface="Calibri" panose="020F0502020204030204"/>
             </a:endParaRPr>
           </a:p>
         </p:txBody>
       </p:sp>
       <p:pic>
         <p:nvPicPr>
-          <p:cNvPr id="4" name="Picture 7" descr="Diagram&#10;&#10;Description automatically generated">
-            <a:extLst>
-              <a:ext uri="{FF2B5EF4-FFF2-40B4-BE49-F238E27FC236}">
-                <a16:creationId xmlns:a16="http://schemas.microsoft.com/office/drawing/2014/main" id="{F2C7B9B2-D892-4301-AF18-D3C968B8DEFF}"/>
-              </a:ext>
-            </a:extLst>
-          </p:cNvPr>
+          <p:cNvPr id="4" name="Picture 7" descr="Diagram&#10;&#10;Description automatically generated"/>
           <p:cNvPicPr>
             <a:picLocks noChangeAspect="1"/>
           </p:cNvPicPr>
           <p:nvPr/>
         </p:nvPicPr>
         <p:blipFill>
-          <a:blip r:embed="rId2"/>
+          <a:blip r:embed="rId1"/>
           <a:stretch>
             <a:fillRect/>
           </a:stretch>
@@ -12533,20 +11784,14 @@
       </p:pic>
       <p:pic>
         <p:nvPicPr>
-          <p:cNvPr id="8" name="Picture 8" descr="Diagram&#10;&#10;Description automatically generated">
-            <a:extLst>
-              <a:ext uri="{FF2B5EF4-FFF2-40B4-BE49-F238E27FC236}">
-                <a16:creationId xmlns:a16="http://schemas.microsoft.com/office/drawing/2014/main" id="{F027DCE3-FD79-4F0F-B403-AE326BF11BB7}"/>
-              </a:ext>
-            </a:extLst>
-          </p:cNvPr>
+          <p:cNvPr id="8" name="Picture 8" descr="Diagram&#10;&#10;Description automatically generated"/>
           <p:cNvPicPr>
             <a:picLocks noChangeAspect="1"/>
           </p:cNvPicPr>
           <p:nvPr/>
         </p:nvPicPr>
         <p:blipFill>
-          <a:blip r:embed="rId3"/>
+          <a:blip r:embed="rId2"/>
           <a:stretch>
             <a:fillRect/>
           </a:stretch>
@@ -12563,13 +11808,7 @@
       </p:pic>
       <p:sp>
         <p:nvSpPr>
-          <p:cNvPr id="9" name="TextBox 8">
-            <a:extLst>
-              <a:ext uri="{FF2B5EF4-FFF2-40B4-BE49-F238E27FC236}">
-                <a16:creationId xmlns:a16="http://schemas.microsoft.com/office/drawing/2014/main" id="{9520F6DE-E51B-44D2-91B7-92EF8A91D7CB}"/>
-              </a:ext>
-            </a:extLst>
-          </p:cNvPr>
+          <p:cNvPr id="9" name="TextBox 8"/>
           <p:cNvSpPr txBox="1"/>
           <p:nvPr/>
         </p:nvSpPr>
@@ -12585,9 +11824,6 @@
         </p:spPr>
         <p:txBody>
           <a:bodyPr rot="0" spcFirstLastPara="0" vertOverflow="overflow" horzOverflow="overflow" vert="horz" wrap="square" lIns="91440" tIns="45720" rIns="91440" bIns="45720" numCol="1" spcCol="0" rtlCol="0" fromWordArt="0" anchor="t" anchorCtr="0" forceAA="0" compatLnSpc="1">
-            <a:prstTxWarp prst="textNoShape">
-              <a:avLst/>
-            </a:prstTxWarp>
             <a:spAutoFit/>
           </a:bodyPr>
           <a:lstStyle/>
@@ -12606,7 +11842,6 @@
               <a:buSzTx/>
               <a:buFontTx/>
               <a:buNone/>
-              <a:tabLst/>
               <a:defRPr/>
             </a:pPr>
             <a:r>
@@ -12622,22 +11857,30 @@
                 <a:uFillTx/>
                 <a:latin typeface="Calibri" panose="020F0502020204030204"/>
                 <a:ea typeface="+mn-ea"/>
-                <a:cs typeface="Calibri"/>
+                <a:cs typeface="Calibri" panose="020F0502020204030204"/>
               </a:rPr>
               <a:t>Behavioural Perspective</a:t>
             </a:r>
+            <a:endParaRPr kumimoji="0" lang="en-GB" sz="1800" b="0" i="0" u="none" strike="noStrike" kern="1200" cap="none" spc="0" normalizeH="0" baseline="0" noProof="0" dirty="0">
+              <a:ln>
+                <a:noFill/>
+              </a:ln>
+              <a:solidFill>
+                <a:prstClr val="black"/>
+              </a:solidFill>
+              <a:effectLst/>
+              <a:uLnTx/>
+              <a:uFillTx/>
+              <a:latin typeface="Calibri" panose="020F0502020204030204"/>
+              <a:ea typeface="+mn-ea"/>
+              <a:cs typeface="Calibri" panose="020F0502020204030204"/>
+            </a:endParaRPr>
           </a:p>
         </p:txBody>
       </p:sp>
       <p:sp>
         <p:nvSpPr>
-          <p:cNvPr id="10" name="TextBox 9">
-            <a:extLst>
-              <a:ext uri="{FF2B5EF4-FFF2-40B4-BE49-F238E27FC236}">
-                <a16:creationId xmlns:a16="http://schemas.microsoft.com/office/drawing/2014/main" id="{64B939E1-E26D-4404-AFDD-E8CC46F70931}"/>
-              </a:ext>
-            </a:extLst>
-          </p:cNvPr>
+          <p:cNvPr id="10" name="TextBox 9"/>
           <p:cNvSpPr txBox="1"/>
           <p:nvPr/>
         </p:nvSpPr>
@@ -12653,9 +11896,6 @@
         </p:spPr>
         <p:txBody>
           <a:bodyPr rot="0" spcFirstLastPara="0" vertOverflow="overflow" horzOverflow="overflow" vert="horz" wrap="square" lIns="91440" tIns="45720" rIns="91440" bIns="45720" numCol="1" spcCol="0" rtlCol="0" fromWordArt="0" anchor="t" anchorCtr="0" forceAA="0" compatLnSpc="1">
-            <a:prstTxWarp prst="textNoShape">
-              <a:avLst/>
-            </a:prstTxWarp>
             <a:spAutoFit/>
           </a:bodyPr>
           <a:lstStyle/>
@@ -12674,7 +11914,6 @@
               <a:buSzTx/>
               <a:buFontTx/>
               <a:buNone/>
-              <a:tabLst/>
               <a:defRPr/>
             </a:pPr>
             <a:r>
@@ -12713,13 +11952,7 @@
       </p:sp>
       <p:sp>
         <p:nvSpPr>
-          <p:cNvPr id="11" name="矩形 10">
-            <a:extLst>
-              <a:ext uri="{FF2B5EF4-FFF2-40B4-BE49-F238E27FC236}">
-                <a16:creationId xmlns:a16="http://schemas.microsoft.com/office/drawing/2014/main" id="{559C1588-3BCC-4AE8-852E-B6D835FEB0A6}"/>
-              </a:ext>
-            </a:extLst>
-          </p:cNvPr>
+          <p:cNvPr id="11" name="矩形 10"/>
           <p:cNvSpPr/>
           <p:nvPr/>
         </p:nvSpPr>
@@ -12785,11 +12018,6 @@
         </p:txBody>
       </p:sp>
     </p:spTree>
-    <p:extLst>
-      <p:ext uri="{BB962C8B-B14F-4D97-AF65-F5344CB8AC3E}">
-        <p14:creationId xmlns:p14="http://schemas.microsoft.com/office/powerpoint/2010/main" val="109857222"/>
-      </p:ext>
-    </p:extLst>
   </p:cSld>
   <p:clrMapOvr>
     <a:masterClrMapping/>
@@ -12840,13 +12068,7 @@
         </p:grpSpPr>
         <p:sp>
           <p:nvSpPr>
-            <p:cNvPr id="42" name="TextBox 7">
-              <a:extLst>
-                <a:ext uri="{FF2B5EF4-FFF2-40B4-BE49-F238E27FC236}">
-                  <a16:creationId xmlns:a16="http://schemas.microsoft.com/office/drawing/2014/main" id="{BAF49D56-8FCD-4804-8411-594F1BC85F38}"/>
-                </a:ext>
-              </a:extLst>
-            </p:cNvPr>
+            <p:cNvPr id="42" name="TextBox 7"/>
             <p:cNvSpPr txBox="1"/>
             <p:nvPr/>
           </p:nvSpPr>
@@ -12866,7 +12088,7 @@
             </a:bodyPr>
             <a:lstStyle/>
             <a:p>
-              <a:pPr defTabSz="1219020"/>
+              <a:pPr defTabSz="1219200"/>
               <a:r>
                 <a:rPr lang="en-US" altLang="zh-CN" sz="2800" dirty="0">
                   <a:solidFill>
@@ -12958,20 +12180,14 @@
       </p:grpSp>
       <p:pic>
         <p:nvPicPr>
-          <p:cNvPr id="3" name="图片 2">
-            <a:extLst>
-              <a:ext uri="{FF2B5EF4-FFF2-40B4-BE49-F238E27FC236}">
-                <a16:creationId xmlns:a16="http://schemas.microsoft.com/office/drawing/2014/main" id="{2B72F40E-2670-4EC0-AD7C-DF8884D4CB28}"/>
-              </a:ext>
-            </a:extLst>
-          </p:cNvPr>
+          <p:cNvPr id="3" name="图片 2"/>
           <p:cNvPicPr>
             <a:picLocks noChangeAspect="1"/>
           </p:cNvPicPr>
           <p:nvPr/>
         </p:nvPicPr>
         <p:blipFill>
-          <a:blip r:embed="rId3"/>
+          <a:blip r:embed="rId1"/>
           <a:stretch>
             <a:fillRect/>
           </a:stretch>
@@ -12988,13 +12204,7 @@
       </p:pic>
       <p:sp>
         <p:nvSpPr>
-          <p:cNvPr id="4" name="文本框 3">
-            <a:extLst>
-              <a:ext uri="{FF2B5EF4-FFF2-40B4-BE49-F238E27FC236}">
-                <a16:creationId xmlns:a16="http://schemas.microsoft.com/office/drawing/2014/main" id="{057C989E-1222-4C67-905D-C53C4BA65744}"/>
-              </a:ext>
-            </a:extLst>
-          </p:cNvPr>
+          <p:cNvPr id="4" name="文本框 3"/>
           <p:cNvSpPr txBox="1"/>
           <p:nvPr/>
         </p:nvSpPr>
@@ -13037,22 +12247,17 @@
         </p:txBody>
       </p:sp>
     </p:spTree>
-    <p:extLst>
-      <p:ext uri="{BB962C8B-B14F-4D97-AF65-F5344CB8AC3E}">
-        <p14:creationId xmlns:p14="http://schemas.microsoft.com/office/powerpoint/2010/main" val="3917063573"/>
-      </p:ext>
-    </p:extLst>
   </p:cSld>
   <p:clrMapOvr>
     <a:masterClrMapping/>
   </p:clrMapOvr>
-  <mc:AlternateContent xmlns:mc="http://schemas.openxmlformats.org/markup-compatibility/2006" xmlns:p14="http://schemas.microsoft.com/office/powerpoint/2010/main">
-    <mc:Choice Requires="p14">
+  <mc:AlternateContent xmlns:mc="http://schemas.openxmlformats.org/markup-compatibility/2006">
+    <mc:Choice xmlns:p14="http://schemas.microsoft.com/office/powerpoint/2010/main" Requires="p14">
       <p:transition spd="med" p14:dur="700" advClick="0" advTm="0">
         <p:fade/>
       </p:transition>
     </mc:Choice>
-    <mc:Fallback xmlns="">
+    <mc:Fallback>
       <p:transition spd="med" advClick="0" advTm="0">
         <p:fade/>
       </p:transition>
@@ -13104,13 +12309,7 @@
         </p:grpSpPr>
         <p:sp>
           <p:nvSpPr>
-            <p:cNvPr id="42" name="TextBox 7">
-              <a:extLst>
-                <a:ext uri="{FF2B5EF4-FFF2-40B4-BE49-F238E27FC236}">
-                  <a16:creationId xmlns:a16="http://schemas.microsoft.com/office/drawing/2014/main" id="{BAF49D56-8FCD-4804-8411-594F1BC85F38}"/>
-                </a:ext>
-              </a:extLst>
-            </p:cNvPr>
+            <p:cNvPr id="42" name="TextBox 7"/>
             <p:cNvSpPr txBox="1"/>
             <p:nvPr/>
           </p:nvSpPr>
@@ -13130,7 +12329,7 @@
             </a:bodyPr>
             <a:lstStyle/>
             <a:p>
-              <a:pPr defTabSz="1219020"/>
+              <a:pPr defTabSz="1219200"/>
               <a:r>
                 <a:rPr lang="en-US" altLang="zh-CN" sz="2800" dirty="0">
                   <a:solidFill>
@@ -13222,16 +12421,8 @@
       </p:grpSp>
       <p:sp>
         <p:nvSpPr>
-          <p:cNvPr id="32" name="Subtitle 2">
-            <a:extLst>
-              <a:ext uri="{FF2B5EF4-FFF2-40B4-BE49-F238E27FC236}">
-                <a16:creationId xmlns:a16="http://schemas.microsoft.com/office/drawing/2014/main" id="{163C4A5D-CCA1-4EE5-B5F6-065EB0564DBE}"/>
-              </a:ext>
-            </a:extLst>
-          </p:cNvPr>
-          <p:cNvSpPr txBox="1">
-            <a:spLocks/>
-          </p:cNvSpPr>
+          <p:cNvPr id="32" name="Subtitle 2"/>
+          <p:cNvSpPr txBox="1"/>
           <p:nvPr/>
         </p:nvSpPr>
         <p:spPr>
@@ -13425,6 +12616,15 @@
               </a:rPr>
               <a:t>Miro</a:t>
             </a:r>
+            <a:endParaRPr lang="en-US" sz="14400" dirty="0">
+              <a:solidFill>
+                <a:schemeClr val="accent4">
+                  <a:lumMod val="40000"/>
+                  <a:lumOff val="60000"/>
+                </a:schemeClr>
+              </a:solidFill>
+              <a:ea typeface="宋体" panose="02010600030101010101" pitchFamily="2" charset="-122"/>
+            </a:endParaRPr>
           </a:p>
           <a:p>
             <a:pPr marL="342900" indent="-342900" algn="just"/>
@@ -13440,6 +12640,15 @@
               </a:rPr>
               <a:t>Monday</a:t>
             </a:r>
+            <a:endParaRPr lang="en-US" sz="14400" dirty="0">
+              <a:solidFill>
+                <a:schemeClr val="accent4">
+                  <a:lumMod val="40000"/>
+                  <a:lumOff val="60000"/>
+                </a:schemeClr>
+              </a:solidFill>
+              <a:ea typeface="宋体" panose="02010600030101010101" pitchFamily="2" charset="-122"/>
+            </a:endParaRPr>
           </a:p>
           <a:p>
             <a:pPr marL="342900" indent="-342900" algn="just"/>
@@ -13496,20 +12705,14 @@
       </p:sp>
       <p:pic>
         <p:nvPicPr>
-          <p:cNvPr id="1026" name="Picture 2">
-            <a:extLst>
-              <a:ext uri="{FF2B5EF4-FFF2-40B4-BE49-F238E27FC236}">
-                <a16:creationId xmlns:a16="http://schemas.microsoft.com/office/drawing/2014/main" id="{BA2C23D5-6577-465B-B8E5-D70B90115808}"/>
-              </a:ext>
-            </a:extLst>
-          </p:cNvPr>
+          <p:cNvPr id="1026" name="Picture 2"/>
           <p:cNvPicPr>
             <a:picLocks noChangeAspect="1" noChangeArrowheads="1"/>
           </p:cNvPicPr>
           <p:nvPr/>
         </p:nvPicPr>
         <p:blipFill>
-          <a:blip r:embed="rId3">
+          <a:blip r:embed="rId1">
             <a:extLst>
               <a:ext uri="{28A0092B-C50C-407E-A947-70E740481C1C}">
                 <a14:useLocalDpi xmlns:a14="http://schemas.microsoft.com/office/drawing/2010/main" val="0"/>
@@ -13542,22 +12745,17 @@
         </p:spPr>
       </p:pic>
     </p:spTree>
-    <p:extLst>
-      <p:ext uri="{BB962C8B-B14F-4D97-AF65-F5344CB8AC3E}">
-        <p14:creationId xmlns:p14="http://schemas.microsoft.com/office/powerpoint/2010/main" val="2165244661"/>
-      </p:ext>
-    </p:extLst>
   </p:cSld>
   <p:clrMapOvr>
     <a:masterClrMapping/>
   </p:clrMapOvr>
-  <mc:AlternateContent xmlns:mc="http://schemas.openxmlformats.org/markup-compatibility/2006" xmlns:p14="http://schemas.microsoft.com/office/powerpoint/2010/main">
-    <mc:Choice Requires="p14">
+  <mc:AlternateContent xmlns:mc="http://schemas.openxmlformats.org/markup-compatibility/2006">
+    <mc:Choice xmlns:p14="http://schemas.microsoft.com/office/powerpoint/2010/main" Requires="p14">
       <p:transition spd="med" p14:dur="700" advClick="0" advTm="0">
         <p:fade/>
       </p:transition>
     </mc:Choice>
-    <mc:Fallback xmlns="">
+    <mc:Fallback>
       <p:transition spd="med" advClick="0" advTm="0">
         <p:fade/>
       </p:transition>
@@ -13599,13 +12797,7 @@
         </p:grpSpPr>
         <p:sp>
           <p:nvSpPr>
-            <p:cNvPr id="42" name="TextBox 7">
-              <a:extLst>
-                <a:ext uri="{FF2B5EF4-FFF2-40B4-BE49-F238E27FC236}">
-                  <a16:creationId xmlns:a16="http://schemas.microsoft.com/office/drawing/2014/main" id="{BAF49D56-8FCD-4804-8411-594F1BC85F38}"/>
-                </a:ext>
-              </a:extLst>
-            </p:cNvPr>
+            <p:cNvPr id="42" name="TextBox 7"/>
             <p:cNvSpPr txBox="1"/>
             <p:nvPr/>
           </p:nvSpPr>
@@ -13625,7 +12817,7 @@
             </a:bodyPr>
             <a:lstStyle/>
             <a:p>
-              <a:pPr defTabSz="1219020"/>
+              <a:pPr defTabSz="1219200"/>
               <a:r>
                 <a:rPr lang="en-AU" altLang="zh-CN" sz="3800" dirty="0">
                   <a:solidFill>
@@ -13723,16 +12915,8 @@
       </p:grpSp>
       <p:sp>
         <p:nvSpPr>
-          <p:cNvPr id="32" name="Subtitle 2">
-            <a:extLst>
-              <a:ext uri="{FF2B5EF4-FFF2-40B4-BE49-F238E27FC236}">
-                <a16:creationId xmlns:a16="http://schemas.microsoft.com/office/drawing/2014/main" id="{163C4A5D-CCA1-4EE5-B5F6-065EB0564DBE}"/>
-              </a:ext>
-            </a:extLst>
-          </p:cNvPr>
-          <p:cNvSpPr txBox="1">
-            <a:spLocks/>
-          </p:cNvSpPr>
+          <p:cNvPr id="32" name="Subtitle 2"/>
+          <p:cNvSpPr txBox="1"/>
           <p:nvPr/>
         </p:nvSpPr>
         <p:spPr>
@@ -13925,6 +13109,15 @@
               </a:rPr>
               <a:t>It support in creating roster rules and  manage roster.</a:t>
             </a:r>
+            <a:endParaRPr lang="en-AU" altLang="zh-CN" sz="4500" dirty="0">
+              <a:solidFill>
+                <a:schemeClr val="accent4">
+                  <a:lumMod val="40000"/>
+                  <a:lumOff val="60000"/>
+                </a:schemeClr>
+              </a:solidFill>
+              <a:ea typeface="宋体" panose="02010600030101010101" pitchFamily="2" charset="-122"/>
+            </a:endParaRPr>
           </a:p>
           <a:p>
             <a:r>
@@ -13939,6 +13132,15 @@
               </a:rPr>
               <a:t>It also create availability update. </a:t>
             </a:r>
+            <a:endParaRPr lang="en-AU" altLang="zh-CN" sz="4500" dirty="0">
+              <a:solidFill>
+                <a:schemeClr val="accent4">
+                  <a:lumMod val="40000"/>
+                  <a:lumOff val="60000"/>
+                </a:schemeClr>
+              </a:solidFill>
+              <a:ea typeface="宋体" panose="02010600030101010101" pitchFamily="2" charset="-122"/>
+            </a:endParaRPr>
           </a:p>
           <a:p>
             <a:r>
@@ -13953,6 +13155,15 @@
               </a:rPr>
               <a:t>Manage working hours of casual staff.</a:t>
             </a:r>
+            <a:endParaRPr lang="en-AU" altLang="zh-CN" sz="4500" dirty="0">
+              <a:solidFill>
+                <a:schemeClr val="accent4">
+                  <a:lumMod val="40000"/>
+                  <a:lumOff val="60000"/>
+                </a:schemeClr>
+              </a:solidFill>
+              <a:ea typeface="宋体" panose="02010600030101010101" pitchFamily="2" charset="-122"/>
+            </a:endParaRPr>
           </a:p>
           <a:p>
             <a:r>
@@ -13967,26 +13178,30 @@
               </a:rPr>
               <a:t>Reduce or eliminate  paper work in the Abacus company. </a:t>
             </a:r>
+            <a:endParaRPr lang="en-AU" altLang="zh-CN" sz="4500" dirty="0">
+              <a:solidFill>
+                <a:schemeClr val="accent4">
+                  <a:lumMod val="40000"/>
+                  <a:lumOff val="60000"/>
+                </a:schemeClr>
+              </a:solidFill>
+              <a:ea typeface="宋体" panose="02010600030101010101" pitchFamily="2" charset="-122"/>
+            </a:endParaRPr>
           </a:p>
         </p:txBody>
       </p:sp>
     </p:spTree>
-    <p:extLst>
-      <p:ext uri="{BB962C8B-B14F-4D97-AF65-F5344CB8AC3E}">
-        <p14:creationId xmlns:p14="http://schemas.microsoft.com/office/powerpoint/2010/main" val="2995717877"/>
-      </p:ext>
-    </p:extLst>
   </p:cSld>
   <p:clrMapOvr>
     <a:masterClrMapping/>
   </p:clrMapOvr>
-  <mc:AlternateContent xmlns:mc="http://schemas.openxmlformats.org/markup-compatibility/2006" xmlns:p14="http://schemas.microsoft.com/office/powerpoint/2010/main">
-    <mc:Choice Requires="p14">
+  <mc:AlternateContent xmlns:mc="http://schemas.openxmlformats.org/markup-compatibility/2006">
+    <mc:Choice xmlns:p14="http://schemas.microsoft.com/office/powerpoint/2010/main" Requires="p14">
       <p:transition spd="med" p14:dur="700" advClick="0" advTm="0">
         <p:fade/>
       </p:transition>
     </mc:Choice>
-    <mc:Fallback xmlns="">
+    <mc:Fallback>
       <p:transition spd="med" advClick="0" advTm="0">
         <p:fade/>
       </p:transition>
@@ -13996,7 +13211,7 @@
 </file>
 
 <file path=ppt/tags/tag1.xml><?xml version="1.0" encoding="utf-8"?>
-<p:tagLst xmlns:a="http://schemas.openxmlformats.org/drawingml/2006/main" xmlns:r="http://schemas.openxmlformats.org/officeDocument/2006/relationships" xmlns:p="http://schemas.openxmlformats.org/presentationml/2006/main">
+<p:tagLst xmlns:p="http://schemas.openxmlformats.org/presentationml/2006/main">
   <p:tag name="MH" val="20160312084837"/>
   <p:tag name="MH_LIBRARY" val="GRAPHIC"/>
   <p:tag name="MH_TYPE" val="Desc"/>
@@ -14047,7 +13262,7 @@
     </a:clrScheme>
     <a:fontScheme name="Office">
       <a:majorFont>
-        <a:latin typeface="Calibri Light" panose="020F0302020204030204"/>
+        <a:latin typeface="Calibri Light"/>
         <a:ea typeface=""/>
         <a:cs typeface=""/>
         <a:font script="Jpan" typeface="ＭＳ Ｐゴシック"/>
@@ -14082,7 +13297,7 @@
         <a:font script="Geor" typeface="Sylfaen"/>
       </a:majorFont>
       <a:minorFont>
-        <a:latin typeface="Calibri" panose="020F0502020204030204"/>
+        <a:latin typeface="Calibri"/>
         <a:ea typeface=""/>
         <a:cs typeface=""/>
         <a:font script="Jpan" typeface="ＭＳ Ｐゴシック"/>
@@ -14255,8 +13470,6 @@
       </a:bgFillStyleLst>
     </a:fmtScheme>
   </a:themeElements>
-  <a:objectDefaults/>
-  <a:extraClrSchemeLst/>
   <a:extLst>
     <a:ext uri="{05A4C25C-085E-4340-85A3-A5531E510DB2}">
       <thm15:themeFamily xmlns:thm15="http://schemas.microsoft.com/office/thememl/2012/main" name="Office Theme" id="{62F939B6-93AF-4DB8-9C6B-D6C7DFDC589F}" vid="{4A3C46E8-61CC-4603-A589-7422A47A8E4A}"/>
@@ -14308,7 +13521,7 @@
     </a:clrScheme>
     <a:fontScheme name="Office Theme">
       <a:majorFont>
-        <a:latin typeface="Calibri Light" panose="020F0302020204030204"/>
+        <a:latin typeface="Calibri Light"/>
         <a:ea typeface=""/>
         <a:cs typeface=""/>
         <a:font script="Jpan" typeface="ＭＳ Ｐゴシック"/>
@@ -14343,7 +13556,7 @@
         <a:font script="Geor" typeface="Sylfaen"/>
       </a:majorFont>
       <a:minorFont>
-        <a:latin typeface="Calibri" panose="020F0502020204030204"/>
+        <a:latin typeface="Calibri"/>
         <a:ea typeface=""/>
         <a:cs typeface=""/>
         <a:font script="Jpan" typeface="ＭＳ Ｐゴシック"/>
@@ -14516,8 +13729,6 @@
       </a:bgFillStyleLst>
     </a:fmtScheme>
   </a:themeElements>
-  <a:objectDefaults/>
-  <a:extraClrSchemeLst/>
   <a:extLst>
     <a:ext uri="{05A4C25C-085E-4340-85A3-A5531E510DB2}">
       <thm15:themeFamily xmlns:thm15="http://schemas.microsoft.com/office/thememl/2012/main" name="Office Theme" id="{62F939B6-93AF-4DB8-9C6B-D6C7DFDC589F}" vid="{4A3C46E8-61CC-4603-A589-7422A47A8E4A}"/>
@@ -14569,7 +13780,7 @@
     </a:clrScheme>
     <a:fontScheme name="Office">
       <a:majorFont>
-        <a:latin typeface="Calibri Light" panose="020F0302020204030204"/>
+        <a:latin typeface="Calibri Light"/>
         <a:ea typeface=""/>
         <a:cs typeface=""/>
         <a:font script="Jpan" typeface="ＭＳ Ｐゴシック"/>
@@ -14604,7 +13815,7 @@
         <a:font script="Geor" typeface="Sylfaen"/>
       </a:majorFont>
       <a:minorFont>
-        <a:latin typeface="Calibri" panose="020F0502020204030204"/>
+        <a:latin typeface="Calibri"/>
         <a:ea typeface=""/>
         <a:cs typeface=""/>
         <a:font script="Jpan" typeface="ＭＳ Ｐゴシック"/>
@@ -14777,270 +13988,10 @@
       </a:bgFillStyleLst>
     </a:fmtScheme>
   </a:themeElements>
-  <a:objectDefaults/>
-  <a:extraClrSchemeLst/>
   <a:extLst>
     <a:ext uri="{05A4C25C-085E-4340-85A3-A5531E510DB2}">
       <thm15:themeFamily xmlns:thm15="http://schemas.microsoft.com/office/thememl/2012/main" name="Office Theme" id="{62F939B6-93AF-4DB8-9C6B-D6C7DFDC589F}" vid="{4A3C46E8-61CC-4603-A589-7422A47A8E4A}"/>
     </a:ext>
   </a:extLst>
 </a:theme>
-</file>
-
-<file path=ppt/theme/themeOverride1.xml><?xml version="1.0" encoding="utf-8"?>
-<a:themeOverride xmlns:a="http://schemas.openxmlformats.org/drawingml/2006/main">
-  <a:clrScheme name="">
-    <a:dk1>
-      <a:srgbClr val="000000"/>
-    </a:dk1>
-    <a:lt1>
-      <a:srgbClr val="FFFFFF"/>
-    </a:lt1>
-    <a:dk2>
-      <a:srgbClr val="1F497D"/>
-    </a:dk2>
-    <a:lt2>
-      <a:srgbClr val="EEECE1"/>
-    </a:lt2>
-    <a:accent1>
-      <a:srgbClr val="4F81BD"/>
-    </a:accent1>
-    <a:accent2>
-      <a:srgbClr val="C0504D"/>
-    </a:accent2>
-    <a:accent3>
-      <a:srgbClr val="FFFFFF"/>
-    </a:accent3>
-    <a:accent4>
-      <a:srgbClr val="000000"/>
-    </a:accent4>
-    <a:accent5>
-      <a:srgbClr val="B2C1DB"/>
-    </a:accent5>
-    <a:accent6>
-      <a:srgbClr val="AE4845"/>
-    </a:accent6>
-    <a:hlink>
-      <a:srgbClr val="0000FF"/>
-    </a:hlink>
-    <a:folHlink>
-      <a:srgbClr val="800080"/>
-    </a:folHlink>
-  </a:clrScheme>
-</a:themeOverride>
-</file>
-
-<file path=ppt/theme/themeOverride2.xml><?xml version="1.0" encoding="utf-8"?>
-<a:themeOverride xmlns:a="http://schemas.openxmlformats.org/drawingml/2006/main">
-  <a:clrScheme name="">
-    <a:dk1>
-      <a:srgbClr val="000000"/>
-    </a:dk1>
-    <a:lt1>
-      <a:srgbClr val="FFFFFF"/>
-    </a:lt1>
-    <a:dk2>
-      <a:srgbClr val="1F497D"/>
-    </a:dk2>
-    <a:lt2>
-      <a:srgbClr val="EEECE1"/>
-    </a:lt2>
-    <a:accent1>
-      <a:srgbClr val="4F81BD"/>
-    </a:accent1>
-    <a:accent2>
-      <a:srgbClr val="C0504D"/>
-    </a:accent2>
-    <a:accent3>
-      <a:srgbClr val="FFFFFF"/>
-    </a:accent3>
-    <a:accent4>
-      <a:srgbClr val="000000"/>
-    </a:accent4>
-    <a:accent5>
-      <a:srgbClr val="B2C1DB"/>
-    </a:accent5>
-    <a:accent6>
-      <a:srgbClr val="AE4845"/>
-    </a:accent6>
-    <a:hlink>
-      <a:srgbClr val="0000FF"/>
-    </a:hlink>
-    <a:folHlink>
-      <a:srgbClr val="800080"/>
-    </a:folHlink>
-  </a:clrScheme>
-</a:themeOverride>
-</file>
-
-<file path=ppt/theme/themeOverride3.xml><?xml version="1.0" encoding="utf-8"?>
-<a:themeOverride xmlns:a="http://schemas.openxmlformats.org/drawingml/2006/main">
-  <a:clrScheme name="">
-    <a:dk1>
-      <a:srgbClr val="000000"/>
-    </a:dk1>
-    <a:lt1>
-      <a:srgbClr val="FFFFFF"/>
-    </a:lt1>
-    <a:dk2>
-      <a:srgbClr val="1F497D"/>
-    </a:dk2>
-    <a:lt2>
-      <a:srgbClr val="EEECE1"/>
-    </a:lt2>
-    <a:accent1>
-      <a:srgbClr val="4F81BD"/>
-    </a:accent1>
-    <a:accent2>
-      <a:srgbClr val="C0504D"/>
-    </a:accent2>
-    <a:accent3>
-      <a:srgbClr val="FFFFFF"/>
-    </a:accent3>
-    <a:accent4>
-      <a:srgbClr val="000000"/>
-    </a:accent4>
-    <a:accent5>
-      <a:srgbClr val="B2C1DB"/>
-    </a:accent5>
-    <a:accent6>
-      <a:srgbClr val="AE4845"/>
-    </a:accent6>
-    <a:hlink>
-      <a:srgbClr val="0000FF"/>
-    </a:hlink>
-    <a:folHlink>
-      <a:srgbClr val="800080"/>
-    </a:folHlink>
-  </a:clrScheme>
-</a:themeOverride>
-</file>
-
-<file path=ppt/theme/themeOverride4.xml><?xml version="1.0" encoding="utf-8"?>
-<a:themeOverride xmlns:a="http://schemas.openxmlformats.org/drawingml/2006/main">
-  <a:clrScheme name="">
-    <a:dk1>
-      <a:srgbClr val="000000"/>
-    </a:dk1>
-    <a:lt1>
-      <a:srgbClr val="FFFFFF"/>
-    </a:lt1>
-    <a:dk2>
-      <a:srgbClr val="1F497D"/>
-    </a:dk2>
-    <a:lt2>
-      <a:srgbClr val="EEECE1"/>
-    </a:lt2>
-    <a:accent1>
-      <a:srgbClr val="4F81BD"/>
-    </a:accent1>
-    <a:accent2>
-      <a:srgbClr val="C0504D"/>
-    </a:accent2>
-    <a:accent3>
-      <a:srgbClr val="FFFFFF"/>
-    </a:accent3>
-    <a:accent4>
-      <a:srgbClr val="000000"/>
-    </a:accent4>
-    <a:accent5>
-      <a:srgbClr val="B2C1DB"/>
-    </a:accent5>
-    <a:accent6>
-      <a:srgbClr val="AE4845"/>
-    </a:accent6>
-    <a:hlink>
-      <a:srgbClr val="0000FF"/>
-    </a:hlink>
-    <a:folHlink>
-      <a:srgbClr val="800080"/>
-    </a:folHlink>
-  </a:clrScheme>
-</a:themeOverride>
-</file>
-
-<file path=ppt/theme/themeOverride5.xml><?xml version="1.0" encoding="utf-8"?>
-<a:themeOverride xmlns:a="http://schemas.openxmlformats.org/drawingml/2006/main">
-  <a:clrScheme name="">
-    <a:dk1>
-      <a:srgbClr val="000000"/>
-    </a:dk1>
-    <a:lt1>
-      <a:srgbClr val="FFFFFF"/>
-    </a:lt1>
-    <a:dk2>
-      <a:srgbClr val="1F497D"/>
-    </a:dk2>
-    <a:lt2>
-      <a:srgbClr val="EEECE1"/>
-    </a:lt2>
-    <a:accent1>
-      <a:srgbClr val="4F81BD"/>
-    </a:accent1>
-    <a:accent2>
-      <a:srgbClr val="C0504D"/>
-    </a:accent2>
-    <a:accent3>
-      <a:srgbClr val="FFFFFF"/>
-    </a:accent3>
-    <a:accent4>
-      <a:srgbClr val="000000"/>
-    </a:accent4>
-    <a:accent5>
-      <a:srgbClr val="B2C1DB"/>
-    </a:accent5>
-    <a:accent6>
-      <a:srgbClr val="AE4845"/>
-    </a:accent6>
-    <a:hlink>
-      <a:srgbClr val="0000FF"/>
-    </a:hlink>
-    <a:folHlink>
-      <a:srgbClr val="800080"/>
-    </a:folHlink>
-  </a:clrScheme>
-</a:themeOverride>
-</file>
-
-<file path=ppt/theme/themeOverride6.xml><?xml version="1.0" encoding="utf-8"?>
-<a:themeOverride xmlns:a="http://schemas.openxmlformats.org/drawingml/2006/main">
-  <a:clrScheme name="">
-    <a:dk1>
-      <a:srgbClr val="000000"/>
-    </a:dk1>
-    <a:lt1>
-      <a:srgbClr val="FFFFFF"/>
-    </a:lt1>
-    <a:dk2>
-      <a:srgbClr val="1F497D"/>
-    </a:dk2>
-    <a:lt2>
-      <a:srgbClr val="EEECE1"/>
-    </a:lt2>
-    <a:accent1>
-      <a:srgbClr val="4F81BD"/>
-    </a:accent1>
-    <a:accent2>
-      <a:srgbClr val="C0504D"/>
-    </a:accent2>
-    <a:accent3>
-      <a:srgbClr val="FFFFFF"/>
-    </a:accent3>
-    <a:accent4>
-      <a:srgbClr val="000000"/>
-    </a:accent4>
-    <a:accent5>
-      <a:srgbClr val="B2C1DB"/>
-    </a:accent5>
-    <a:accent6>
-      <a:srgbClr val="AE4845"/>
-    </a:accent6>
-    <a:hlink>
-      <a:srgbClr val="0000FF"/>
-    </a:hlink>
-    <a:folHlink>
-      <a:srgbClr val="800080"/>
-    </a:folHlink>
-  </a:clrScheme>
-</a:themeOverride>
 </file>
</xml_diff>